<commit_message>
Ajout images simulation Psim
</commit_message>
<xml_diff>
--- a/Remise/Remise 2/Presentation_Remise_2.pptx
+++ b/Remise/Remise 2/Presentation_Remise_2.pptx
@@ -7,25 +7,36 @@
   <p:sldIdLst>
     <p:sldId id="256" r:id="rId2"/>
     <p:sldId id="259" r:id="rId3"/>
-    <p:sldId id="257" r:id="rId4"/>
-    <p:sldId id="258" r:id="rId5"/>
-    <p:sldId id="277" r:id="rId6"/>
-    <p:sldId id="260" r:id="rId7"/>
-    <p:sldId id="261" r:id="rId8"/>
-    <p:sldId id="262" r:id="rId9"/>
-    <p:sldId id="263" r:id="rId10"/>
-    <p:sldId id="264" r:id="rId11"/>
-    <p:sldId id="265" r:id="rId12"/>
-    <p:sldId id="266" r:id="rId13"/>
-    <p:sldId id="267" r:id="rId14"/>
-    <p:sldId id="268" r:id="rId15"/>
-    <p:sldId id="269" r:id="rId16"/>
-    <p:sldId id="271" r:id="rId17"/>
-    <p:sldId id="272" r:id="rId18"/>
-    <p:sldId id="273" r:id="rId19"/>
-    <p:sldId id="274" r:id="rId20"/>
-    <p:sldId id="275" r:id="rId21"/>
-    <p:sldId id="276" r:id="rId22"/>
+    <p:sldId id="284" r:id="rId4"/>
+    <p:sldId id="257" r:id="rId5"/>
+    <p:sldId id="258" r:id="rId6"/>
+    <p:sldId id="277" r:id="rId7"/>
+    <p:sldId id="282" r:id="rId8"/>
+    <p:sldId id="283" r:id="rId9"/>
+    <p:sldId id="260" r:id="rId10"/>
+    <p:sldId id="261" r:id="rId11"/>
+    <p:sldId id="262" r:id="rId12"/>
+    <p:sldId id="263" r:id="rId13"/>
+    <p:sldId id="264" r:id="rId14"/>
+    <p:sldId id="265" r:id="rId15"/>
+    <p:sldId id="266" r:id="rId16"/>
+    <p:sldId id="267" r:id="rId17"/>
+    <p:sldId id="268" r:id="rId18"/>
+    <p:sldId id="278" r:id="rId19"/>
+    <p:sldId id="279" r:id="rId20"/>
+    <p:sldId id="280" r:id="rId21"/>
+    <p:sldId id="281" r:id="rId22"/>
+    <p:sldId id="271" r:id="rId23"/>
+    <p:sldId id="272" r:id="rId24"/>
+    <p:sldId id="274" r:id="rId25"/>
+    <p:sldId id="275" r:id="rId26"/>
+    <p:sldId id="276" r:id="rId27"/>
+    <p:sldId id="285" r:id="rId28"/>
+    <p:sldId id="286" r:id="rId29"/>
+    <p:sldId id="287" r:id="rId30"/>
+    <p:sldId id="288" r:id="rId31"/>
+    <p:sldId id="289" r:id="rId32"/>
+    <p:sldId id="290" r:id="rId33"/>
   </p:sldIdLst>
   <p:sldSz cx="9144000" cy="6858000" type="screen4x3"/>
   <p:notesSz cx="6858000" cy="9144000"/>
@@ -6909,15 +6920,492 @@
           <a:p>
             <a:r>
               <a:rPr lang="en-CA" dirty="0" err="1" smtClean="0"/>
+              <a:t>Commande</a:t>
+            </a:r>
+            <a:r>
+              <a:rPr lang="en-CA" dirty="0" smtClean="0"/>
+              <a:t> de </a:t>
+            </a:r>
+            <a:r>
+              <a:rPr lang="en-CA" dirty="0" err="1" smtClean="0"/>
+              <a:t>l’AFE</a:t>
+            </a:r>
+            <a:r>
+              <a:rPr lang="en-CA" dirty="0" smtClean="0"/>
+              <a:t/>
+            </a:r>
+            <a:br>
+              <a:rPr lang="en-CA" dirty="0" smtClean="0"/>
+            </a:br>
+            <a:r>
+              <a:rPr lang="en-CA" dirty="0"/>
+              <a:t>	</a:t>
+            </a:r>
+            <a:endParaRPr lang="fr-CA" dirty="0"/>
+          </a:p>
+        </p:txBody>
+      </p:sp>
+      <p:sp>
+        <p:nvSpPr>
+          <p:cNvPr id="3" name="Espace réservé du contenu 2"/>
+          <p:cNvSpPr>
+            <a:spLocks noGrp="1"/>
+          </p:cNvSpPr>
+          <p:nvPr>
+            <p:ph idx="1"/>
+          </p:nvPr>
+        </p:nvSpPr>
+        <p:spPr/>
+        <p:txBody>
+          <a:bodyPr/>
+          <a:lstStyle/>
+          <a:p>
+            <a:endParaRPr lang="fr-CA" dirty="0"/>
+          </a:p>
+        </p:txBody>
+      </p:sp>
+      <p:pic>
+        <p:nvPicPr>
+          <p:cNvPr id="2050" name="Picture 2"/>
+          <p:cNvPicPr>
+            <a:picLocks noChangeAspect="1" noChangeArrowheads="1"/>
+          </p:cNvPicPr>
+          <p:nvPr/>
+        </p:nvPicPr>
+        <p:blipFill>
+          <a:blip r:embed="rId2">
+            <a:extLst>
+              <a:ext uri="{28A0092B-C50C-407E-A947-70E740481C1C}">
+                <a14:useLocalDpi xmlns:a14="http://schemas.microsoft.com/office/drawing/2010/main" val="0"/>
+              </a:ext>
+            </a:extLst>
+          </a:blip>
+          <a:srcRect/>
+          <a:stretch>
+            <a:fillRect/>
+          </a:stretch>
+        </p:blipFill>
+        <p:spPr bwMode="auto">
+          <a:xfrm>
+            <a:off x="391886" y="2072303"/>
+            <a:ext cx="7844517" cy="4635026"/>
+          </a:xfrm>
+          <a:prstGeom prst="rect">
+            <a:avLst/>
+          </a:prstGeom>
+          <a:noFill/>
+          <a:ln>
+            <a:noFill/>
+          </a:ln>
+          <a:extLst>
+            <a:ext uri="{909E8E84-426E-40dd-AFC4-6F175D3DCCD1}">
+              <a14:hiddenFill xmlns:a14="http://schemas.microsoft.com/office/drawing/2010/main">
+                <a:solidFill>
+                  <a:schemeClr val="accent1"/>
+                </a:solidFill>
+              </a14:hiddenFill>
+            </a:ext>
+            <a:ext uri="{91240B29-F687-4f45-9708-019B960494DF}">
+              <a14:hiddenLine xmlns:a14="http://schemas.microsoft.com/office/drawing/2010/main" w="9525">
+                <a:solidFill>
+                  <a:schemeClr val="tx1"/>
+                </a:solidFill>
+                <a:miter lim="800000"/>
+                <a:headEnd/>
+                <a:tailEnd/>
+              </a14:hiddenLine>
+            </a:ext>
+          </a:extLst>
+        </p:spPr>
+      </p:pic>
+      <p:sp>
+        <p:nvSpPr>
+          <p:cNvPr id="4" name="ZoneTexte 3"/>
+          <p:cNvSpPr txBox="1"/>
+          <p:nvPr/>
+        </p:nvSpPr>
+        <p:spPr>
+          <a:xfrm>
+            <a:off x="581782" y="1430448"/>
+            <a:ext cx="3395882" cy="461665"/>
+          </a:xfrm>
+          <a:prstGeom prst="rect">
+            <a:avLst/>
+          </a:prstGeom>
+          <a:noFill/>
+        </p:spPr>
+        <p:txBody>
+          <a:bodyPr wrap="none" rtlCol="0">
+            <a:spAutoFit/>
+          </a:bodyPr>
+          <a:lstStyle/>
+          <a:p>
+            <a:r>
+              <a:rPr lang="en-CA" sz="2400" dirty="0" err="1" smtClean="0"/>
+              <a:t>Méthode</a:t>
+            </a:r>
+            <a:r>
+              <a:rPr lang="en-CA" sz="2400" dirty="0" smtClean="0"/>
+              <a:t> par </a:t>
+            </a:r>
+            <a:r>
+              <a:rPr lang="en-CA" sz="2400" dirty="0" err="1" smtClean="0"/>
+              <a:t>Hystérésis</a:t>
+            </a:r>
+            <a:endParaRPr lang="fr-CA" sz="2400" dirty="0"/>
+          </a:p>
+        </p:txBody>
+      </p:sp>
+    </p:spTree>
+    <p:extLst>
+      <p:ext uri="{BB962C8B-B14F-4D97-AF65-F5344CB8AC3E}">
+        <p14:creationId xmlns:p14="http://schemas.microsoft.com/office/powerpoint/2010/main" val="2824389839"/>
+      </p:ext>
+    </p:extLst>
+  </p:cSld>
+  <p:clrMapOvr>
+    <a:masterClrMapping/>
+  </p:clrMapOvr>
+</p:sld>
+</file>
+
+<file path=ppt/slides/slide11.xml><?xml version="1.0" encoding="utf-8"?>
+<p:sld xmlns:a="http://schemas.openxmlformats.org/drawingml/2006/main" xmlns:r="http://schemas.openxmlformats.org/officeDocument/2006/relationships" xmlns:p="http://schemas.openxmlformats.org/presentationml/2006/main">
+  <p:cSld>
+    <p:spTree>
+      <p:nvGrpSpPr>
+        <p:cNvPr id="1" name=""/>
+        <p:cNvGrpSpPr/>
+        <p:nvPr/>
+      </p:nvGrpSpPr>
+      <p:grpSpPr>
+        <a:xfrm>
+          <a:off x="0" y="0"/>
+          <a:ext cx="0" cy="0"/>
+          <a:chOff x="0" y="0"/>
+          <a:chExt cx="0" cy="0"/>
+        </a:xfrm>
+      </p:grpSpPr>
+      <p:pic>
+        <p:nvPicPr>
+          <p:cNvPr id="3074" name="Picture 2"/>
+          <p:cNvPicPr>
+            <a:picLocks noChangeAspect="1" noChangeArrowheads="1"/>
+          </p:cNvPicPr>
+          <p:nvPr/>
+        </p:nvPicPr>
+        <p:blipFill>
+          <a:blip r:embed="rId2">
+            <a:extLst>
+              <a:ext uri="{28A0092B-C50C-407E-A947-70E740481C1C}">
+                <a14:useLocalDpi xmlns:a14="http://schemas.microsoft.com/office/drawing/2010/main" val="0"/>
+              </a:ext>
+            </a:extLst>
+          </a:blip>
+          <a:srcRect/>
+          <a:stretch>
+            <a:fillRect/>
+          </a:stretch>
+        </p:blipFill>
+        <p:spPr bwMode="auto">
+          <a:xfrm>
+            <a:off x="796018" y="1436915"/>
+            <a:ext cx="7292209" cy="4696506"/>
+          </a:xfrm>
+          <a:prstGeom prst="rect">
+            <a:avLst/>
+          </a:prstGeom>
+          <a:noFill/>
+          <a:ln>
+            <a:noFill/>
+          </a:ln>
+          <a:extLst>
+            <a:ext uri="{909E8E84-426E-40dd-AFC4-6F175D3DCCD1}">
+              <a14:hiddenFill xmlns:a14="http://schemas.microsoft.com/office/drawing/2010/main">
+                <a:solidFill>
+                  <a:schemeClr val="accent1"/>
+                </a:solidFill>
+              </a14:hiddenFill>
+            </a:ext>
+            <a:ext uri="{91240B29-F687-4f45-9708-019B960494DF}">
+              <a14:hiddenLine xmlns:a14="http://schemas.microsoft.com/office/drawing/2010/main" w="9525">
+                <a:solidFill>
+                  <a:schemeClr val="tx1"/>
+                </a:solidFill>
+                <a:miter lim="800000"/>
+                <a:headEnd/>
+                <a:tailEnd/>
+              </a14:hiddenLine>
+            </a:ext>
+          </a:extLst>
+        </p:spPr>
+      </p:pic>
+      <p:sp>
+        <p:nvSpPr>
+          <p:cNvPr id="5" name="Titre 1"/>
+          <p:cNvSpPr>
+            <a:spLocks noGrp="1"/>
+          </p:cNvSpPr>
+          <p:nvPr>
+            <p:ph type="title"/>
+          </p:nvPr>
+        </p:nvSpPr>
+        <p:spPr>
+          <a:xfrm>
+            <a:off x="508001" y="609600"/>
+            <a:ext cx="6447501" cy="1320800"/>
+          </a:xfrm>
+        </p:spPr>
+        <p:txBody>
+          <a:bodyPr>
+            <a:normAutofit fontScale="90000"/>
+          </a:bodyPr>
+          <a:lstStyle/>
+          <a:p>
+            <a:r>
+              <a:rPr lang="en-CA" dirty="0" err="1" smtClean="0"/>
+              <a:t>Signaux</a:t>
+            </a:r>
+            <a:r>
+              <a:rPr lang="en-CA" dirty="0" smtClean="0"/>
+              <a:t> de </a:t>
+            </a:r>
+            <a:r>
+              <a:rPr lang="en-CA" dirty="0" err="1" smtClean="0"/>
+              <a:t>commande</a:t>
+            </a:r>
+            <a:r>
+              <a:rPr lang="en-CA" dirty="0" smtClean="0"/>
+              <a:t> d’un bras</a:t>
+            </a:r>
+            <a:br>
+              <a:rPr lang="en-CA" dirty="0" smtClean="0"/>
+            </a:br>
+            <a:r>
+              <a:rPr lang="en-CA" dirty="0"/>
+              <a:t>	</a:t>
+            </a:r>
+            <a:endParaRPr lang="fr-CA" dirty="0"/>
+          </a:p>
+        </p:txBody>
+      </p:sp>
+    </p:spTree>
+    <p:extLst>
+      <p:ext uri="{BB962C8B-B14F-4D97-AF65-F5344CB8AC3E}">
+        <p14:creationId xmlns:p14="http://schemas.microsoft.com/office/powerpoint/2010/main" val="1593277952"/>
+      </p:ext>
+    </p:extLst>
+  </p:cSld>
+  <p:clrMapOvr>
+    <a:masterClrMapping/>
+  </p:clrMapOvr>
+</p:sld>
+</file>
+
+<file path=ppt/slides/slide12.xml><?xml version="1.0" encoding="utf-8"?>
+<p:sld xmlns:a="http://schemas.openxmlformats.org/drawingml/2006/main" xmlns:r="http://schemas.openxmlformats.org/officeDocument/2006/relationships" xmlns:p="http://schemas.openxmlformats.org/presentationml/2006/main">
+  <p:cSld>
+    <p:spTree>
+      <p:nvGrpSpPr>
+        <p:cNvPr id="1" name=""/>
+        <p:cNvGrpSpPr/>
+        <p:nvPr/>
+      </p:nvGrpSpPr>
+      <p:grpSpPr>
+        <a:xfrm>
+          <a:off x="0" y="0"/>
+          <a:ext cx="0" cy="0"/>
+          <a:chOff x="0" y="0"/>
+          <a:chExt cx="0" cy="0"/>
+        </a:xfrm>
+      </p:grpSpPr>
+      <p:sp>
+        <p:nvSpPr>
+          <p:cNvPr id="2" name="Titre 1"/>
+          <p:cNvSpPr>
+            <a:spLocks noGrp="1"/>
+          </p:cNvSpPr>
+          <p:nvPr>
+            <p:ph type="title"/>
+          </p:nvPr>
+        </p:nvSpPr>
+        <p:spPr>
+          <a:xfrm>
+            <a:off x="491068" y="0"/>
+            <a:ext cx="6447501" cy="1320800"/>
+          </a:xfrm>
+        </p:spPr>
+        <p:txBody>
+          <a:bodyPr/>
+          <a:lstStyle/>
+          <a:p>
+            <a:r>
+              <a:rPr lang="fr-CA" dirty="0" smtClean="0"/>
+              <a:t>Forme du courant et de la tension en sortie de l’AFE</a:t>
+            </a:r>
+            <a:endParaRPr lang="fr-CA" dirty="0"/>
+          </a:p>
+        </p:txBody>
+      </p:sp>
+      <p:pic>
+        <p:nvPicPr>
+          <p:cNvPr id="4098" name="Picture 2"/>
+          <p:cNvPicPr>
+            <a:picLocks noChangeAspect="1" noChangeArrowheads="1"/>
+          </p:cNvPicPr>
+          <p:nvPr/>
+        </p:nvPicPr>
+        <p:blipFill>
+          <a:blip r:embed="rId2">
+            <a:extLst>
+              <a:ext uri="{28A0092B-C50C-407E-A947-70E740481C1C}">
+                <a14:useLocalDpi xmlns:a14="http://schemas.microsoft.com/office/drawing/2010/main" val="0"/>
+              </a:ext>
+            </a:extLst>
+          </a:blip>
+          <a:srcRect/>
+          <a:stretch>
+            <a:fillRect/>
+          </a:stretch>
+        </p:blipFill>
+        <p:spPr bwMode="auto">
+          <a:xfrm>
+            <a:off x="1390649" y="1220982"/>
+            <a:ext cx="6545035" cy="5520595"/>
+          </a:xfrm>
+          <a:prstGeom prst="rect">
+            <a:avLst/>
+          </a:prstGeom>
+          <a:noFill/>
+          <a:ln>
+            <a:noFill/>
+          </a:ln>
+          <a:extLst>
+            <a:ext uri="{909E8E84-426E-40dd-AFC4-6F175D3DCCD1}">
+              <a14:hiddenFill xmlns:a14="http://schemas.microsoft.com/office/drawing/2010/main">
+                <a:solidFill>
+                  <a:schemeClr val="accent1"/>
+                </a:solidFill>
+              </a14:hiddenFill>
+            </a:ext>
+            <a:ext uri="{91240B29-F687-4f45-9708-019B960494DF}">
+              <a14:hiddenLine xmlns:a14="http://schemas.microsoft.com/office/drawing/2010/main" w="9525">
+                <a:solidFill>
+                  <a:schemeClr val="tx1"/>
+                </a:solidFill>
+                <a:miter lim="800000"/>
+                <a:headEnd/>
+                <a:tailEnd/>
+              </a14:hiddenLine>
+            </a:ext>
+          </a:extLst>
+        </p:spPr>
+      </p:pic>
+    </p:spTree>
+    <p:extLst>
+      <p:ext uri="{BB962C8B-B14F-4D97-AF65-F5344CB8AC3E}">
+        <p14:creationId xmlns:p14="http://schemas.microsoft.com/office/powerpoint/2010/main" val="2758930811"/>
+      </p:ext>
+    </p:extLst>
+  </p:cSld>
+  <p:clrMapOvr>
+    <a:masterClrMapping/>
+  </p:clrMapOvr>
+</p:sld>
+</file>
+
+<file path=ppt/slides/slide13.xml><?xml version="1.0" encoding="utf-8"?>
+<p:sld xmlns:a="http://schemas.openxmlformats.org/drawingml/2006/main" xmlns:r="http://schemas.openxmlformats.org/officeDocument/2006/relationships" xmlns:p="http://schemas.openxmlformats.org/presentationml/2006/main">
+  <p:cSld>
+    <p:spTree>
+      <p:nvGrpSpPr>
+        <p:cNvPr id="1" name=""/>
+        <p:cNvGrpSpPr/>
+        <p:nvPr/>
+      </p:nvGrpSpPr>
+      <p:grpSpPr>
+        <a:xfrm>
+          <a:off x="0" y="0"/>
+          <a:ext cx="0" cy="0"/>
+          <a:chOff x="0" y="0"/>
+          <a:chExt cx="0" cy="0"/>
+        </a:xfrm>
+      </p:grpSpPr>
+      <p:sp>
+        <p:nvSpPr>
+          <p:cNvPr id="2" name="Titre 1"/>
+          <p:cNvSpPr>
+            <a:spLocks noGrp="1"/>
+          </p:cNvSpPr>
+          <p:nvPr>
+            <p:ph type="title"/>
+          </p:nvPr>
+        </p:nvSpPr>
+        <p:spPr>
+          <a:xfrm>
+            <a:off x="491067" y="254000"/>
+            <a:ext cx="7552266" cy="1320800"/>
+          </a:xfrm>
+        </p:spPr>
+        <p:txBody>
+          <a:bodyPr/>
+          <a:lstStyle/>
+          <a:p>
+            <a:r>
+              <a:rPr lang="en-CA" dirty="0" smtClean="0"/>
+              <a:t>Simulation </a:t>
+            </a:r>
+            <a:r>
+              <a:rPr lang="en-CA" dirty="0" err="1" smtClean="0"/>
+              <a:t>sur</a:t>
+            </a:r>
+            <a:r>
+              <a:rPr lang="en-CA" dirty="0" smtClean="0"/>
+              <a:t> </a:t>
+            </a:r>
+            <a:r>
+              <a:rPr lang="en-CA" dirty="0" err="1" smtClean="0"/>
+              <a:t>Matlab</a:t>
+            </a:r>
+            <a:r>
+              <a:rPr lang="en-CA" dirty="0" smtClean="0"/>
+              <a:t>: </a:t>
+            </a:r>
+            <a:r>
+              <a:rPr lang="en-CA" dirty="0" err="1" smtClean="0"/>
               <a:t>DCp</a:t>
             </a:r>
             <a:r>
               <a:rPr lang="en-CA" dirty="0" smtClean="0"/>
-              <a:t> et </a:t>
+              <a:t> </a:t>
+            </a:r>
+            <a:r>
+              <a:rPr lang="en-CA" dirty="0" smtClean="0"/>
+              <a:t>et </a:t>
             </a:r>
             <a:r>
               <a:rPr lang="en-CA" dirty="0" err="1" smtClean="0"/>
               <a:t>DCn</a:t>
+            </a:r>
+            <a:r>
+              <a:rPr lang="en-CA" dirty="0" smtClean="0"/>
+              <a:t> (</a:t>
+            </a:r>
+            <a:r>
+              <a:rPr lang="en-CA" dirty="0" err="1" smtClean="0"/>
+              <a:t>Vue</a:t>
+            </a:r>
+            <a:r>
+              <a:rPr lang="en-CA" dirty="0" smtClean="0"/>
+              <a:t> </a:t>
+            </a:r>
+            <a:r>
+              <a:rPr lang="en-CA" dirty="0" err="1" smtClean="0"/>
+              <a:t>d’ensemble</a:t>
+            </a:r>
+            <a:r>
+              <a:rPr lang="en-CA" dirty="0" smtClean="0"/>
+              <a:t>)</a:t>
             </a:r>
             <a:endParaRPr lang="fr-CA" dirty="0"/>
           </a:p>
@@ -7009,7 +7497,7 @@
 </p:sld>
 </file>
 
-<file path=ppt/slides/slide11.xml><?xml version="1.0" encoding="utf-8"?>
+<file path=ppt/slides/slide14.xml><?xml version="1.0" encoding="utf-8"?>
 <p:sld xmlns:a="http://schemas.openxmlformats.org/drawingml/2006/main" xmlns:r="http://schemas.openxmlformats.org/officeDocument/2006/relationships" xmlns:p="http://schemas.openxmlformats.org/presentationml/2006/main">
   <p:cSld>
     <p:spTree>
@@ -7036,12 +7524,41 @@
             <p:ph type="title"/>
           </p:nvPr>
         </p:nvSpPr>
-        <p:spPr/>
+        <p:spPr>
+          <a:xfrm>
+            <a:off x="508001" y="609600"/>
+            <a:ext cx="7907866" cy="1320800"/>
+          </a:xfrm>
+        </p:spPr>
         <p:txBody>
           <a:bodyPr/>
           <a:lstStyle/>
           <a:p>
-            <a:endParaRPr lang="fr-CA"/>
+            <a:r>
+              <a:rPr lang="fr-CA" dirty="0" smtClean="0"/>
+              <a:t>Simulation </a:t>
+            </a:r>
+            <a:r>
+              <a:rPr lang="fr-CA" dirty="0" err="1" smtClean="0"/>
+              <a:t>Matlab</a:t>
+            </a:r>
+            <a:r>
+              <a:rPr lang="fr-CA" dirty="0" smtClean="0"/>
+              <a:t>: Blocs onduleurs </a:t>
+            </a:r>
+            <a:r>
+              <a:rPr lang="fr-CA" dirty="0" err="1" smtClean="0"/>
+              <a:t>DCp</a:t>
+            </a:r>
+            <a:r>
+              <a:rPr lang="fr-CA" dirty="0" smtClean="0"/>
+              <a:t>, </a:t>
+            </a:r>
+            <a:r>
+              <a:rPr lang="fr-CA" dirty="0" err="1" smtClean="0"/>
+              <a:t>DCn</a:t>
+            </a:r>
+            <a:endParaRPr lang="fr-CA" dirty="0"/>
           </a:p>
         </p:txBody>
       </p:sp>
@@ -7131,7 +7648,7 @@
 </p:sld>
 </file>
 
-<file path=ppt/slides/slide12.xml><?xml version="1.0" encoding="utf-8"?>
+<file path=ppt/slides/slide15.xml><?xml version="1.0" encoding="utf-8"?>
 <p:sld xmlns:a="http://schemas.openxmlformats.org/drawingml/2006/main" xmlns:r="http://schemas.openxmlformats.org/officeDocument/2006/relationships" xmlns:p="http://schemas.openxmlformats.org/presentationml/2006/main">
   <p:cSld>
     <p:spTree>
@@ -7161,7 +7678,7 @@
         <p:spPr>
           <a:xfrm>
             <a:off x="573315" y="412957"/>
-            <a:ext cx="6447501" cy="1320800"/>
+            <a:ext cx="7317618" cy="1320800"/>
           </a:xfrm>
         </p:spPr>
         <p:txBody>
@@ -7177,15 +7694,19 @@
               <a:t> </a:t>
             </a:r>
             <a:r>
-              <a:rPr lang="en-CA" dirty="0" err="1"/>
+              <a:rPr lang="en-CA" dirty="0" smtClean="0"/>
+              <a:t>des blocs </a:t>
+            </a:r>
+            <a:r>
+              <a:rPr lang="en-CA" dirty="0" err="1" smtClean="0"/>
               <a:t>DCp</a:t>
             </a:r>
             <a:r>
-              <a:rPr lang="en-CA" dirty="0"/>
-              <a:t> et </a:t>
-            </a:r>
-            <a:r>
-              <a:rPr lang="en-CA" dirty="0" err="1"/>
+              <a:rPr lang="en-CA" dirty="0" smtClean="0"/>
+              <a:t>, </a:t>
+            </a:r>
+            <a:r>
+              <a:rPr lang="en-CA" dirty="0" err="1" smtClean="0"/>
               <a:t>DCn</a:t>
             </a:r>
             <a:endParaRPr lang="fr-CA" dirty="0"/>
@@ -7278,7 +7799,7 @@
 </p:sld>
 </file>
 
-<file path=ppt/slides/slide13.xml><?xml version="1.0" encoding="utf-8"?>
+<file path=ppt/slides/slide16.xml><?xml version="1.0" encoding="utf-8"?>
 <p:sld xmlns:a="http://schemas.openxmlformats.org/drawingml/2006/main" xmlns:r="http://schemas.openxmlformats.org/officeDocument/2006/relationships" xmlns:p="http://schemas.openxmlformats.org/presentationml/2006/main">
   <p:cSld>
     <p:spTree>
@@ -7305,12 +7826,21 @@
             <p:ph type="title"/>
           </p:nvPr>
         </p:nvSpPr>
-        <p:spPr/>
+        <p:spPr>
+          <a:xfrm>
+            <a:off x="508001" y="287866"/>
+            <a:ext cx="6447501" cy="1320800"/>
+          </a:xfrm>
+        </p:spPr>
         <p:txBody>
           <a:bodyPr/>
           <a:lstStyle/>
           <a:p>
-            <a:endParaRPr lang="fr-CA"/>
+            <a:r>
+              <a:rPr lang="fr-CA" dirty="0" smtClean="0"/>
+              <a:t>Forme des courants et de la tension à la charge</a:t>
+            </a:r>
+            <a:endParaRPr lang="fr-CA" dirty="0"/>
           </a:p>
         </p:txBody>
       </p:sp>
@@ -7356,7 +7886,7 @@
         </p:blipFill>
         <p:spPr bwMode="auto">
           <a:xfrm>
-            <a:off x="244109" y="1371600"/>
+            <a:off x="277976" y="1794934"/>
             <a:ext cx="8997861" cy="4467223"/>
           </a:xfrm>
           <a:prstGeom prst="rect">
@@ -7400,309 +7930,6 @@
 </p:sld>
 </file>
 
-<file path=ppt/slides/slide14.xml><?xml version="1.0" encoding="utf-8"?>
-<p:sld xmlns:a="http://schemas.openxmlformats.org/drawingml/2006/main" xmlns:r="http://schemas.openxmlformats.org/officeDocument/2006/relationships" xmlns:p="http://schemas.openxmlformats.org/presentationml/2006/main">
-  <p:cSld>
-    <p:spTree>
-      <p:nvGrpSpPr>
-        <p:cNvPr id="1" name=""/>
-        <p:cNvGrpSpPr/>
-        <p:nvPr/>
-      </p:nvGrpSpPr>
-      <p:grpSpPr>
-        <a:xfrm>
-          <a:off x="0" y="0"/>
-          <a:ext cx="0" cy="0"/>
-          <a:chOff x="0" y="0"/>
-          <a:chExt cx="0" cy="0"/>
-        </a:xfrm>
-      </p:grpSpPr>
-      <p:sp>
-        <p:nvSpPr>
-          <p:cNvPr id="2" name="Titre 1"/>
-          <p:cNvSpPr>
-            <a:spLocks noGrp="1"/>
-          </p:cNvSpPr>
-          <p:nvPr>
-            <p:ph type="title"/>
-          </p:nvPr>
-        </p:nvSpPr>
-        <p:spPr/>
-        <p:txBody>
-          <a:bodyPr/>
-          <a:lstStyle/>
-          <a:p>
-            <a:r>
-              <a:rPr lang="en-CA" dirty="0" smtClean="0"/>
-              <a:t>Simulation </a:t>
-            </a:r>
-            <a:r>
-              <a:rPr lang="en-CA" dirty="0" err="1" smtClean="0"/>
-              <a:t>sur</a:t>
-            </a:r>
-            <a:r>
-              <a:rPr lang="en-CA" dirty="0" smtClean="0"/>
-              <a:t> </a:t>
-            </a:r>
-            <a:r>
-              <a:rPr lang="en-CA" dirty="0" err="1" smtClean="0"/>
-              <a:t>Psim</a:t>
-            </a:r>
-            <a:endParaRPr lang="fr-CA" dirty="0"/>
-          </a:p>
-        </p:txBody>
-      </p:sp>
-      <p:sp>
-        <p:nvSpPr>
-          <p:cNvPr id="3" name="Espace réservé du contenu 2"/>
-          <p:cNvSpPr>
-            <a:spLocks noGrp="1"/>
-          </p:cNvSpPr>
-          <p:nvPr>
-            <p:ph idx="1"/>
-          </p:nvPr>
-        </p:nvSpPr>
-        <p:spPr/>
-        <p:txBody>
-          <a:bodyPr/>
-          <a:lstStyle/>
-          <a:p>
-            <a:endParaRPr lang="fr-CA" dirty="0"/>
-          </a:p>
-        </p:txBody>
-      </p:sp>
-    </p:spTree>
-    <p:extLst>
-      <p:ext uri="{BB962C8B-B14F-4D97-AF65-F5344CB8AC3E}">
-        <p14:creationId xmlns:p14="http://schemas.microsoft.com/office/powerpoint/2010/main" val="671985873"/>
-      </p:ext>
-    </p:extLst>
-  </p:cSld>
-  <p:clrMapOvr>
-    <a:masterClrMapping/>
-  </p:clrMapOvr>
-</p:sld>
-</file>
-
-<file path=ppt/slides/slide15.xml><?xml version="1.0" encoding="utf-8"?>
-<p:sld xmlns:a="http://schemas.openxmlformats.org/drawingml/2006/main" xmlns:r="http://schemas.openxmlformats.org/officeDocument/2006/relationships" xmlns:p="http://schemas.openxmlformats.org/presentationml/2006/main">
-  <p:cSld>
-    <p:spTree>
-      <p:nvGrpSpPr>
-        <p:cNvPr id="1" name=""/>
-        <p:cNvGrpSpPr/>
-        <p:nvPr/>
-      </p:nvGrpSpPr>
-      <p:grpSpPr>
-        <a:xfrm>
-          <a:off x="0" y="0"/>
-          <a:ext cx="0" cy="0"/>
-          <a:chOff x="0" y="0"/>
-          <a:chExt cx="0" cy="0"/>
-        </a:xfrm>
-      </p:grpSpPr>
-      <p:sp>
-        <p:nvSpPr>
-          <p:cNvPr id="2" name="Titre 1"/>
-          <p:cNvSpPr>
-            <a:spLocks noGrp="1"/>
-          </p:cNvSpPr>
-          <p:nvPr>
-            <p:ph type="title"/>
-          </p:nvPr>
-        </p:nvSpPr>
-        <p:spPr/>
-        <p:txBody>
-          <a:bodyPr/>
-          <a:lstStyle/>
-          <a:p>
-            <a:r>
-              <a:rPr lang="en-CA" dirty="0" smtClean="0"/>
-              <a:t>Simulation </a:t>
-            </a:r>
-            <a:r>
-              <a:rPr lang="en-CA" dirty="0" err="1" smtClean="0"/>
-              <a:t>sur</a:t>
-            </a:r>
-            <a:r>
-              <a:rPr lang="en-CA" dirty="0" smtClean="0"/>
-              <a:t> le </a:t>
-            </a:r>
-            <a:r>
-              <a:rPr lang="en-CA" dirty="0" err="1" smtClean="0"/>
-              <a:t>simulateur</a:t>
-            </a:r>
-            <a:r>
-              <a:rPr lang="en-CA" dirty="0" smtClean="0"/>
-              <a:t> à temps </a:t>
-            </a:r>
-            <a:r>
-              <a:rPr lang="en-CA" dirty="0" err="1" smtClean="0"/>
-              <a:t>réel</a:t>
-            </a:r>
-            <a:endParaRPr lang="fr-CA" dirty="0"/>
-          </a:p>
-        </p:txBody>
-      </p:sp>
-      <p:sp>
-        <p:nvSpPr>
-          <p:cNvPr id="3" name="Espace réservé du contenu 2"/>
-          <p:cNvSpPr>
-            <a:spLocks noGrp="1"/>
-          </p:cNvSpPr>
-          <p:nvPr>
-            <p:ph idx="1"/>
-          </p:nvPr>
-        </p:nvSpPr>
-        <p:spPr/>
-        <p:txBody>
-          <a:bodyPr/>
-          <a:lstStyle/>
-          <a:p>
-            <a:r>
-              <a:rPr lang="en-CA" dirty="0" smtClean="0"/>
-              <a:t>Importation par le </a:t>
-            </a:r>
-            <a:r>
-              <a:rPr lang="en-CA" dirty="0" err="1" smtClean="0"/>
-              <a:t>fichier</a:t>
-            </a:r>
-            <a:r>
-              <a:rPr lang="en-CA" dirty="0" smtClean="0"/>
-              <a:t> </a:t>
-            </a:r>
-            <a:r>
-              <a:rPr lang="en-CA" dirty="0" err="1" smtClean="0"/>
-              <a:t>schéma</a:t>
-            </a:r>
-            <a:r>
-              <a:rPr lang="en-CA" dirty="0" smtClean="0"/>
-              <a:t> de </a:t>
-            </a:r>
-            <a:r>
-              <a:rPr lang="en-CA" dirty="0" err="1" smtClean="0"/>
-              <a:t>matlab</a:t>
-            </a:r>
-            <a:endParaRPr lang="en-CA" dirty="0" smtClean="0"/>
-          </a:p>
-        </p:txBody>
-      </p:sp>
-    </p:spTree>
-    <p:extLst>
-      <p:ext uri="{BB962C8B-B14F-4D97-AF65-F5344CB8AC3E}">
-        <p14:creationId xmlns:p14="http://schemas.microsoft.com/office/powerpoint/2010/main" val="1607936371"/>
-      </p:ext>
-    </p:extLst>
-  </p:cSld>
-  <p:clrMapOvr>
-    <a:masterClrMapping/>
-  </p:clrMapOvr>
-</p:sld>
-</file>
-
-<file path=ppt/slides/slide16.xml><?xml version="1.0" encoding="utf-8"?>
-<p:sld xmlns:a="http://schemas.openxmlformats.org/drawingml/2006/main" xmlns:r="http://schemas.openxmlformats.org/officeDocument/2006/relationships" xmlns:p="http://schemas.openxmlformats.org/presentationml/2006/main">
-  <p:cSld>
-    <p:spTree>
-      <p:nvGrpSpPr>
-        <p:cNvPr id="1" name=""/>
-        <p:cNvGrpSpPr/>
-        <p:nvPr/>
-      </p:nvGrpSpPr>
-      <p:grpSpPr>
-        <a:xfrm>
-          <a:off x="0" y="0"/>
-          <a:ext cx="0" cy="0"/>
-          <a:chOff x="0" y="0"/>
-          <a:chExt cx="0" cy="0"/>
-        </a:xfrm>
-      </p:grpSpPr>
-      <p:sp>
-        <p:nvSpPr>
-          <p:cNvPr id="2" name="Title 1"/>
-          <p:cNvSpPr>
-            <a:spLocks noGrp="1"/>
-          </p:cNvSpPr>
-          <p:nvPr>
-            <p:ph type="ctrTitle"/>
-          </p:nvPr>
-        </p:nvSpPr>
-        <p:spPr/>
-        <p:txBody>
-          <a:bodyPr/>
-          <a:lstStyle/>
-          <a:p>
-            <a:r>
-              <a:rPr lang="fr-CA" dirty="0" smtClean="0"/>
-              <a:t>étude de faisabilité de la liaison entre </a:t>
-            </a:r>
-            <a:r>
-              <a:rPr lang="fr-CA" dirty="0" err="1" smtClean="0"/>
-              <a:t>psim</a:t>
-            </a:r>
-            <a:r>
-              <a:rPr lang="fr-CA" dirty="0" smtClean="0"/>
-              <a:t> et Excel</a:t>
-            </a:r>
-            <a:endParaRPr lang="fr-CA" dirty="0"/>
-          </a:p>
-        </p:txBody>
-      </p:sp>
-      <p:sp>
-        <p:nvSpPr>
-          <p:cNvPr id="3" name="Subtitle 2"/>
-          <p:cNvSpPr>
-            <a:spLocks noGrp="1"/>
-          </p:cNvSpPr>
-          <p:nvPr>
-            <p:ph type="subTitle" idx="1"/>
-          </p:nvPr>
-        </p:nvSpPr>
-        <p:spPr/>
-        <p:txBody>
-          <a:bodyPr/>
-          <a:lstStyle/>
-          <a:p>
-            <a:r>
-              <a:rPr lang="fr-CA" dirty="0" smtClean="0"/>
-              <a:t>Tests préliminaires pour vérifier la faisabilité et l’efficacité de la liaison entre </a:t>
-            </a:r>
-            <a:r>
-              <a:rPr lang="fr-CA" dirty="0" err="1" smtClean="0"/>
-              <a:t>Psim</a:t>
-            </a:r>
-            <a:r>
-              <a:rPr lang="fr-CA" dirty="0" smtClean="0"/>
-              <a:t> et Excel.</a:t>
-            </a:r>
-          </a:p>
-          <a:p>
-            <a:pPr algn="l"/>
-            <a:r>
-              <a:rPr lang="en-CA" b="1" dirty="0" smtClean="0"/>
-              <a:t>Informations </a:t>
-            </a:r>
-            <a:r>
-              <a:rPr lang="en-CA" b="1" dirty="0" err="1" smtClean="0"/>
-              <a:t>supplémentaires</a:t>
-            </a:r>
-            <a:endParaRPr lang="fr-CA" b="1" dirty="0"/>
-          </a:p>
-        </p:txBody>
-      </p:sp>
-    </p:spTree>
-    <p:extLst>
-      <p:ext uri="{BB962C8B-B14F-4D97-AF65-F5344CB8AC3E}">
-        <p14:creationId xmlns:p14="http://schemas.microsoft.com/office/powerpoint/2010/main" val="2400563645"/>
-      </p:ext>
-    </p:extLst>
-  </p:cSld>
-  <p:clrMapOvr>
-    <a:masterClrMapping/>
-  </p:clrMapOvr>
-</p:sld>
-</file>
-
 <file path=ppt/slides/slide17.xml><?xml version="1.0" encoding="utf-8"?>
 <p:sld xmlns:a="http://schemas.openxmlformats.org/drawingml/2006/main" xmlns:r="http://schemas.openxmlformats.org/officeDocument/2006/relationships" xmlns:p="http://schemas.openxmlformats.org/presentationml/2006/main">
   <p:cSld>
@@ -7722,7 +7949,7 @@
       </p:grpSpPr>
       <p:sp>
         <p:nvSpPr>
-          <p:cNvPr id="2" name="Title 1"/>
+          <p:cNvPr id="2" name="Titre 1"/>
           <p:cNvSpPr>
             <a:spLocks noGrp="1"/>
           </p:cNvSpPr>
@@ -7732,7 +7959,940 @@
         </p:nvSpPr>
         <p:spPr>
           <a:xfrm>
-            <a:off x="854900" y="3756882"/>
+            <a:off x="508001" y="355600"/>
+            <a:ext cx="6447501" cy="1320800"/>
+          </a:xfrm>
+        </p:spPr>
+        <p:txBody>
+          <a:bodyPr/>
+          <a:lstStyle/>
+          <a:p>
+            <a:r>
+              <a:rPr lang="en-CA" dirty="0" smtClean="0"/>
+              <a:t>Simulation </a:t>
+            </a:r>
+            <a:r>
+              <a:rPr lang="en-CA" dirty="0" err="1" smtClean="0"/>
+              <a:t>sur</a:t>
+            </a:r>
+            <a:r>
+              <a:rPr lang="en-CA" dirty="0" smtClean="0"/>
+              <a:t> </a:t>
+            </a:r>
+            <a:r>
+              <a:rPr lang="en-CA" dirty="0" err="1" smtClean="0"/>
+              <a:t>Psim</a:t>
+            </a:r>
+            <a:r>
+              <a:rPr lang="en-CA" dirty="0" smtClean="0"/>
+              <a:t>: AFE (</a:t>
+            </a:r>
+            <a:r>
+              <a:rPr lang="en-CA" dirty="0" err="1" smtClean="0"/>
+              <a:t>Vue</a:t>
+            </a:r>
+            <a:r>
+              <a:rPr lang="en-CA" dirty="0" smtClean="0"/>
+              <a:t> </a:t>
+            </a:r>
+            <a:r>
+              <a:rPr lang="en-CA" dirty="0" err="1" smtClean="0"/>
+              <a:t>d’ensemble</a:t>
+            </a:r>
+            <a:r>
+              <a:rPr lang="en-CA" dirty="0" smtClean="0"/>
+              <a:t>)</a:t>
+            </a:r>
+            <a:endParaRPr lang="fr-CA" dirty="0"/>
+          </a:p>
+        </p:txBody>
+      </p:sp>
+      <p:pic>
+        <p:nvPicPr>
+          <p:cNvPr id="4" name="Picture 3" descr="Screen Shot 2014-02-19 at 2.17.06 PM.png"/>
+          <p:cNvPicPr>
+            <a:picLocks noChangeAspect="1"/>
+          </p:cNvPicPr>
+          <p:nvPr/>
+        </p:nvPicPr>
+        <p:blipFill>
+          <a:blip r:embed="rId2">
+            <a:extLst>
+              <a:ext uri="{28A0092B-C50C-407E-A947-70E740481C1C}">
+                <a14:useLocalDpi xmlns:a14="http://schemas.microsoft.com/office/drawing/2010/main" val="0"/>
+              </a:ext>
+            </a:extLst>
+          </a:blip>
+          <a:stretch>
+            <a:fillRect/>
+          </a:stretch>
+        </p:blipFill>
+        <p:spPr>
+          <a:xfrm>
+            <a:off x="541867" y="1549400"/>
+            <a:ext cx="7605002" cy="5054600"/>
+          </a:xfrm>
+          <a:prstGeom prst="rect">
+            <a:avLst/>
+          </a:prstGeom>
+        </p:spPr>
+      </p:pic>
+    </p:spTree>
+    <p:extLst>
+      <p:ext uri="{BB962C8B-B14F-4D97-AF65-F5344CB8AC3E}">
+        <p14:creationId xmlns:p14="http://schemas.microsoft.com/office/powerpoint/2010/main" val="671985873"/>
+      </p:ext>
+    </p:extLst>
+  </p:cSld>
+  <p:clrMapOvr>
+    <a:masterClrMapping/>
+  </p:clrMapOvr>
+</p:sld>
+</file>
+
+<file path=ppt/slides/slide18.xml><?xml version="1.0" encoding="utf-8"?>
+<p:sld xmlns:a="http://schemas.openxmlformats.org/drawingml/2006/main" xmlns:r="http://schemas.openxmlformats.org/officeDocument/2006/relationships" xmlns:p="http://schemas.openxmlformats.org/presentationml/2006/main">
+  <p:cSld>
+    <p:spTree>
+      <p:nvGrpSpPr>
+        <p:cNvPr id="1" name=""/>
+        <p:cNvGrpSpPr/>
+        <p:nvPr/>
+      </p:nvGrpSpPr>
+      <p:grpSpPr>
+        <a:xfrm>
+          <a:off x="0" y="0"/>
+          <a:ext cx="0" cy="0"/>
+          <a:chOff x="0" y="0"/>
+          <a:chExt cx="0" cy="0"/>
+        </a:xfrm>
+      </p:grpSpPr>
+      <p:sp>
+        <p:nvSpPr>
+          <p:cNvPr id="2" name="Titre 1"/>
+          <p:cNvSpPr>
+            <a:spLocks noGrp="1"/>
+          </p:cNvSpPr>
+          <p:nvPr>
+            <p:ph type="title"/>
+          </p:nvPr>
+        </p:nvSpPr>
+        <p:spPr>
+          <a:xfrm>
+            <a:off x="508001" y="355600"/>
+            <a:ext cx="6447501" cy="1320800"/>
+          </a:xfrm>
+        </p:spPr>
+        <p:txBody>
+          <a:bodyPr>
+            <a:normAutofit/>
+          </a:bodyPr>
+          <a:lstStyle/>
+          <a:p>
+            <a:r>
+              <a:rPr lang="en-CA" dirty="0" err="1" smtClean="0"/>
+              <a:t>Commande</a:t>
+            </a:r>
+            <a:r>
+              <a:rPr lang="en-CA" dirty="0" smtClean="0"/>
+              <a:t> de </a:t>
+            </a:r>
+            <a:r>
+              <a:rPr lang="en-CA" dirty="0" err="1" smtClean="0"/>
+              <a:t>l’AFE</a:t>
+            </a:r>
+            <a:endParaRPr lang="fr-CA" dirty="0"/>
+          </a:p>
+        </p:txBody>
+      </p:sp>
+      <p:pic>
+        <p:nvPicPr>
+          <p:cNvPr id="3" name="Picture 2" descr="Screen Shot 2014-02-19 at 2.19.06 PM.png"/>
+          <p:cNvPicPr>
+            <a:picLocks noChangeAspect="1"/>
+          </p:cNvPicPr>
+          <p:nvPr/>
+        </p:nvPicPr>
+        <p:blipFill>
+          <a:blip r:embed="rId2">
+            <a:extLst>
+              <a:ext uri="{28A0092B-C50C-407E-A947-70E740481C1C}">
+                <a14:useLocalDpi xmlns:a14="http://schemas.microsoft.com/office/drawing/2010/main" val="0"/>
+              </a:ext>
+            </a:extLst>
+          </a:blip>
+          <a:stretch>
+            <a:fillRect/>
+          </a:stretch>
+        </p:blipFill>
+        <p:spPr>
+          <a:xfrm>
+            <a:off x="1976967" y="1269998"/>
+            <a:ext cx="4940663" cy="5012267"/>
+          </a:xfrm>
+          <a:prstGeom prst="rect">
+            <a:avLst/>
+          </a:prstGeom>
+        </p:spPr>
+      </p:pic>
+    </p:spTree>
+    <p:extLst>
+      <p:ext uri="{BB962C8B-B14F-4D97-AF65-F5344CB8AC3E}">
+        <p14:creationId xmlns:p14="http://schemas.microsoft.com/office/powerpoint/2010/main" val="1440086085"/>
+      </p:ext>
+    </p:extLst>
+  </p:cSld>
+  <p:clrMapOvr>
+    <a:masterClrMapping/>
+  </p:clrMapOvr>
+</p:sld>
+</file>
+
+<file path=ppt/slides/slide19.xml><?xml version="1.0" encoding="utf-8"?>
+<p:sld xmlns:a="http://schemas.openxmlformats.org/drawingml/2006/main" xmlns:r="http://schemas.openxmlformats.org/officeDocument/2006/relationships" xmlns:p="http://schemas.openxmlformats.org/presentationml/2006/main">
+  <p:cSld>
+    <p:spTree>
+      <p:nvGrpSpPr>
+        <p:cNvPr id="1" name=""/>
+        <p:cNvGrpSpPr/>
+        <p:nvPr/>
+      </p:nvGrpSpPr>
+      <p:grpSpPr>
+        <a:xfrm>
+          <a:off x="0" y="0"/>
+          <a:ext cx="0" cy="0"/>
+          <a:chOff x="0" y="0"/>
+          <a:chExt cx="0" cy="0"/>
+        </a:xfrm>
+      </p:grpSpPr>
+      <p:sp>
+        <p:nvSpPr>
+          <p:cNvPr id="2" name="Titre 1"/>
+          <p:cNvSpPr>
+            <a:spLocks noGrp="1"/>
+          </p:cNvSpPr>
+          <p:nvPr>
+            <p:ph type="title"/>
+          </p:nvPr>
+        </p:nvSpPr>
+        <p:spPr>
+          <a:xfrm>
+            <a:off x="508001" y="355600"/>
+            <a:ext cx="6447501" cy="1320800"/>
+          </a:xfrm>
+        </p:spPr>
+        <p:txBody>
+          <a:bodyPr>
+            <a:normAutofit/>
+          </a:bodyPr>
+          <a:lstStyle/>
+          <a:p>
+            <a:r>
+              <a:rPr lang="en-CA" dirty="0" smtClean="0"/>
+              <a:t>Bloc de base (NPC 3 </a:t>
+            </a:r>
+            <a:r>
+              <a:rPr lang="en-CA" dirty="0" err="1" smtClean="0"/>
+              <a:t>niveaux</a:t>
+            </a:r>
+            <a:r>
+              <a:rPr lang="en-CA" dirty="0" smtClean="0"/>
+              <a:t>, </a:t>
+            </a:r>
+            <a:r>
+              <a:rPr lang="en-CA" dirty="0" err="1" smtClean="0"/>
+              <a:t>triphasé</a:t>
+            </a:r>
+            <a:r>
+              <a:rPr lang="en-CA" dirty="0" smtClean="0"/>
+              <a:t>) </a:t>
+            </a:r>
+            <a:r>
+              <a:rPr lang="en-CA" dirty="0" err="1" smtClean="0"/>
+              <a:t>implanté</a:t>
+            </a:r>
+            <a:r>
+              <a:rPr lang="en-CA" dirty="0" smtClean="0"/>
+              <a:t> sous </a:t>
+            </a:r>
+            <a:r>
+              <a:rPr lang="en-CA" dirty="0" err="1" smtClean="0"/>
+              <a:t>Psim</a:t>
+            </a:r>
+            <a:endParaRPr lang="fr-CA" dirty="0"/>
+          </a:p>
+        </p:txBody>
+      </p:sp>
+      <p:pic>
+        <p:nvPicPr>
+          <p:cNvPr id="4" name="Picture 3" descr="Screen Shot 2014-02-19 at 2.20.40 PM.png"/>
+          <p:cNvPicPr>
+            <a:picLocks noChangeAspect="1"/>
+          </p:cNvPicPr>
+          <p:nvPr/>
+        </p:nvPicPr>
+        <p:blipFill>
+          <a:blip r:embed="rId2">
+            <a:extLst>
+              <a:ext uri="{28A0092B-C50C-407E-A947-70E740481C1C}">
+                <a14:useLocalDpi xmlns:a14="http://schemas.microsoft.com/office/drawing/2010/main" val="0"/>
+              </a:ext>
+            </a:extLst>
+          </a:blip>
+          <a:stretch>
+            <a:fillRect/>
+          </a:stretch>
+        </p:blipFill>
+        <p:spPr>
+          <a:xfrm>
+            <a:off x="474133" y="1820333"/>
+            <a:ext cx="7704667" cy="4019423"/>
+          </a:xfrm>
+          <a:prstGeom prst="rect">
+            <a:avLst/>
+          </a:prstGeom>
+        </p:spPr>
+      </p:pic>
+    </p:spTree>
+    <p:extLst>
+      <p:ext uri="{BB962C8B-B14F-4D97-AF65-F5344CB8AC3E}">
+        <p14:creationId xmlns:p14="http://schemas.microsoft.com/office/powerpoint/2010/main" val="2706465647"/>
+      </p:ext>
+    </p:extLst>
+  </p:cSld>
+  <p:clrMapOvr>
+    <a:masterClrMapping/>
+  </p:clrMapOvr>
+</p:sld>
+</file>
+
+<file path=ppt/slides/slide2.xml><?xml version="1.0" encoding="utf-8"?>
+<p:sld xmlns:a="http://schemas.openxmlformats.org/drawingml/2006/main" xmlns:r="http://schemas.openxmlformats.org/officeDocument/2006/relationships" xmlns:p="http://schemas.openxmlformats.org/presentationml/2006/main">
+  <p:cSld>
+    <p:spTree>
+      <p:nvGrpSpPr>
+        <p:cNvPr id="1" name=""/>
+        <p:cNvGrpSpPr/>
+        <p:nvPr/>
+      </p:nvGrpSpPr>
+      <p:grpSpPr>
+        <a:xfrm>
+          <a:off x="0" y="0"/>
+          <a:ext cx="0" cy="0"/>
+          <a:chOff x="0" y="0"/>
+          <a:chExt cx="0" cy="0"/>
+        </a:xfrm>
+      </p:grpSpPr>
+      <p:pic>
+        <p:nvPicPr>
+          <p:cNvPr id="4" name="Picture 9" descr="CERN144"/>
+          <p:cNvPicPr>
+            <a:picLocks noChangeAspect="1" noChangeArrowheads="1"/>
+          </p:cNvPicPr>
+          <p:nvPr>
+            <p:custDataLst>
+              <p:tags r:id="rId1"/>
+            </p:custDataLst>
+          </p:nvPr>
+        </p:nvPicPr>
+        <p:blipFill>
+          <a:blip r:embed="rId7" cstate="print"/>
+          <a:srcRect/>
+          <a:stretch>
+            <a:fillRect/>
+          </a:stretch>
+        </p:blipFill>
+        <p:spPr bwMode="auto">
+          <a:xfrm>
+            <a:off x="1318618" y="4006477"/>
+            <a:ext cx="549029" cy="823839"/>
+          </a:xfrm>
+          <a:prstGeom prst="rect">
+            <a:avLst/>
+          </a:prstGeom>
+          <a:noFill/>
+          <a:ln w="9525">
+            <a:noFill/>
+            <a:miter lim="800000"/>
+            <a:headEnd/>
+            <a:tailEnd/>
+          </a:ln>
+        </p:spPr>
+      </p:pic>
+      <p:pic>
+        <p:nvPicPr>
+          <p:cNvPr id="5" name="Image 12" descr="logo-leepci-s.gif"/>
+          <p:cNvPicPr>
+            <a:picLocks noChangeAspect="1"/>
+          </p:cNvPicPr>
+          <p:nvPr>
+            <p:custDataLst>
+              <p:tags r:id="rId2"/>
+            </p:custDataLst>
+          </p:nvPr>
+        </p:nvPicPr>
+        <p:blipFill>
+          <a:blip r:embed="rId8" cstate="print">
+            <a:extLst>
+              <a:ext uri="{28A0092B-C50C-407E-A947-70E740481C1C}">
+                <a14:useLocalDpi xmlns:a14="http://schemas.microsoft.com/office/drawing/2010/main" val="0"/>
+              </a:ext>
+            </a:extLst>
+          </a:blip>
+          <a:srcRect/>
+          <a:stretch>
+            <a:fillRect/>
+          </a:stretch>
+        </p:blipFill>
+        <p:spPr bwMode="auto">
+          <a:xfrm>
+            <a:off x="1176415" y="3243804"/>
+            <a:ext cx="2085227" cy="625959"/>
+          </a:xfrm>
+          <a:prstGeom prst="rect">
+            <a:avLst/>
+          </a:prstGeom>
+          <a:noFill/>
+          <a:ln>
+            <a:noFill/>
+          </a:ln>
+          <a:extLst>
+            <a:ext uri="{909E8E84-426E-40dd-AFC4-6F175D3DCCD1}">
+              <a14:hiddenFill xmlns:a14="http://schemas.microsoft.com/office/drawing/2010/main">
+                <a:solidFill>
+                  <a:srgbClr val="FFFFFF"/>
+                </a:solidFill>
+              </a14:hiddenFill>
+            </a:ext>
+            <a:ext uri="{91240B29-F687-4f45-9708-019B960494DF}">
+              <a14:hiddenLine xmlns:a14="http://schemas.microsoft.com/office/drawing/2010/main" w="9525">
+                <a:solidFill>
+                  <a:srgbClr val="000000"/>
+                </a:solidFill>
+                <a:miter lim="800000"/>
+                <a:headEnd/>
+                <a:tailEnd/>
+              </a14:hiddenLine>
+            </a:ext>
+          </a:extLst>
+        </p:spPr>
+      </p:pic>
+      <p:pic>
+        <p:nvPicPr>
+          <p:cNvPr id="6" name="Image 5"/>
+          <p:cNvPicPr>
+            <a:picLocks noChangeAspect="1"/>
+          </p:cNvPicPr>
+          <p:nvPr>
+            <p:custDataLst>
+              <p:tags r:id="rId3"/>
+            </p:custDataLst>
+          </p:nvPr>
+        </p:nvPicPr>
+        <p:blipFill>
+          <a:blip r:embed="rId9"/>
+          <a:stretch>
+            <a:fillRect/>
+          </a:stretch>
+        </p:blipFill>
+        <p:spPr>
+          <a:xfrm>
+            <a:off x="2392869" y="4009167"/>
+            <a:ext cx="699955" cy="863143"/>
+          </a:xfrm>
+          <a:prstGeom prst="rect">
+            <a:avLst/>
+          </a:prstGeom>
+        </p:spPr>
+      </p:pic>
+      <p:sp>
+        <p:nvSpPr>
+          <p:cNvPr id="7" name="TextBox 1"/>
+          <p:cNvSpPr txBox="1"/>
+          <p:nvPr>
+            <p:custDataLst>
+              <p:tags r:id="rId4"/>
+            </p:custDataLst>
+          </p:nvPr>
+        </p:nvSpPr>
+        <p:spPr>
+          <a:xfrm>
+            <a:off x="737312" y="2639750"/>
+            <a:ext cx="2903359" cy="523220"/>
+          </a:xfrm>
+          <a:prstGeom prst="rect">
+            <a:avLst/>
+          </a:prstGeom>
+          <a:noFill/>
+        </p:spPr>
+        <p:txBody>
+          <a:bodyPr wrap="none" rtlCol="0">
+            <a:spAutoFit/>
+          </a:bodyPr>
+          <a:lstStyle/>
+          <a:p>
+            <a:r>
+              <a:rPr lang="fr-CA" sz="2800" dirty="0" smtClean="0"/>
+              <a:t>Clients du projet</a:t>
+            </a:r>
+            <a:endParaRPr lang="fr-CA" sz="2800" dirty="0"/>
+          </a:p>
+        </p:txBody>
+      </p:sp>
+      <p:sp>
+        <p:nvSpPr>
+          <p:cNvPr id="8" name="Content Placeholder 9"/>
+          <p:cNvSpPr>
+            <a:spLocks noGrp="1"/>
+          </p:cNvSpPr>
+          <p:nvPr>
+            <p:ph idx="1"/>
+            <p:custDataLst>
+              <p:tags r:id="rId5"/>
+            </p:custDataLst>
+          </p:nvPr>
+        </p:nvSpPr>
+        <p:spPr>
+          <a:xfrm>
+            <a:off x="3640671" y="1587780"/>
+            <a:ext cx="4677565" cy="4842773"/>
+          </a:xfrm>
+        </p:spPr>
+        <p:txBody>
+          <a:bodyPr>
+            <a:normAutofit fontScale="92500" lnSpcReduction="20000"/>
+          </a:bodyPr>
+          <a:lstStyle/>
+          <a:p>
+            <a:r>
+              <a:rPr lang="fr-CA" dirty="0" smtClean="0"/>
+              <a:t>Le CERN est un laboratoire de recherche multidisciplinaire sur la physique fondamentale</a:t>
+            </a:r>
+          </a:p>
+          <a:p>
+            <a:pPr lvl="1"/>
+            <a:r>
+              <a:rPr lang="fr-CA" dirty="0" smtClean="0"/>
+              <a:t>Le CERN est situé à la frontière Franco-Suisse (Genève)</a:t>
+            </a:r>
+          </a:p>
+          <a:p>
+            <a:pPr lvl="1"/>
+            <a:r>
+              <a:rPr lang="fr-CA" dirty="0" smtClean="0"/>
+              <a:t>Le laboratoire est constitué d’une chaîne complexe d’accélérateurs de particules</a:t>
+            </a:r>
+          </a:p>
+          <a:p>
+            <a:r>
+              <a:rPr lang="fr-CA" dirty="0" smtClean="0"/>
+              <a:t>Le LEEPCI est un laboratoire de recherche de l’université Laval et se concentre sur la</a:t>
+            </a:r>
+          </a:p>
+          <a:p>
+            <a:pPr lvl="1"/>
+            <a:r>
+              <a:rPr lang="fr-CA" dirty="0" smtClean="0"/>
+              <a:t>modélisation et conception de machines électriques;</a:t>
+            </a:r>
+          </a:p>
+          <a:p>
+            <a:pPr lvl="1"/>
+            <a:r>
+              <a:rPr lang="fr-CA" dirty="0" smtClean="0"/>
+              <a:t>modélisation et conception de convertisseurs d’électronique de puissance.</a:t>
+            </a:r>
+          </a:p>
+          <a:p>
+            <a:pPr lvl="1"/>
+            <a:r>
+              <a:rPr lang="fr-CA" dirty="0"/>
+              <a:t>simulation et commande des réseaux électriques</a:t>
+            </a:r>
+            <a:r>
+              <a:rPr lang="fr-CA" dirty="0" smtClean="0"/>
+              <a:t>;</a:t>
+            </a:r>
+          </a:p>
+          <a:p>
+            <a:r>
+              <a:rPr lang="fr-CA" dirty="0" smtClean="0"/>
+              <a:t>OPAL-RT est une compagnie spécialisée dans le développement de simulateurs temps réel PC/FPGA</a:t>
+            </a:r>
+          </a:p>
+          <a:p>
+            <a:endParaRPr lang="en-US" dirty="0" smtClean="0"/>
+          </a:p>
+          <a:p>
+            <a:pPr lvl="1"/>
+            <a:endParaRPr lang="en-US" dirty="0" smtClean="0"/>
+          </a:p>
+          <a:p>
+            <a:pPr lvl="1"/>
+            <a:endParaRPr lang="en-US" dirty="0"/>
+          </a:p>
+        </p:txBody>
+      </p:sp>
+    </p:spTree>
+    <p:extLst>
+      <p:ext uri="{BB962C8B-B14F-4D97-AF65-F5344CB8AC3E}">
+        <p14:creationId xmlns:p14="http://schemas.microsoft.com/office/powerpoint/2010/main" val="549106781"/>
+      </p:ext>
+    </p:extLst>
+  </p:cSld>
+  <p:clrMapOvr>
+    <a:masterClrMapping/>
+  </p:clrMapOvr>
+</p:sld>
+</file>
+
+<file path=ppt/slides/slide20.xml><?xml version="1.0" encoding="utf-8"?>
+<p:sld xmlns:a="http://schemas.openxmlformats.org/drawingml/2006/main" xmlns:r="http://schemas.openxmlformats.org/officeDocument/2006/relationships" xmlns:p="http://schemas.openxmlformats.org/presentationml/2006/main">
+  <p:cSld>
+    <p:spTree>
+      <p:nvGrpSpPr>
+        <p:cNvPr id="1" name=""/>
+        <p:cNvGrpSpPr/>
+        <p:nvPr/>
+      </p:nvGrpSpPr>
+      <p:grpSpPr>
+        <a:xfrm>
+          <a:off x="0" y="0"/>
+          <a:ext cx="0" cy="0"/>
+          <a:chOff x="0" y="0"/>
+          <a:chExt cx="0" cy="0"/>
+        </a:xfrm>
+      </p:grpSpPr>
+      <p:sp>
+        <p:nvSpPr>
+          <p:cNvPr id="6" name="Title 5"/>
+          <p:cNvSpPr>
+            <a:spLocks noGrp="1"/>
+          </p:cNvSpPr>
+          <p:nvPr>
+            <p:ph type="title"/>
+          </p:nvPr>
+        </p:nvSpPr>
+        <p:spPr/>
+        <p:txBody>
+          <a:bodyPr/>
+          <a:lstStyle/>
+          <a:p>
+            <a:r>
+              <a:rPr lang="en-CA" dirty="0"/>
+              <a:t>Simulation </a:t>
+            </a:r>
+            <a:r>
+              <a:rPr lang="en-CA" dirty="0" err="1"/>
+              <a:t>sur</a:t>
+            </a:r>
+            <a:r>
+              <a:rPr lang="en-CA" dirty="0"/>
+              <a:t> </a:t>
+            </a:r>
+            <a:r>
+              <a:rPr lang="en-CA" dirty="0" err="1" smtClean="0"/>
+              <a:t>Psim</a:t>
+            </a:r>
+            <a:r>
+              <a:rPr lang="en-CA" dirty="0" smtClean="0"/>
+              <a:t>: </a:t>
+            </a:r>
+            <a:r>
+              <a:rPr lang="en-CA" dirty="0" err="1"/>
+              <a:t>DCp</a:t>
+            </a:r>
+            <a:r>
+              <a:rPr lang="en-CA" dirty="0"/>
+              <a:t> et </a:t>
+            </a:r>
+            <a:r>
+              <a:rPr lang="en-CA" dirty="0" err="1"/>
+              <a:t>DCn</a:t>
+            </a:r>
+            <a:r>
+              <a:rPr lang="en-CA" dirty="0"/>
+              <a:t> (</a:t>
+            </a:r>
+            <a:r>
+              <a:rPr lang="en-CA" dirty="0" err="1"/>
+              <a:t>Vue</a:t>
+            </a:r>
+            <a:r>
+              <a:rPr lang="en-CA" dirty="0"/>
+              <a:t> </a:t>
+            </a:r>
+            <a:r>
+              <a:rPr lang="en-CA" dirty="0" err="1"/>
+              <a:t>d’ensemble</a:t>
+            </a:r>
+            <a:r>
+              <a:rPr lang="en-CA" dirty="0"/>
+              <a:t>)</a:t>
+            </a:r>
+            <a:endParaRPr lang="en-US" dirty="0"/>
+          </a:p>
+        </p:txBody>
+      </p:sp>
+      <p:pic>
+        <p:nvPicPr>
+          <p:cNvPr id="7" name="Picture 6" descr="Screen Shot 2014-02-19 at 2.22.40 PM.png"/>
+          <p:cNvPicPr>
+            <a:picLocks noChangeAspect="1"/>
+          </p:cNvPicPr>
+          <p:nvPr/>
+        </p:nvPicPr>
+        <p:blipFill>
+          <a:blip r:embed="rId2">
+            <a:extLst>
+              <a:ext uri="{28A0092B-C50C-407E-A947-70E740481C1C}">
+                <a14:useLocalDpi xmlns:a14="http://schemas.microsoft.com/office/drawing/2010/main" val="0"/>
+              </a:ext>
+            </a:extLst>
+          </a:blip>
+          <a:stretch>
+            <a:fillRect/>
+          </a:stretch>
+        </p:blipFill>
+        <p:spPr>
+          <a:xfrm>
+            <a:off x="541878" y="2012770"/>
+            <a:ext cx="7145867" cy="4094601"/>
+          </a:xfrm>
+          <a:prstGeom prst="rect">
+            <a:avLst/>
+          </a:prstGeom>
+        </p:spPr>
+      </p:pic>
+    </p:spTree>
+    <p:extLst>
+      <p:ext uri="{BB962C8B-B14F-4D97-AF65-F5344CB8AC3E}">
+        <p14:creationId xmlns:p14="http://schemas.microsoft.com/office/powerpoint/2010/main" val="284177170"/>
+      </p:ext>
+    </p:extLst>
+  </p:cSld>
+  <p:clrMapOvr>
+    <a:masterClrMapping/>
+  </p:clrMapOvr>
+</p:sld>
+</file>
+
+<file path=ppt/slides/slide21.xml><?xml version="1.0" encoding="utf-8"?>
+<p:sld xmlns:a="http://schemas.openxmlformats.org/drawingml/2006/main" xmlns:r="http://schemas.openxmlformats.org/officeDocument/2006/relationships" xmlns:p="http://schemas.openxmlformats.org/presentationml/2006/main">
+  <p:cSld>
+    <p:spTree>
+      <p:nvGrpSpPr>
+        <p:cNvPr id="1" name=""/>
+        <p:cNvGrpSpPr/>
+        <p:nvPr/>
+      </p:nvGrpSpPr>
+      <p:grpSpPr>
+        <a:xfrm>
+          <a:off x="0" y="0"/>
+          <a:ext cx="0" cy="0"/>
+          <a:chOff x="0" y="0"/>
+          <a:chExt cx="0" cy="0"/>
+        </a:xfrm>
+      </p:grpSpPr>
+      <p:sp>
+        <p:nvSpPr>
+          <p:cNvPr id="2" name="Title 1"/>
+          <p:cNvSpPr>
+            <a:spLocks noGrp="1"/>
+          </p:cNvSpPr>
+          <p:nvPr>
+            <p:ph type="title"/>
+          </p:nvPr>
+        </p:nvSpPr>
+        <p:spPr/>
+        <p:txBody>
+          <a:bodyPr/>
+          <a:lstStyle/>
+          <a:p>
+            <a:r>
+              <a:rPr lang="en-US" dirty="0" err="1" smtClean="0"/>
+              <a:t>Commande</a:t>
+            </a:r>
+            <a:r>
+              <a:rPr lang="en-US" dirty="0" smtClean="0"/>
+              <a:t> des blocs </a:t>
+            </a:r>
+            <a:r>
+              <a:rPr lang="en-US" dirty="0" err="1" smtClean="0"/>
+              <a:t>DCp,DCn</a:t>
+            </a:r>
+            <a:endParaRPr lang="en-US" dirty="0"/>
+          </a:p>
+        </p:txBody>
+      </p:sp>
+      <p:pic>
+        <p:nvPicPr>
+          <p:cNvPr id="3" name="Picture 2" descr="Screen Shot 2014-02-19 at 2.23.48 PM.png"/>
+          <p:cNvPicPr>
+            <a:picLocks noChangeAspect="1"/>
+          </p:cNvPicPr>
+          <p:nvPr/>
+        </p:nvPicPr>
+        <p:blipFill>
+          <a:blip r:embed="rId2">
+            <a:extLst>
+              <a:ext uri="{28A0092B-C50C-407E-A947-70E740481C1C}">
+                <a14:useLocalDpi xmlns:a14="http://schemas.microsoft.com/office/drawing/2010/main" val="0"/>
+              </a:ext>
+            </a:extLst>
+          </a:blip>
+          <a:stretch>
+            <a:fillRect/>
+          </a:stretch>
+        </p:blipFill>
+        <p:spPr>
+          <a:xfrm>
+            <a:off x="1866900" y="1377052"/>
+            <a:ext cx="4703233" cy="5277748"/>
+          </a:xfrm>
+          <a:prstGeom prst="rect">
+            <a:avLst/>
+          </a:prstGeom>
+        </p:spPr>
+      </p:pic>
+    </p:spTree>
+    <p:extLst>
+      <p:ext uri="{BB962C8B-B14F-4D97-AF65-F5344CB8AC3E}">
+        <p14:creationId xmlns:p14="http://schemas.microsoft.com/office/powerpoint/2010/main" val="3374058421"/>
+      </p:ext>
+    </p:extLst>
+  </p:cSld>
+  <p:clrMapOvr>
+    <a:masterClrMapping/>
+  </p:clrMapOvr>
+</p:sld>
+</file>
+
+<file path=ppt/slides/slide22.xml><?xml version="1.0" encoding="utf-8"?>
+<p:sld xmlns:a="http://schemas.openxmlformats.org/drawingml/2006/main" xmlns:r="http://schemas.openxmlformats.org/officeDocument/2006/relationships" xmlns:p="http://schemas.openxmlformats.org/presentationml/2006/main">
+  <p:cSld>
+    <p:spTree>
+      <p:nvGrpSpPr>
+        <p:cNvPr id="1" name=""/>
+        <p:cNvGrpSpPr/>
+        <p:nvPr/>
+      </p:nvGrpSpPr>
+      <p:grpSpPr>
+        <a:xfrm>
+          <a:off x="0" y="0"/>
+          <a:ext cx="0" cy="0"/>
+          <a:chOff x="0" y="0"/>
+          <a:chExt cx="0" cy="0"/>
+        </a:xfrm>
+      </p:grpSpPr>
+      <p:sp>
+        <p:nvSpPr>
+          <p:cNvPr id="2" name="Title 1"/>
+          <p:cNvSpPr>
+            <a:spLocks noGrp="1"/>
+          </p:cNvSpPr>
+          <p:nvPr>
+            <p:ph type="ctrTitle"/>
+          </p:nvPr>
+        </p:nvSpPr>
+        <p:spPr>
+          <a:xfrm>
+            <a:off x="152401" y="2404534"/>
+            <a:ext cx="7281332" cy="1646302"/>
+          </a:xfrm>
+        </p:spPr>
+        <p:txBody>
+          <a:bodyPr/>
+          <a:lstStyle/>
+          <a:p>
+            <a:r>
+              <a:rPr lang="fr-CA" dirty="0" smtClean="0"/>
+              <a:t>Aperçu du concept proposé et de la solution retenue (Outil de dimensionnement)</a:t>
+            </a:r>
+            <a:endParaRPr lang="fr-CA" dirty="0"/>
+          </a:p>
+        </p:txBody>
+      </p:sp>
+      <p:sp>
+        <p:nvSpPr>
+          <p:cNvPr id="3" name="Subtitle 2"/>
+          <p:cNvSpPr>
+            <a:spLocks noGrp="1"/>
+          </p:cNvSpPr>
+          <p:nvPr>
+            <p:ph type="subTitle" idx="1"/>
+          </p:nvPr>
+        </p:nvSpPr>
+        <p:spPr/>
+        <p:txBody>
+          <a:bodyPr>
+            <a:normAutofit/>
+          </a:bodyPr>
+          <a:lstStyle/>
+          <a:p>
+            <a:r>
+              <a:rPr lang="fr-CA" dirty="0" smtClean="0"/>
+              <a:t>Tests préliminaires pour vérifier la faisabilité et l’efficacité de la liaison entre </a:t>
+            </a:r>
+            <a:r>
+              <a:rPr lang="fr-CA" dirty="0" err="1" smtClean="0"/>
+              <a:t>Psim</a:t>
+            </a:r>
+            <a:r>
+              <a:rPr lang="fr-CA" dirty="0" smtClean="0"/>
+              <a:t> et </a:t>
+            </a:r>
+            <a:r>
+              <a:rPr lang="fr-CA" dirty="0" smtClean="0"/>
+              <a:t>Excel pour un post-traitement lié à l’outil de dimensionnement.</a:t>
+            </a:r>
+            <a:endParaRPr lang="fr-CA" dirty="0" smtClean="0"/>
+          </a:p>
+        </p:txBody>
+      </p:sp>
+    </p:spTree>
+    <p:extLst>
+      <p:ext uri="{BB962C8B-B14F-4D97-AF65-F5344CB8AC3E}">
+        <p14:creationId xmlns:p14="http://schemas.microsoft.com/office/powerpoint/2010/main" val="2400563645"/>
+      </p:ext>
+    </p:extLst>
+  </p:cSld>
+  <p:clrMapOvr>
+    <a:masterClrMapping/>
+  </p:clrMapOvr>
+</p:sld>
+</file>
+
+<file path=ppt/slides/slide23.xml><?xml version="1.0" encoding="utf-8"?>
+<p:sld xmlns:a="http://schemas.openxmlformats.org/drawingml/2006/main" xmlns:r="http://schemas.openxmlformats.org/officeDocument/2006/relationships" xmlns:p="http://schemas.openxmlformats.org/presentationml/2006/main">
+  <p:cSld>
+    <p:spTree>
+      <p:nvGrpSpPr>
+        <p:cNvPr id="1" name=""/>
+        <p:cNvGrpSpPr/>
+        <p:nvPr/>
+      </p:nvGrpSpPr>
+      <p:grpSpPr>
+        <a:xfrm>
+          <a:off x="0" y="0"/>
+          <a:ext cx="0" cy="0"/>
+          <a:chOff x="0" y="0"/>
+          <a:chExt cx="0" cy="0"/>
+        </a:xfrm>
+      </p:grpSpPr>
+      <p:sp>
+        <p:nvSpPr>
+          <p:cNvPr id="2" name="Title 1"/>
+          <p:cNvSpPr>
+            <a:spLocks noGrp="1"/>
+          </p:cNvSpPr>
+          <p:nvPr>
+            <p:ph type="title"/>
+          </p:nvPr>
+        </p:nvSpPr>
+        <p:spPr>
+          <a:xfrm>
+            <a:off x="583967" y="962883"/>
             <a:ext cx="7434266" cy="649555"/>
           </a:xfrm>
         </p:spPr>
@@ -7746,74 +8906,6 @@
             <a:r>
               <a:rPr lang="fr-CA" dirty="0" smtClean="0"/>
               <a:t>Interface de base de contrôle du simulateur</a:t>
-            </a:r>
-            <a:endParaRPr lang="fr-CA" dirty="0"/>
-          </a:p>
-        </p:txBody>
-      </p:sp>
-      <p:sp>
-        <p:nvSpPr>
-          <p:cNvPr id="4" name="Text Placeholder 3"/>
-          <p:cNvSpPr>
-            <a:spLocks noGrp="1"/>
-          </p:cNvSpPr>
-          <p:nvPr>
-            <p:ph type="body" sz="half" idx="2"/>
-          </p:nvPr>
-        </p:nvSpPr>
-        <p:spPr>
-          <a:xfrm>
-            <a:off x="1690543" y="4638666"/>
-            <a:ext cx="5762981" cy="1666924"/>
-          </a:xfrm>
-        </p:spPr>
-        <p:txBody>
-          <a:bodyPr>
-            <a:normAutofit fontScale="77500" lnSpcReduction="20000"/>
-          </a:bodyPr>
-          <a:lstStyle/>
-          <a:p>
-            <a:r>
-              <a:rPr lang="fr-CA" dirty="0" smtClean="0"/>
-              <a:t>Pour le bon fonctionnement du bouton, il est nécessaire d’indiquer la location de </a:t>
-            </a:r>
-            <a:r>
-              <a:rPr lang="fr-CA" dirty="0" err="1" smtClean="0"/>
-              <a:t>PSim</a:t>
-            </a:r>
-            <a:r>
-              <a:rPr lang="fr-CA" dirty="0" smtClean="0"/>
-              <a:t> ainsi que celui de la simulation. Dans les versions subséquente du lanceur de simulation, il pourrait être possible d’aller rechercher la version la plus récente de </a:t>
-            </a:r>
-            <a:r>
-              <a:rPr lang="fr-CA" dirty="0" err="1" smtClean="0"/>
-              <a:t>PSim</a:t>
-            </a:r>
-            <a:r>
-              <a:rPr lang="fr-CA" dirty="0" smtClean="0"/>
-              <a:t> sur le système automatiquement et de lire le fichier de simulation dans le même dossier que le fichier </a:t>
-            </a:r>
-            <a:r>
-              <a:rPr lang="fr-CA" dirty="0"/>
-              <a:t>E</a:t>
-            </a:r>
-            <a:r>
-              <a:rPr lang="fr-CA" dirty="0" smtClean="0"/>
-              <a:t>xcel si aucune location est indiquée .</a:t>
-            </a:r>
-            <a:br>
-              <a:rPr lang="fr-CA" dirty="0" smtClean="0"/>
-            </a:br>
-            <a:r>
-              <a:rPr lang="fr-CA" dirty="0" smtClean="0"/>
-              <a:t/>
-            </a:r>
-            <a:br>
-              <a:rPr lang="fr-CA" dirty="0" smtClean="0"/>
-            </a:br>
-            <a:r>
-              <a:rPr lang="fr-CA" dirty="0" smtClean="0"/>
-              <a:t>Par la suite, il suffit de rentrer les valeurs voulues (nombre et choix limité par la conception de la simulation) et d’appuyer sur le bouton de lancement</a:t>
             </a:r>
             <a:endParaRPr lang="fr-CA" dirty="0"/>
           </a:p>
@@ -7841,7 +8933,7 @@
         </p:blipFill>
         <p:spPr>
           <a:xfrm>
-            <a:off x="2525064" y="221776"/>
+            <a:off x="2254130" y="2219910"/>
             <a:ext cx="4093940" cy="3019846"/>
           </a:xfrm>
           <a:prstGeom prst="rect">
@@ -7894,7 +8986,7 @@
 </p:sld>
 </file>
 
-<file path=ppt/slides/slide18.xml><?xml version="1.0" encoding="utf-8"?>
+<file path=ppt/slides/slide24.xml><?xml version="1.0" encoding="utf-8"?>
 <p:sld xmlns:a="http://schemas.openxmlformats.org/drawingml/2006/main" xmlns:r="http://schemas.openxmlformats.org/officeDocument/2006/relationships" xmlns:p="http://schemas.openxmlformats.org/presentationml/2006/main">
   <p:cSld>
     <p:spTree>
@@ -7928,15 +9020,21 @@
           </a:xfrm>
         </p:spPr>
         <p:txBody>
-          <a:bodyPr>
-            <a:normAutofit fontScale="90000"/>
-          </a:bodyPr>
+          <a:bodyPr/>
           <a:lstStyle/>
           <a:p>
             <a:pPr algn="ctr"/>
             <a:r>
               <a:rPr lang="fr-CA" dirty="0" smtClean="0"/>
-              <a:t>Code de base pour le lancement de la simulation</a:t>
+              <a:t>Lancement automatique de </a:t>
+            </a:r>
+            <a:r>
+              <a:rPr lang="fr-CA" dirty="0" err="1" smtClean="0"/>
+              <a:t>Simview</a:t>
+            </a:r>
+            <a:r>
+              <a:rPr lang="fr-CA" dirty="0" smtClean="0"/>
+              <a:t> </a:t>
             </a:r>
             <a:endParaRPr lang="fr-CA" dirty="0"/>
           </a:p>
@@ -7954,192 +9052,33 @@
         </p:nvSpPr>
         <p:spPr>
           <a:xfrm>
-            <a:off x="1690543" y="4638666"/>
-            <a:ext cx="5762981" cy="1666924"/>
+            <a:off x="355600" y="4638666"/>
+            <a:ext cx="8331199" cy="1666924"/>
           </a:xfrm>
         </p:spPr>
         <p:txBody>
           <a:bodyPr>
-            <a:normAutofit/>
+            <a:noAutofit/>
           </a:bodyPr>
           <a:lstStyle/>
           <a:p>
             <a:r>
-              <a:rPr lang="fr-CA" dirty="0" smtClean="0"/>
-              <a:t>Version de base du code de lancement de la simulation. Celui-ci va extraire les valeurs dans le tableur après l’appui du bouton. Par la suite, quelques vérification de base sont effectuées pour s’assurer que les chemins de fichiers sont valides. Suite à la validation, la simulation est lancée.</a:t>
-            </a:r>
-            <a:endParaRPr lang="fr-CA" dirty="0"/>
-          </a:p>
-        </p:txBody>
-      </p:sp>
-      <p:pic>
-        <p:nvPicPr>
-          <p:cNvPr id="9" name="Picture 8"/>
-          <p:cNvPicPr>
-            <a:picLocks noChangeAspect="1"/>
-          </p:cNvPicPr>
-          <p:nvPr/>
-        </p:nvPicPr>
-        <p:blipFill>
-          <a:blip r:embed="rId2">
-            <a:extLst>
-              <a:ext uri="{28A0092B-C50C-407E-A947-70E740481C1C}">
-                <a14:useLocalDpi xmlns:a14="http://schemas.microsoft.com/office/drawing/2010/main" val="0"/>
-              </a:ext>
-            </a:extLst>
-          </a:blip>
-          <a:stretch>
-            <a:fillRect/>
-          </a:stretch>
-        </p:blipFill>
-        <p:spPr>
-          <a:xfrm>
-            <a:off x="754376" y="96022"/>
-            <a:ext cx="7562310" cy="3385165"/>
-          </a:xfrm>
-          <a:prstGeom prst="rect">
-            <a:avLst/>
-          </a:prstGeom>
-          <a:solidFill>
-            <a:srgbClr val="FFFFFF">
-              <a:shade val="85000"/>
-            </a:srgbClr>
-          </a:solidFill>
-          <a:ln w="88900" cap="sq">
-            <a:solidFill>
-              <a:schemeClr val="tx2">
-                <a:lumMod val="75000"/>
-              </a:schemeClr>
-            </a:solidFill>
-            <a:miter lim="800000"/>
-          </a:ln>
-          <a:effectLst>
-            <a:outerShdw blurRad="55000" dist="18000" dir="5400000" algn="tl" rotWithShape="0">
-              <a:srgbClr val="000000">
-                <a:alpha val="40000"/>
-              </a:srgbClr>
-            </a:outerShdw>
-          </a:effectLst>
-          <a:scene3d>
-            <a:camera prst="orthographicFront"/>
-            <a:lightRig rig="twoPt" dir="t">
-              <a:rot lat="0" lon="0" rev="7200000"/>
-            </a:lightRig>
-          </a:scene3d>
-          <a:sp3d>
-            <a:bevelT w="25400" h="19050"/>
-            <a:contourClr>
-              <a:srgbClr val="FFFFFF"/>
-            </a:contourClr>
-          </a:sp3d>
-        </p:spPr>
-      </p:pic>
-    </p:spTree>
-    <p:extLst>
-      <p:ext uri="{BB962C8B-B14F-4D97-AF65-F5344CB8AC3E}">
-        <p14:creationId xmlns:p14="http://schemas.microsoft.com/office/powerpoint/2010/main" val="3406987875"/>
-      </p:ext>
-    </p:extLst>
-  </p:cSld>
-  <p:clrMapOvr>
-    <a:masterClrMapping/>
-  </p:clrMapOvr>
-</p:sld>
-</file>
-
-<file path=ppt/slides/slide19.xml><?xml version="1.0" encoding="utf-8"?>
-<p:sld xmlns:a="http://schemas.openxmlformats.org/drawingml/2006/main" xmlns:r="http://schemas.openxmlformats.org/officeDocument/2006/relationships" xmlns:p="http://schemas.openxmlformats.org/presentationml/2006/main">
-  <p:cSld>
-    <p:spTree>
-      <p:nvGrpSpPr>
-        <p:cNvPr id="1" name=""/>
-        <p:cNvGrpSpPr/>
-        <p:nvPr/>
-      </p:nvGrpSpPr>
-      <p:grpSpPr>
-        <a:xfrm>
-          <a:off x="0" y="0"/>
-          <a:ext cx="0" cy="0"/>
-          <a:chOff x="0" y="0"/>
-          <a:chExt cx="0" cy="0"/>
-        </a:xfrm>
-      </p:grpSpPr>
-      <p:sp>
-        <p:nvSpPr>
-          <p:cNvPr id="2" name="Title 1"/>
-          <p:cNvSpPr>
-            <a:spLocks noGrp="1"/>
-          </p:cNvSpPr>
-          <p:nvPr>
-            <p:ph type="title"/>
-          </p:nvPr>
-        </p:nvSpPr>
-        <p:spPr>
-          <a:xfrm>
-            <a:off x="854900" y="3756882"/>
-            <a:ext cx="7434266" cy="649555"/>
-          </a:xfrm>
-        </p:spPr>
-        <p:txBody>
-          <a:bodyPr/>
-          <a:lstStyle/>
-          <a:p>
-            <a:pPr algn="ctr"/>
-            <a:r>
-              <a:rPr lang="fr-CA" dirty="0" smtClean="0"/>
-              <a:t>Lancement automatique de </a:t>
-            </a:r>
-            <a:r>
-              <a:rPr lang="fr-CA" dirty="0" err="1" smtClean="0"/>
-              <a:t>Simview</a:t>
-            </a:r>
-            <a:r>
-              <a:rPr lang="fr-CA" dirty="0" smtClean="0"/>
-              <a:t> </a:t>
-            </a:r>
-            <a:endParaRPr lang="fr-CA" dirty="0"/>
-          </a:p>
-        </p:txBody>
-      </p:sp>
-      <p:sp>
-        <p:nvSpPr>
-          <p:cNvPr id="4" name="Text Placeholder 3"/>
-          <p:cNvSpPr>
-            <a:spLocks noGrp="1"/>
-          </p:cNvSpPr>
-          <p:nvPr>
-            <p:ph type="body" sz="half" idx="2"/>
-          </p:nvPr>
-        </p:nvSpPr>
-        <p:spPr>
-          <a:xfrm>
-            <a:off x="1690543" y="4638666"/>
-            <a:ext cx="5762981" cy="1666924"/>
-          </a:xfrm>
-        </p:spPr>
-        <p:txBody>
-          <a:bodyPr>
-            <a:normAutofit/>
-          </a:bodyPr>
-          <a:lstStyle/>
-          <a:p>
-            <a:r>
-              <a:rPr lang="fr-CA" dirty="0" smtClean="0"/>
+              <a:rPr lang="fr-CA" sz="2000" dirty="0" smtClean="0"/>
               <a:t>Suite à la simulation, </a:t>
             </a:r>
             <a:r>
-              <a:rPr lang="fr-CA" dirty="0" err="1" smtClean="0"/>
+              <a:rPr lang="fr-CA" sz="2000" dirty="0" err="1" smtClean="0"/>
               <a:t>SimView</a:t>
             </a:r>
             <a:r>
-              <a:rPr lang="fr-CA" dirty="0" smtClean="0"/>
+              <a:rPr lang="fr-CA" sz="2000" dirty="0" smtClean="0"/>
               <a:t> est lancé automatiquement pour permettre la visualisation des résultats de la simulation. Il est possible de faire sauvegarder automatiquement la simulation selon un système de nom prédéfinie ou de l’enregistrer à partir de </a:t>
             </a:r>
             <a:r>
-              <a:rPr lang="fr-CA" dirty="0" err="1" smtClean="0"/>
+              <a:rPr lang="fr-CA" sz="2000" dirty="0" err="1" smtClean="0"/>
               <a:t>SimView</a:t>
             </a:r>
-            <a:endParaRPr lang="fr-CA" dirty="0"/>
+            <a:endParaRPr lang="fr-CA" sz="2000" dirty="0"/>
           </a:p>
         </p:txBody>
       </p:sp>
@@ -8218,7 +9157,7 @@
 </p:sld>
 </file>
 
-<file path=ppt/slides/slide2.xml><?xml version="1.0" encoding="utf-8"?>
+<file path=ppt/slides/slide25.xml><?xml version="1.0" encoding="utf-8"?>
 <p:sld xmlns:a="http://schemas.openxmlformats.org/drawingml/2006/main" xmlns:r="http://schemas.openxmlformats.org/officeDocument/2006/relationships" xmlns:p="http://schemas.openxmlformats.org/presentationml/2006/main">
   <p:cSld>
     <p:spTree>
@@ -8235,329 +9174,49 @@
           <a:chExt cx="0" cy="0"/>
         </a:xfrm>
       </p:grpSpPr>
-      <p:pic>
-        <p:nvPicPr>
-          <p:cNvPr id="4" name="Picture 9" descr="CERN144"/>
-          <p:cNvPicPr>
-            <a:picLocks noChangeAspect="1" noChangeArrowheads="1"/>
-          </p:cNvPicPr>
-          <p:nvPr>
-            <p:custDataLst>
-              <p:tags r:id="rId1"/>
-            </p:custDataLst>
-          </p:nvPr>
-        </p:nvPicPr>
-        <p:blipFill>
-          <a:blip r:embed="rId7" cstate="print"/>
-          <a:srcRect/>
-          <a:stretch>
-            <a:fillRect/>
-          </a:stretch>
-        </p:blipFill>
-        <p:spPr bwMode="auto">
-          <a:xfrm>
-            <a:off x="1318618" y="4006477"/>
-            <a:ext cx="549029" cy="823839"/>
-          </a:xfrm>
-          <a:prstGeom prst="rect">
-            <a:avLst/>
-          </a:prstGeom>
-          <a:noFill/>
-          <a:ln w="9525">
-            <a:noFill/>
-            <a:miter lim="800000"/>
-            <a:headEnd/>
-            <a:tailEnd/>
-          </a:ln>
-        </p:spPr>
-      </p:pic>
-      <p:pic>
-        <p:nvPicPr>
-          <p:cNvPr id="5" name="Image 12" descr="logo-leepci-s.gif"/>
-          <p:cNvPicPr>
-            <a:picLocks noChangeAspect="1"/>
-          </p:cNvPicPr>
-          <p:nvPr>
-            <p:custDataLst>
-              <p:tags r:id="rId2"/>
-            </p:custDataLst>
-          </p:nvPr>
-        </p:nvPicPr>
-        <p:blipFill>
-          <a:blip r:embed="rId8" cstate="print">
-            <a:extLst>
-              <a:ext uri="{28A0092B-C50C-407E-A947-70E740481C1C}">
-                <a14:useLocalDpi xmlns:a14="http://schemas.microsoft.com/office/drawing/2010/main" val="0"/>
-              </a:ext>
-            </a:extLst>
-          </a:blip>
-          <a:srcRect/>
-          <a:stretch>
-            <a:fillRect/>
-          </a:stretch>
-        </p:blipFill>
-        <p:spPr bwMode="auto">
-          <a:xfrm>
-            <a:off x="1176415" y="3243804"/>
-            <a:ext cx="2085227" cy="625959"/>
-          </a:xfrm>
-          <a:prstGeom prst="rect">
-            <a:avLst/>
-          </a:prstGeom>
-          <a:noFill/>
-          <a:ln>
-            <a:noFill/>
-          </a:ln>
-          <a:extLst>
-            <a:ext uri="{909E8E84-426E-40dd-AFC4-6F175D3DCCD1}">
-              <a14:hiddenFill xmlns:a14="http://schemas.microsoft.com/office/drawing/2010/main">
-                <a:solidFill>
-                  <a:srgbClr val="FFFFFF"/>
-                </a:solidFill>
-              </a14:hiddenFill>
-            </a:ext>
-            <a:ext uri="{91240B29-F687-4f45-9708-019B960494DF}">
-              <a14:hiddenLine xmlns:a14="http://schemas.microsoft.com/office/drawing/2010/main" w="9525">
-                <a:solidFill>
-                  <a:srgbClr val="000000"/>
-                </a:solidFill>
-                <a:miter lim="800000"/>
-                <a:headEnd/>
-                <a:tailEnd/>
-              </a14:hiddenLine>
-            </a:ext>
-          </a:extLst>
-        </p:spPr>
-      </p:pic>
-      <p:pic>
-        <p:nvPicPr>
-          <p:cNvPr id="6" name="Image 5"/>
-          <p:cNvPicPr>
-            <a:picLocks noChangeAspect="1"/>
-          </p:cNvPicPr>
-          <p:nvPr>
-            <p:custDataLst>
-              <p:tags r:id="rId3"/>
-            </p:custDataLst>
-          </p:nvPr>
-        </p:nvPicPr>
-        <p:blipFill>
-          <a:blip r:embed="rId9"/>
-          <a:stretch>
-            <a:fillRect/>
-          </a:stretch>
-        </p:blipFill>
+      <p:sp>
+        <p:nvSpPr>
+          <p:cNvPr id="2" name="Title 1"/>
+          <p:cNvSpPr>
+            <a:spLocks noGrp="1"/>
+          </p:cNvSpPr>
+          <p:nvPr>
+            <p:ph type="title"/>
+          </p:nvPr>
+        </p:nvSpPr>
         <p:spPr>
           <a:xfrm>
-            <a:off x="2392869" y="4009167"/>
-            <a:ext cx="699955" cy="863143"/>
+            <a:off x="474134" y="3790749"/>
+            <a:ext cx="5554665" cy="649555"/>
           </a:xfrm>
-          <a:prstGeom prst="rect">
-            <a:avLst/>
-          </a:prstGeom>
         </p:spPr>
-      </p:pic>
-      <p:sp>
-        <p:nvSpPr>
-          <p:cNvPr id="7" name="TextBox 1"/>
-          <p:cNvSpPr txBox="1"/>
-          <p:nvPr>
-            <p:custDataLst>
-              <p:tags r:id="rId4"/>
-            </p:custDataLst>
+        <p:txBody>
+          <a:bodyPr/>
+          <a:lstStyle/>
+          <a:p>
+            <a:pPr algn="ctr"/>
+            <a:r>
+              <a:rPr lang="fr-CA" dirty="0" smtClean="0"/>
+              <a:t>Résultats pour un « Buck »</a:t>
+            </a:r>
+            <a:endParaRPr lang="fr-CA" dirty="0"/>
+          </a:p>
+        </p:txBody>
+      </p:sp>
+      <p:sp>
+        <p:nvSpPr>
+          <p:cNvPr id="4" name="Text Placeholder 3"/>
+          <p:cNvSpPr>
+            <a:spLocks noGrp="1"/>
+          </p:cNvSpPr>
+          <p:nvPr>
+            <p:ph type="body" sz="half" idx="2"/>
           </p:nvPr>
         </p:nvSpPr>
         <p:spPr>
           <a:xfrm>
-            <a:off x="737312" y="2639750"/>
-            <a:ext cx="2903359" cy="523220"/>
-          </a:xfrm>
-          <a:prstGeom prst="rect">
-            <a:avLst/>
-          </a:prstGeom>
-          <a:noFill/>
-        </p:spPr>
-        <p:txBody>
-          <a:bodyPr wrap="none" rtlCol="0">
-            <a:spAutoFit/>
-          </a:bodyPr>
-          <a:lstStyle/>
-          <a:p>
-            <a:r>
-              <a:rPr lang="fr-CA" sz="2800" dirty="0" smtClean="0"/>
-              <a:t>Clients du projet</a:t>
-            </a:r>
-            <a:endParaRPr lang="fr-CA" sz="2800" dirty="0"/>
-          </a:p>
-        </p:txBody>
-      </p:sp>
-      <p:sp>
-        <p:nvSpPr>
-          <p:cNvPr id="8" name="Content Placeholder 9"/>
-          <p:cNvSpPr>
-            <a:spLocks noGrp="1"/>
-          </p:cNvSpPr>
-          <p:nvPr>
-            <p:ph idx="1"/>
-            <p:custDataLst>
-              <p:tags r:id="rId5"/>
-            </p:custDataLst>
-          </p:nvPr>
-        </p:nvSpPr>
-        <p:spPr>
-          <a:xfrm>
-            <a:off x="3640671" y="1587780"/>
-            <a:ext cx="4677565" cy="4842773"/>
-          </a:xfrm>
-        </p:spPr>
-        <p:txBody>
-          <a:bodyPr>
-            <a:normAutofit fontScale="92500" lnSpcReduction="20000"/>
-          </a:bodyPr>
-          <a:lstStyle/>
-          <a:p>
-            <a:r>
-              <a:rPr lang="fr-CA" dirty="0" smtClean="0"/>
-              <a:t>Le CERN est un laboratoire de recherche multidisciplinaire sur la physique fondamentale</a:t>
-            </a:r>
-          </a:p>
-          <a:p>
-            <a:pPr lvl="1"/>
-            <a:r>
-              <a:rPr lang="fr-CA" dirty="0" smtClean="0"/>
-              <a:t>Le CERN est situé à la frontière Franco-Suisse (Genève)</a:t>
-            </a:r>
-          </a:p>
-          <a:p>
-            <a:pPr lvl="1"/>
-            <a:r>
-              <a:rPr lang="fr-CA" dirty="0" smtClean="0"/>
-              <a:t>Le laboratoire est constitué d’une chaîne complexe d’accélérateurs de particules</a:t>
-            </a:r>
-          </a:p>
-          <a:p>
-            <a:r>
-              <a:rPr lang="fr-CA" dirty="0" smtClean="0"/>
-              <a:t>Le LEEPCI est un laboratoire de recherche de l’université Laval et se concentre sur la</a:t>
-            </a:r>
-          </a:p>
-          <a:p>
-            <a:pPr lvl="1"/>
-            <a:r>
-              <a:rPr lang="fr-CA" dirty="0" smtClean="0"/>
-              <a:t>modélisation et conception de machines électriques;</a:t>
-            </a:r>
-          </a:p>
-          <a:p>
-            <a:pPr lvl="1"/>
-            <a:r>
-              <a:rPr lang="fr-CA" dirty="0" smtClean="0"/>
-              <a:t>modélisation et conception de convertisseurs d’électronique de puissance.</a:t>
-            </a:r>
-          </a:p>
-          <a:p>
-            <a:pPr lvl="1"/>
-            <a:r>
-              <a:rPr lang="fr-CA" dirty="0"/>
-              <a:t>simulation et commande des réseaux électriques</a:t>
-            </a:r>
-            <a:r>
-              <a:rPr lang="fr-CA" dirty="0" smtClean="0"/>
-              <a:t>;</a:t>
-            </a:r>
-          </a:p>
-          <a:p>
-            <a:r>
-              <a:rPr lang="fr-CA" dirty="0" smtClean="0"/>
-              <a:t>OPAL-RT est une compagnie spécialisée dans le développement de simulateurs temps réel PC/FPGA</a:t>
-            </a:r>
-          </a:p>
-          <a:p>
-            <a:endParaRPr lang="en-US" dirty="0" smtClean="0"/>
-          </a:p>
-          <a:p>
-            <a:pPr lvl="1"/>
-            <a:endParaRPr lang="en-US" dirty="0" smtClean="0"/>
-          </a:p>
-          <a:p>
-            <a:pPr lvl="1"/>
-            <a:endParaRPr lang="en-US" dirty="0"/>
-          </a:p>
-        </p:txBody>
-      </p:sp>
-    </p:spTree>
-    <p:extLst>
-      <p:ext uri="{BB962C8B-B14F-4D97-AF65-F5344CB8AC3E}">
-        <p14:creationId xmlns:p14="http://schemas.microsoft.com/office/powerpoint/2010/main" val="549106781"/>
-      </p:ext>
-    </p:extLst>
-  </p:cSld>
-  <p:clrMapOvr>
-    <a:masterClrMapping/>
-  </p:clrMapOvr>
-</p:sld>
-</file>
-
-<file path=ppt/slides/slide20.xml><?xml version="1.0" encoding="utf-8"?>
-<p:sld xmlns:a="http://schemas.openxmlformats.org/drawingml/2006/main" xmlns:r="http://schemas.openxmlformats.org/officeDocument/2006/relationships" xmlns:p="http://schemas.openxmlformats.org/presentationml/2006/main">
-  <p:cSld>
-    <p:spTree>
-      <p:nvGrpSpPr>
-        <p:cNvPr id="1" name=""/>
-        <p:cNvGrpSpPr/>
-        <p:nvPr/>
-      </p:nvGrpSpPr>
-      <p:grpSpPr>
-        <a:xfrm>
-          <a:off x="0" y="0"/>
-          <a:ext cx="0" cy="0"/>
-          <a:chOff x="0" y="0"/>
-          <a:chExt cx="0" cy="0"/>
-        </a:xfrm>
-      </p:grpSpPr>
-      <p:sp>
-        <p:nvSpPr>
-          <p:cNvPr id="2" name="Title 1"/>
-          <p:cNvSpPr>
-            <a:spLocks noGrp="1"/>
-          </p:cNvSpPr>
-          <p:nvPr>
-            <p:ph type="title"/>
-          </p:nvPr>
-        </p:nvSpPr>
-        <p:spPr>
-          <a:xfrm>
-            <a:off x="854900" y="3756882"/>
-            <a:ext cx="7434266" cy="649555"/>
-          </a:xfrm>
-        </p:spPr>
-        <p:txBody>
-          <a:bodyPr/>
-          <a:lstStyle/>
-          <a:p>
-            <a:pPr algn="ctr"/>
-            <a:r>
-              <a:rPr lang="fr-CA" dirty="0" smtClean="0"/>
-              <a:t>Résultats pour un « Buck »</a:t>
-            </a:r>
-            <a:endParaRPr lang="fr-CA" dirty="0"/>
-          </a:p>
-        </p:txBody>
-      </p:sp>
-      <p:sp>
-        <p:nvSpPr>
-          <p:cNvPr id="4" name="Text Placeholder 3"/>
-          <p:cNvSpPr>
-            <a:spLocks noGrp="1"/>
-          </p:cNvSpPr>
-          <p:nvPr>
-            <p:ph type="body" sz="half" idx="2"/>
-          </p:nvPr>
-        </p:nvSpPr>
-        <p:spPr>
-          <a:xfrm>
-            <a:off x="1690543" y="4638666"/>
-            <a:ext cx="5762981" cy="1666924"/>
+            <a:off x="423333" y="4572000"/>
+            <a:ext cx="7924800" cy="1733590"/>
           </a:xfrm>
         </p:spPr>
         <p:txBody>
@@ -8567,10 +9226,10 @@
           <a:lstStyle/>
           <a:p>
             <a:r>
-              <a:rPr lang="fr-CA" dirty="0" smtClean="0"/>
+              <a:rPr lang="fr-CA" sz="2000" dirty="0" smtClean="0"/>
               <a:t>Résultats obtenues suite à la simulation avec une résistance de charge (R1) de 4 Ohms, spécifié dans le tableur Excel (voir page 2). Pour une tension d’environ 6 Volt, le courant dans la charge est d’environ 1.5 ampères ce qui est prévu.</a:t>
             </a:r>
-            <a:endParaRPr lang="fr-CA" dirty="0"/>
+            <a:endParaRPr lang="fr-CA" sz="2000" dirty="0"/>
           </a:p>
         </p:txBody>
       </p:sp>
@@ -8711,7 +9370,7 @@
 </p:sld>
 </file>
 
-<file path=ppt/slides/slide21.xml><?xml version="1.0" encoding="utf-8"?>
+<file path=ppt/slides/slide26.xml><?xml version="1.0" encoding="utf-8"?>
 <p:sld xmlns:a="http://schemas.openxmlformats.org/drawingml/2006/main" xmlns:r="http://schemas.openxmlformats.org/officeDocument/2006/relationships" xmlns:p="http://schemas.openxmlformats.org/presentationml/2006/main">
   <p:cSld>
     <p:spTree>
@@ -8761,34 +9420,48 @@
             <p:ph idx="1"/>
           </p:nvPr>
         </p:nvSpPr>
-        <p:spPr/>
-        <p:txBody>
-          <a:bodyPr/>
-          <a:lstStyle/>
-          <a:p>
-            <a:r>
-              <a:rPr lang="fr-CA" dirty="0" smtClean="0"/>
+        <p:spPr>
+          <a:xfrm>
+            <a:off x="508001" y="1524000"/>
+            <a:ext cx="7721599" cy="4669763"/>
+          </a:xfrm>
+        </p:spPr>
+        <p:txBody>
+          <a:bodyPr>
+            <a:normAutofit/>
+          </a:bodyPr>
+          <a:lstStyle/>
+          <a:p>
+            <a:r>
+              <a:rPr lang="fr-CA" sz="2400" dirty="0" smtClean="0"/>
               <a:t>La liaison entre Excel et </a:t>
             </a:r>
             <a:r>
-              <a:rPr lang="fr-CA" dirty="0" err="1" smtClean="0"/>
+              <a:rPr lang="fr-CA" sz="2400" dirty="0" err="1" smtClean="0"/>
               <a:t>PSim</a:t>
             </a:r>
             <a:r>
-              <a:rPr lang="fr-CA" dirty="0" smtClean="0"/>
+              <a:rPr lang="fr-CA" sz="2400" dirty="0" smtClean="0"/>
               <a:t> est fonctionnelle. Toutefois, pour chaque modification du schéma ou des noms des composantes de la simulation, il est nécessaire de modifier le code VBA du fichier Excel pour permettre le lancement correct de la simulation.</a:t>
             </a:r>
           </a:p>
           <a:p>
             <a:r>
-              <a:rPr lang="fr-CA" dirty="0" smtClean="0"/>
+              <a:rPr lang="fr-CA" sz="2400" dirty="0" smtClean="0"/>
               <a:t>Possibilité de lecture des résultats de simulation directement dans Excel ou Matlab pour différents traitement. Il suffit d’enregistrer en format .</a:t>
             </a:r>
             <a:r>
-              <a:rPr lang="fr-CA" dirty="0" err="1" smtClean="0"/>
+              <a:rPr lang="fr-CA" sz="2400" dirty="0" err="1" smtClean="0"/>
               <a:t>txt</a:t>
             </a:r>
-            <a:endParaRPr lang="fr-CA" dirty="0"/>
+            <a:endParaRPr lang="fr-CA" sz="2400" dirty="0" smtClean="0"/>
+          </a:p>
+          <a:p>
+            <a:r>
+              <a:rPr lang="fr-CA" sz="2400" dirty="0" smtClean="0"/>
+              <a:t>Sera utile pour un post-traitement lié à l’outil de dimensionnement</a:t>
+            </a:r>
+            <a:endParaRPr lang="fr-CA" sz="2400" dirty="0"/>
           </a:p>
         </p:txBody>
       </p:sp>
@@ -8805,7 +9478,501 @@
 </p:sld>
 </file>
 
+<file path=ppt/slides/slide27.xml><?xml version="1.0" encoding="utf-8"?>
+<p:sld xmlns:a="http://schemas.openxmlformats.org/drawingml/2006/main" xmlns:r="http://schemas.openxmlformats.org/officeDocument/2006/relationships" xmlns:p="http://schemas.openxmlformats.org/presentationml/2006/main">
+  <p:cSld>
+    <p:spTree>
+      <p:nvGrpSpPr>
+        <p:cNvPr id="1" name=""/>
+        <p:cNvGrpSpPr/>
+        <p:nvPr/>
+      </p:nvGrpSpPr>
+      <p:grpSpPr>
+        <a:xfrm>
+          <a:off x="0" y="0"/>
+          <a:ext cx="0" cy="0"/>
+          <a:chOff x="0" y="0"/>
+          <a:chExt cx="0" cy="0"/>
+        </a:xfrm>
+      </p:grpSpPr>
+      <p:sp>
+        <p:nvSpPr>
+          <p:cNvPr id="4" name="Title 3"/>
+          <p:cNvSpPr>
+            <a:spLocks noGrp="1"/>
+          </p:cNvSpPr>
+          <p:nvPr>
+            <p:ph type="title"/>
+          </p:nvPr>
+        </p:nvSpPr>
+        <p:spPr>
+          <a:xfrm>
+            <a:off x="491068" y="0"/>
+            <a:ext cx="8889999" cy="1320800"/>
+          </a:xfrm>
+        </p:spPr>
+        <p:txBody>
+          <a:bodyPr/>
+          <a:lstStyle/>
+          <a:p>
+            <a:r>
+              <a:rPr lang="en-US" dirty="0" err="1" smtClean="0"/>
+              <a:t>Diagramme</a:t>
+            </a:r>
+            <a:r>
+              <a:rPr lang="en-US" dirty="0" smtClean="0"/>
+              <a:t> des </a:t>
+            </a:r>
+            <a:r>
+              <a:rPr lang="en-US" dirty="0" err="1" smtClean="0"/>
+              <a:t>fonctionnalités</a:t>
+            </a:r>
+            <a:endParaRPr lang="en-US" dirty="0"/>
+          </a:p>
+        </p:txBody>
+      </p:sp>
+      <p:pic>
+        <p:nvPicPr>
+          <p:cNvPr id="6" name="Picture 5" descr="diagramme_des_fonctionnalites.png"/>
+          <p:cNvPicPr>
+            <a:picLocks noChangeAspect="1"/>
+          </p:cNvPicPr>
+          <p:nvPr/>
+        </p:nvPicPr>
+        <p:blipFill>
+          <a:blip r:embed="rId2" cstate="print">
+            <a:extLst>
+              <a:ext uri="{28A0092B-C50C-407E-A947-70E740481C1C}">
+                <a14:useLocalDpi xmlns:a14="http://schemas.microsoft.com/office/drawing/2010/main" val="0"/>
+              </a:ext>
+            </a:extLst>
+          </a:blip>
+          <a:stretch>
+            <a:fillRect/>
+          </a:stretch>
+        </p:blipFill>
+        <p:spPr>
+          <a:xfrm>
+            <a:off x="1765300" y="169334"/>
+            <a:ext cx="5299364" cy="6858000"/>
+          </a:xfrm>
+          <a:prstGeom prst="rect">
+            <a:avLst/>
+          </a:prstGeom>
+        </p:spPr>
+      </p:pic>
+    </p:spTree>
+    <p:extLst>
+      <p:ext uri="{BB962C8B-B14F-4D97-AF65-F5344CB8AC3E}">
+        <p14:creationId xmlns:p14="http://schemas.microsoft.com/office/powerpoint/2010/main" val="3840410088"/>
+      </p:ext>
+    </p:extLst>
+  </p:cSld>
+  <p:clrMapOvr>
+    <a:masterClrMapping/>
+  </p:clrMapOvr>
+</p:sld>
+</file>
+
+<file path=ppt/slides/slide28.xml><?xml version="1.0" encoding="utf-8"?>
+<p:sld xmlns:a="http://schemas.openxmlformats.org/drawingml/2006/main" xmlns:r="http://schemas.openxmlformats.org/officeDocument/2006/relationships" xmlns:p="http://schemas.openxmlformats.org/presentationml/2006/main">
+  <p:cSld>
+    <p:spTree>
+      <p:nvGrpSpPr>
+        <p:cNvPr id="1" name=""/>
+        <p:cNvGrpSpPr/>
+        <p:nvPr/>
+      </p:nvGrpSpPr>
+      <p:grpSpPr>
+        <a:xfrm>
+          <a:off x="0" y="0"/>
+          <a:ext cx="0" cy="0"/>
+          <a:chOff x="0" y="0"/>
+          <a:chExt cx="0" cy="0"/>
+        </a:xfrm>
+      </p:grpSpPr>
+      <p:sp>
+        <p:nvSpPr>
+          <p:cNvPr id="4" name="Title 3"/>
+          <p:cNvSpPr>
+            <a:spLocks noGrp="1"/>
+          </p:cNvSpPr>
+          <p:nvPr>
+            <p:ph type="title"/>
+          </p:nvPr>
+        </p:nvSpPr>
+        <p:spPr>
+          <a:xfrm>
+            <a:off x="491068" y="186267"/>
+            <a:ext cx="8889999" cy="1320800"/>
+          </a:xfrm>
+        </p:spPr>
+        <p:txBody>
+          <a:bodyPr/>
+          <a:lstStyle/>
+          <a:p>
+            <a:r>
+              <a:rPr lang="en-US" dirty="0" err="1" smtClean="0"/>
+              <a:t>Diagramme</a:t>
+            </a:r>
+            <a:r>
+              <a:rPr lang="en-US" dirty="0" smtClean="0"/>
+              <a:t> physique</a:t>
+            </a:r>
+            <a:endParaRPr lang="en-US" dirty="0"/>
+          </a:p>
+        </p:txBody>
+      </p:sp>
+    </p:spTree>
+    <p:extLst>
+      <p:ext uri="{BB962C8B-B14F-4D97-AF65-F5344CB8AC3E}">
+        <p14:creationId xmlns:p14="http://schemas.microsoft.com/office/powerpoint/2010/main" val="3647025998"/>
+      </p:ext>
+    </p:extLst>
+  </p:cSld>
+  <p:clrMapOvr>
+    <a:masterClrMapping/>
+  </p:clrMapOvr>
+</p:sld>
+</file>
+
+<file path=ppt/slides/slide29.xml><?xml version="1.0" encoding="utf-8"?>
+<p:sld xmlns:a="http://schemas.openxmlformats.org/drawingml/2006/main" xmlns:r="http://schemas.openxmlformats.org/officeDocument/2006/relationships" xmlns:p="http://schemas.openxmlformats.org/presentationml/2006/main">
+  <p:cSld>
+    <p:spTree>
+      <p:nvGrpSpPr>
+        <p:cNvPr id="1" name=""/>
+        <p:cNvGrpSpPr/>
+        <p:nvPr/>
+      </p:nvGrpSpPr>
+      <p:grpSpPr>
+        <a:xfrm>
+          <a:off x="0" y="0"/>
+          <a:ext cx="0" cy="0"/>
+          <a:chOff x="0" y="0"/>
+          <a:chExt cx="0" cy="0"/>
+        </a:xfrm>
+      </p:grpSpPr>
+      <p:sp>
+        <p:nvSpPr>
+          <p:cNvPr id="2" name="Title 1"/>
+          <p:cNvSpPr>
+            <a:spLocks noGrp="1"/>
+          </p:cNvSpPr>
+          <p:nvPr>
+            <p:ph type="title"/>
+          </p:nvPr>
+        </p:nvSpPr>
+        <p:spPr/>
+        <p:txBody>
+          <a:bodyPr/>
+          <a:lstStyle/>
+          <a:p>
+            <a:r>
+              <a:rPr lang="en-US" dirty="0" smtClean="0"/>
+              <a:t>Plan de test</a:t>
+            </a:r>
+            <a:endParaRPr lang="en-US" dirty="0"/>
+          </a:p>
+        </p:txBody>
+      </p:sp>
+    </p:spTree>
+    <p:extLst>
+      <p:ext uri="{BB962C8B-B14F-4D97-AF65-F5344CB8AC3E}">
+        <p14:creationId xmlns:p14="http://schemas.microsoft.com/office/powerpoint/2010/main" val="1368373285"/>
+      </p:ext>
+    </p:extLst>
+  </p:cSld>
+  <p:clrMapOvr>
+    <a:masterClrMapping/>
+  </p:clrMapOvr>
+</p:sld>
+</file>
+
 <file path=ppt/slides/slide3.xml><?xml version="1.0" encoding="utf-8"?>
+<p:sld xmlns:a="http://schemas.openxmlformats.org/drawingml/2006/main" xmlns:r="http://schemas.openxmlformats.org/officeDocument/2006/relationships" xmlns:p="http://schemas.openxmlformats.org/presentationml/2006/main">
+  <p:cSld>
+    <p:spTree>
+      <p:nvGrpSpPr>
+        <p:cNvPr id="1" name=""/>
+        <p:cNvGrpSpPr/>
+        <p:nvPr/>
+      </p:nvGrpSpPr>
+      <p:grpSpPr>
+        <a:xfrm>
+          <a:off x="0" y="0"/>
+          <a:ext cx="0" cy="0"/>
+          <a:chOff x="0" y="0"/>
+          <a:chExt cx="0" cy="0"/>
+        </a:xfrm>
+      </p:grpSpPr>
+      <p:sp>
+        <p:nvSpPr>
+          <p:cNvPr id="4" name="Title 3"/>
+          <p:cNvSpPr>
+            <a:spLocks noGrp="1"/>
+          </p:cNvSpPr>
+          <p:nvPr>
+            <p:ph type="ctrTitle"/>
+          </p:nvPr>
+        </p:nvSpPr>
+        <p:spPr>
+          <a:xfrm>
+            <a:off x="135467" y="3251200"/>
+            <a:ext cx="6904702" cy="1646302"/>
+          </a:xfrm>
+        </p:spPr>
+        <p:txBody>
+          <a:bodyPr/>
+          <a:lstStyle/>
+          <a:p>
+            <a:r>
+              <a:rPr lang="fr-FR" b="1" dirty="0" err="1"/>
+              <a:t>Aperçu</a:t>
+            </a:r>
+            <a:r>
+              <a:rPr lang="fr-FR" b="1" dirty="0"/>
+              <a:t> du concept </a:t>
+            </a:r>
+            <a:r>
+              <a:rPr lang="fr-FR" b="1" dirty="0" smtClean="0"/>
+              <a:t>proposé et de la solution retenue (Simulation) </a:t>
+            </a:r>
+            <a:r>
+              <a:rPr lang="fr-FR" dirty="0"/>
+              <a:t/>
+            </a:r>
+            <a:br>
+              <a:rPr lang="fr-FR" dirty="0"/>
+            </a:br>
+            <a:endParaRPr lang="en-US" dirty="0"/>
+          </a:p>
+        </p:txBody>
+      </p:sp>
+      <p:sp>
+        <p:nvSpPr>
+          <p:cNvPr id="5" name="Subtitle 4"/>
+          <p:cNvSpPr>
+            <a:spLocks noGrp="1"/>
+          </p:cNvSpPr>
+          <p:nvPr>
+            <p:ph type="subTitle" idx="1"/>
+          </p:nvPr>
+        </p:nvSpPr>
+        <p:spPr/>
+        <p:txBody>
+          <a:bodyPr/>
+          <a:lstStyle/>
+          <a:p>
+            <a:r>
+              <a:rPr lang="en-US" dirty="0" err="1" smtClean="0"/>
+              <a:t>Aperçu</a:t>
+            </a:r>
+            <a:r>
+              <a:rPr lang="en-US" dirty="0" smtClean="0"/>
+              <a:t> des </a:t>
+            </a:r>
+            <a:r>
+              <a:rPr lang="en-US" dirty="0" err="1" smtClean="0"/>
+              <a:t>modèles</a:t>
+            </a:r>
+            <a:r>
+              <a:rPr lang="en-US" dirty="0" smtClean="0"/>
+              <a:t> de simulation </a:t>
+            </a:r>
+            <a:r>
+              <a:rPr lang="en-US" dirty="0" err="1" smtClean="0"/>
+              <a:t>implantés</a:t>
+            </a:r>
+            <a:endParaRPr lang="en-US" dirty="0"/>
+          </a:p>
+        </p:txBody>
+      </p:sp>
+    </p:spTree>
+    <p:extLst>
+      <p:ext uri="{BB962C8B-B14F-4D97-AF65-F5344CB8AC3E}">
+        <p14:creationId xmlns:p14="http://schemas.microsoft.com/office/powerpoint/2010/main" val="724386161"/>
+      </p:ext>
+    </p:extLst>
+  </p:cSld>
+  <p:clrMapOvr>
+    <a:masterClrMapping/>
+  </p:clrMapOvr>
+</p:sld>
+</file>
+
+<file path=ppt/slides/slide30.xml><?xml version="1.0" encoding="utf-8"?>
+<p:sld xmlns:a="http://schemas.openxmlformats.org/drawingml/2006/main" xmlns:r="http://schemas.openxmlformats.org/officeDocument/2006/relationships" xmlns:p="http://schemas.openxmlformats.org/presentationml/2006/main">
+  <p:cSld>
+    <p:spTree>
+      <p:nvGrpSpPr>
+        <p:cNvPr id="1" name=""/>
+        <p:cNvGrpSpPr/>
+        <p:nvPr/>
+      </p:nvGrpSpPr>
+      <p:grpSpPr>
+        <a:xfrm>
+          <a:off x="0" y="0"/>
+          <a:ext cx="0" cy="0"/>
+          <a:chOff x="0" y="0"/>
+          <a:chExt cx="0" cy="0"/>
+        </a:xfrm>
+      </p:grpSpPr>
+      <p:sp>
+        <p:nvSpPr>
+          <p:cNvPr id="2" name="Title 1"/>
+          <p:cNvSpPr>
+            <a:spLocks noGrp="1"/>
+          </p:cNvSpPr>
+          <p:nvPr>
+            <p:ph type="title"/>
+          </p:nvPr>
+        </p:nvSpPr>
+        <p:spPr/>
+        <p:txBody>
+          <a:bodyPr/>
+          <a:lstStyle/>
+          <a:p>
+            <a:r>
+              <a:rPr lang="en-US" dirty="0" err="1" smtClean="0"/>
+              <a:t>Appréciation</a:t>
+            </a:r>
+            <a:r>
+              <a:rPr lang="en-US" dirty="0" smtClean="0"/>
+              <a:t> du </a:t>
+            </a:r>
+            <a:r>
+              <a:rPr lang="en-US" dirty="0" err="1" smtClean="0"/>
+              <a:t>risque</a:t>
+            </a:r>
+            <a:endParaRPr lang="en-US" dirty="0"/>
+          </a:p>
+        </p:txBody>
+      </p:sp>
+    </p:spTree>
+    <p:extLst>
+      <p:ext uri="{BB962C8B-B14F-4D97-AF65-F5344CB8AC3E}">
+        <p14:creationId xmlns:p14="http://schemas.microsoft.com/office/powerpoint/2010/main" val="780506675"/>
+      </p:ext>
+    </p:extLst>
+  </p:cSld>
+  <p:clrMapOvr>
+    <a:masterClrMapping/>
+  </p:clrMapOvr>
+</p:sld>
+</file>
+
+<file path=ppt/slides/slide31.xml><?xml version="1.0" encoding="utf-8"?>
+<p:sld xmlns:a="http://schemas.openxmlformats.org/drawingml/2006/main" xmlns:r="http://schemas.openxmlformats.org/officeDocument/2006/relationships" xmlns:p="http://schemas.openxmlformats.org/presentationml/2006/main">
+  <p:cSld>
+    <p:spTree>
+      <p:nvGrpSpPr>
+        <p:cNvPr id="1" name=""/>
+        <p:cNvGrpSpPr/>
+        <p:nvPr/>
+      </p:nvGrpSpPr>
+      <p:grpSpPr>
+        <a:xfrm>
+          <a:off x="0" y="0"/>
+          <a:ext cx="0" cy="0"/>
+          <a:chOff x="0" y="0"/>
+          <a:chExt cx="0" cy="0"/>
+        </a:xfrm>
+      </p:grpSpPr>
+      <p:sp>
+        <p:nvSpPr>
+          <p:cNvPr id="2" name="Title 1"/>
+          <p:cNvSpPr>
+            <a:spLocks noGrp="1"/>
+          </p:cNvSpPr>
+          <p:nvPr>
+            <p:ph type="title"/>
+          </p:nvPr>
+        </p:nvSpPr>
+        <p:spPr/>
+        <p:txBody>
+          <a:bodyPr/>
+          <a:lstStyle/>
+          <a:p>
+            <a:r>
+              <a:rPr lang="en-US" dirty="0" err="1" smtClean="0"/>
+              <a:t>Diagramme</a:t>
+            </a:r>
+            <a:r>
+              <a:rPr lang="en-US" dirty="0" smtClean="0"/>
+              <a:t> de Gantt</a:t>
+            </a:r>
+            <a:endParaRPr lang="en-US" dirty="0"/>
+          </a:p>
+        </p:txBody>
+      </p:sp>
+    </p:spTree>
+    <p:extLst>
+      <p:ext uri="{BB962C8B-B14F-4D97-AF65-F5344CB8AC3E}">
+        <p14:creationId xmlns:p14="http://schemas.microsoft.com/office/powerpoint/2010/main" val="1805897856"/>
+      </p:ext>
+    </p:extLst>
+  </p:cSld>
+  <p:clrMapOvr>
+    <a:masterClrMapping/>
+  </p:clrMapOvr>
+</p:sld>
+</file>
+
+<file path=ppt/slides/slide32.xml><?xml version="1.0" encoding="utf-8"?>
+<p:sld xmlns:a="http://schemas.openxmlformats.org/drawingml/2006/main" xmlns:r="http://schemas.openxmlformats.org/officeDocument/2006/relationships" xmlns:p="http://schemas.openxmlformats.org/presentationml/2006/main">
+  <p:cSld>
+    <p:spTree>
+      <p:nvGrpSpPr>
+        <p:cNvPr id="1" name=""/>
+        <p:cNvGrpSpPr/>
+        <p:nvPr/>
+      </p:nvGrpSpPr>
+      <p:grpSpPr>
+        <a:xfrm>
+          <a:off x="0" y="0"/>
+          <a:ext cx="0" cy="0"/>
+          <a:chOff x="0" y="0"/>
+          <a:chExt cx="0" cy="0"/>
+        </a:xfrm>
+      </p:grpSpPr>
+      <p:sp>
+        <p:nvSpPr>
+          <p:cNvPr id="2" name="Title 1"/>
+          <p:cNvSpPr>
+            <a:spLocks noGrp="1"/>
+          </p:cNvSpPr>
+          <p:nvPr>
+            <p:ph type="title"/>
+          </p:nvPr>
+        </p:nvSpPr>
+        <p:spPr/>
+        <p:txBody>
+          <a:bodyPr/>
+          <a:lstStyle/>
+          <a:p>
+            <a:r>
+              <a:rPr lang="en-US" dirty="0" smtClean="0"/>
+              <a:t>WBS</a:t>
+            </a:r>
+            <a:endParaRPr lang="en-US" dirty="0"/>
+          </a:p>
+        </p:txBody>
+      </p:sp>
+    </p:spTree>
+    <p:extLst>
+      <p:ext uri="{BB962C8B-B14F-4D97-AF65-F5344CB8AC3E}">
+        <p14:creationId xmlns:p14="http://schemas.microsoft.com/office/powerpoint/2010/main" val="503940052"/>
+      </p:ext>
+    </p:extLst>
+  </p:cSld>
+  <p:clrMapOvr>
+    <a:masterClrMapping/>
+  </p:clrMapOvr>
+</p:sld>
+</file>
+
+<file path=ppt/slides/slide4.xml><?xml version="1.0" encoding="utf-8"?>
 <p:sld xmlns:a="http://schemas.openxmlformats.org/drawingml/2006/main" xmlns:r="http://schemas.openxmlformats.org/officeDocument/2006/relationships" xmlns:p="http://schemas.openxmlformats.org/presentationml/2006/main">
   <p:cSld>
     <p:spTree>
@@ -8892,214 +10059,6 @@
 </p:sld>
 </file>
 
-<file path=ppt/slides/slide4.xml><?xml version="1.0" encoding="utf-8"?>
-<p:sld xmlns:a="http://schemas.openxmlformats.org/drawingml/2006/main" xmlns:r="http://schemas.openxmlformats.org/officeDocument/2006/relationships" xmlns:p="http://schemas.openxmlformats.org/presentationml/2006/main">
-  <p:cSld>
-    <p:spTree>
-      <p:nvGrpSpPr>
-        <p:cNvPr id="1" name=""/>
-        <p:cNvGrpSpPr/>
-        <p:nvPr/>
-      </p:nvGrpSpPr>
-      <p:grpSpPr>
-        <a:xfrm>
-          <a:off x="0" y="0"/>
-          <a:ext cx="0" cy="0"/>
-          <a:chOff x="0" y="0"/>
-          <a:chExt cx="0" cy="0"/>
-        </a:xfrm>
-      </p:grpSpPr>
-      <p:sp>
-        <p:nvSpPr>
-          <p:cNvPr id="4" name="Title 3"/>
-          <p:cNvSpPr>
-            <a:spLocks noGrp="1"/>
-          </p:cNvSpPr>
-          <p:nvPr>
-            <p:ph type="title"/>
-          </p:nvPr>
-        </p:nvSpPr>
-        <p:spPr/>
-        <p:txBody>
-          <a:bodyPr/>
-          <a:lstStyle/>
-          <a:p>
-            <a:r>
-              <a:rPr lang="en-US" dirty="0" err="1" smtClean="0"/>
-              <a:t>Redresseur</a:t>
-            </a:r>
-            <a:r>
-              <a:rPr lang="en-US" dirty="0" smtClean="0"/>
-              <a:t> (AFE) </a:t>
-            </a:r>
-            <a:r>
-              <a:rPr lang="en-US" dirty="0" err="1" smtClean="0"/>
-              <a:t>c</a:t>
-            </a:r>
-            <a:r>
-              <a:rPr lang="en-US" dirty="0" err="1" smtClean="0"/>
-              <a:t>ôté</a:t>
-            </a:r>
-            <a:r>
-              <a:rPr lang="en-US" dirty="0" smtClean="0"/>
-              <a:t> </a:t>
-            </a:r>
-            <a:r>
-              <a:rPr lang="en-US" dirty="0" err="1" smtClean="0"/>
-              <a:t>réseau</a:t>
-            </a:r>
-            <a:endParaRPr lang="en-US" dirty="0"/>
-          </a:p>
-        </p:txBody>
-      </p:sp>
-      <p:sp>
-        <p:nvSpPr>
-          <p:cNvPr id="3" name="Espace réservé du contenu 2"/>
-          <p:cNvSpPr>
-            <a:spLocks noGrp="1"/>
-          </p:cNvSpPr>
-          <p:nvPr>
-            <p:ph idx="4294967295"/>
-          </p:nvPr>
-        </p:nvSpPr>
-        <p:spPr>
-          <a:xfrm>
-            <a:off x="0" y="1700213"/>
-            <a:ext cx="7548563" cy="5649912"/>
-          </a:xfrm>
-        </p:spPr>
-        <p:txBody>
-          <a:bodyPr>
-            <a:normAutofit/>
-          </a:bodyPr>
-          <a:lstStyle/>
-          <a:p>
-            <a:pPr marL="457200" lvl="1" indent="0">
-              <a:buClr>
-                <a:schemeClr val="tx2">
-                  <a:lumMod val="75000"/>
-                  <a:lumOff val="25000"/>
-                </a:schemeClr>
-              </a:buClr>
-              <a:buNone/>
-            </a:pPr>
-            <a:endParaRPr lang="en-CA" dirty="0" smtClean="0"/>
-          </a:p>
-          <a:p>
-            <a:r>
-              <a:rPr lang="fr-FR" sz="2300" dirty="0"/>
-              <a:t>Le réseau alternatif du Booster possède une tension de </a:t>
-            </a:r>
-            <a:r>
-              <a:rPr lang="fr-FR" sz="2300" dirty="0" smtClean="0"/>
-              <a:t>18kV à 50Hz </a:t>
-            </a:r>
-            <a:r>
-              <a:rPr lang="fr-FR" sz="2300" dirty="0"/>
-              <a:t>qui sera abaissée par un transformateur à </a:t>
-            </a:r>
-            <a:r>
-              <a:rPr lang="fr-FR" sz="2300" dirty="0" smtClean="0"/>
-              <a:t>2kV </a:t>
-            </a:r>
-            <a:r>
-              <a:rPr lang="fr-CA" sz="2300" dirty="0" smtClean="0"/>
-              <a:t>(2.5MVA</a:t>
-            </a:r>
-            <a:r>
-              <a:rPr lang="fr-CA" sz="2300" dirty="0"/>
-              <a:t>).</a:t>
-            </a:r>
-          </a:p>
-          <a:p>
-            <a:r>
-              <a:rPr lang="fr-FR" sz="2300" b="1" dirty="0" smtClean="0"/>
-              <a:t>L’AFE</a:t>
-            </a:r>
-            <a:r>
-              <a:rPr lang="fr-FR" sz="2300" dirty="0" smtClean="0"/>
-              <a:t> </a:t>
-            </a:r>
-            <a:r>
-              <a:rPr lang="fr-FR" sz="2300" dirty="0"/>
-              <a:t>(Active Front End) est un redresseur constitué de cellules de base NPC (</a:t>
-            </a:r>
-            <a:r>
-              <a:rPr lang="fr-FR" sz="2300" dirty="0" err="1"/>
-              <a:t>Neutral</a:t>
-            </a:r>
-            <a:r>
-              <a:rPr lang="fr-FR" sz="2300" dirty="0"/>
-              <a:t> Point </a:t>
-            </a:r>
-            <a:r>
-              <a:rPr lang="fr-FR" sz="2300" dirty="0" err="1"/>
-              <a:t>Clamped</a:t>
-            </a:r>
-            <a:r>
-              <a:rPr lang="fr-FR" sz="2300" dirty="0"/>
-              <a:t> </a:t>
-            </a:r>
-            <a:r>
-              <a:rPr lang="fr-FR" sz="2300" dirty="0" smtClean="0"/>
-              <a:t>) </a:t>
-            </a:r>
-            <a:r>
-              <a:rPr lang="fr-FR" sz="2300" dirty="0" smtClean="0"/>
-              <a:t>à </a:t>
-            </a:r>
-            <a:r>
-              <a:rPr lang="fr-FR" sz="2300" dirty="0" smtClean="0"/>
-              <a:t>3 niveaux à régulation de tension.</a:t>
-            </a:r>
-            <a:endParaRPr lang="fr-FR" sz="2300" dirty="0"/>
-          </a:p>
-          <a:p>
-            <a:r>
-              <a:rPr lang="fr-FR" sz="2300" dirty="0" smtClean="0"/>
-              <a:t>Le </a:t>
-            </a:r>
-            <a:r>
-              <a:rPr lang="fr-FR" sz="2300" dirty="0"/>
-              <a:t>condensateur C est un </a:t>
-            </a:r>
-            <a:r>
-              <a:rPr lang="fr-FR" sz="2300" dirty="0" smtClean="0"/>
-              <a:t>banc de condensateurs d’une capacité de 300mF </a:t>
-            </a:r>
-            <a:r>
-              <a:rPr lang="fr-FR" sz="2300" dirty="0"/>
-              <a:t>permettant de fournir la </a:t>
-            </a:r>
-            <a:r>
-              <a:rPr lang="fr-FR" sz="2300" dirty="0" smtClean="0"/>
-              <a:t>puissance excédentaire </a:t>
-            </a:r>
-            <a:r>
-              <a:rPr lang="fr-FR" sz="2300" dirty="0"/>
-              <a:t>requise, car le réseau est limité à 3.6MW crête</a:t>
-            </a:r>
-            <a:r>
-              <a:rPr lang="fr-FR" sz="2300" dirty="0" smtClean="0"/>
-              <a:t>.</a:t>
-            </a:r>
-            <a:endParaRPr lang="fr-FR" sz="2300" dirty="0"/>
-          </a:p>
-        </p:txBody>
-      </p:sp>
-    </p:spTree>
-    <p:extLst>
-      <p:ext uri="{BB962C8B-B14F-4D97-AF65-F5344CB8AC3E}">
-        <p14:creationId xmlns:p14="http://schemas.microsoft.com/office/powerpoint/2010/main" val="2485424715"/>
-      </p:ext>
-    </p:extLst>
-  </p:cSld>
-  <p:clrMapOvr>
-    <a:masterClrMapping/>
-  </p:clrMapOvr>
-</p:sld>
-</file>
-
 <file path=ppt/slides/slide5.xml><?xml version="1.0" encoding="utf-8"?>
 <p:sld xmlns:a="http://schemas.openxmlformats.org/drawingml/2006/main" xmlns:r="http://schemas.openxmlformats.org/officeDocument/2006/relationships" xmlns:p="http://schemas.openxmlformats.org/presentationml/2006/main">
   <p:cSld>
@@ -9129,6 +10088,219 @@
         </p:nvSpPr>
         <p:spPr>
           <a:xfrm>
+            <a:off x="558801" y="406400"/>
+            <a:ext cx="6447501" cy="1320800"/>
+          </a:xfrm>
+        </p:spPr>
+        <p:txBody>
+          <a:bodyPr/>
+          <a:lstStyle/>
+          <a:p>
+            <a:r>
+              <a:rPr lang="en-US" dirty="0" err="1" smtClean="0"/>
+              <a:t>Redresseur</a:t>
+            </a:r>
+            <a:r>
+              <a:rPr lang="en-US" dirty="0" smtClean="0"/>
+              <a:t> (AFE) </a:t>
+            </a:r>
+            <a:r>
+              <a:rPr lang="en-US" dirty="0" err="1" smtClean="0"/>
+              <a:t>c</a:t>
+            </a:r>
+            <a:r>
+              <a:rPr lang="en-US" dirty="0" err="1" smtClean="0"/>
+              <a:t>ôté</a:t>
+            </a:r>
+            <a:r>
+              <a:rPr lang="en-US" dirty="0" smtClean="0"/>
+              <a:t> </a:t>
+            </a:r>
+            <a:r>
+              <a:rPr lang="en-US" dirty="0" err="1" smtClean="0"/>
+              <a:t>réseau</a:t>
+            </a:r>
+            <a:endParaRPr lang="en-US" dirty="0"/>
+          </a:p>
+        </p:txBody>
+      </p:sp>
+      <p:sp>
+        <p:nvSpPr>
+          <p:cNvPr id="3" name="Espace réservé du contenu 2"/>
+          <p:cNvSpPr>
+            <a:spLocks noGrp="1"/>
+          </p:cNvSpPr>
+          <p:nvPr>
+            <p:ph idx="4294967295"/>
+          </p:nvPr>
+        </p:nvSpPr>
+        <p:spPr>
+          <a:xfrm>
+            <a:off x="0" y="1344613"/>
+            <a:ext cx="7548563" cy="5649912"/>
+          </a:xfrm>
+        </p:spPr>
+        <p:txBody>
+          <a:bodyPr>
+            <a:normAutofit/>
+          </a:bodyPr>
+          <a:lstStyle/>
+          <a:p>
+            <a:pPr marL="457200" lvl="1" indent="0">
+              <a:buClr>
+                <a:schemeClr val="tx2">
+                  <a:lumMod val="75000"/>
+                  <a:lumOff val="25000"/>
+                </a:schemeClr>
+              </a:buClr>
+              <a:buNone/>
+            </a:pPr>
+            <a:endParaRPr lang="en-CA" dirty="0" smtClean="0"/>
+          </a:p>
+          <a:p>
+            <a:r>
+              <a:rPr lang="fr-FR" sz="2300" dirty="0"/>
+              <a:t>Le réseau alternatif du Booster possède une tension de </a:t>
+            </a:r>
+            <a:r>
+              <a:rPr lang="fr-FR" sz="2300" dirty="0" smtClean="0"/>
+              <a:t>18kV à 50Hz </a:t>
+            </a:r>
+            <a:r>
+              <a:rPr lang="fr-FR" sz="2300" dirty="0"/>
+              <a:t>qui sera abaissée par un transformateur à </a:t>
+            </a:r>
+            <a:r>
+              <a:rPr lang="fr-FR" sz="2300" dirty="0" smtClean="0"/>
+              <a:t>2kV </a:t>
+            </a:r>
+            <a:r>
+              <a:rPr lang="fr-CA" sz="2300" dirty="0" smtClean="0"/>
+              <a:t>(2.5MVA</a:t>
+            </a:r>
+            <a:r>
+              <a:rPr lang="fr-CA" sz="2300" dirty="0"/>
+              <a:t>).</a:t>
+            </a:r>
+          </a:p>
+          <a:p>
+            <a:r>
+              <a:rPr lang="fr-FR" sz="2300" b="1" dirty="0" smtClean="0"/>
+              <a:t>L’AFE</a:t>
+            </a:r>
+            <a:r>
+              <a:rPr lang="fr-FR" sz="2300" dirty="0" smtClean="0"/>
+              <a:t> </a:t>
+            </a:r>
+            <a:r>
+              <a:rPr lang="fr-FR" sz="2300" dirty="0"/>
+              <a:t>(Active Front End) est un redresseur constitué de cellules de base NPC (</a:t>
+            </a:r>
+            <a:r>
+              <a:rPr lang="fr-FR" sz="2300" dirty="0" err="1"/>
+              <a:t>Neutral</a:t>
+            </a:r>
+            <a:r>
+              <a:rPr lang="fr-FR" sz="2300" dirty="0"/>
+              <a:t> Point </a:t>
+            </a:r>
+            <a:r>
+              <a:rPr lang="fr-FR" sz="2300" dirty="0" err="1"/>
+              <a:t>Clamped</a:t>
+            </a:r>
+            <a:r>
+              <a:rPr lang="fr-FR" sz="2300" dirty="0"/>
+              <a:t> </a:t>
+            </a:r>
+            <a:r>
+              <a:rPr lang="fr-FR" sz="2300" dirty="0" smtClean="0"/>
+              <a:t>) </a:t>
+            </a:r>
+            <a:r>
+              <a:rPr lang="fr-FR" sz="2300" dirty="0" smtClean="0"/>
+              <a:t>à </a:t>
+            </a:r>
+            <a:r>
+              <a:rPr lang="fr-FR" sz="2300" dirty="0" smtClean="0"/>
+              <a:t>3 niveaux à régulation de tension.</a:t>
+            </a:r>
+            <a:endParaRPr lang="fr-FR" sz="2300" dirty="0"/>
+          </a:p>
+          <a:p>
+            <a:r>
+              <a:rPr lang="fr-FR" sz="2300" dirty="0" smtClean="0"/>
+              <a:t>Le </a:t>
+            </a:r>
+            <a:r>
+              <a:rPr lang="fr-FR" sz="2300" dirty="0"/>
+              <a:t>condensateur C est un </a:t>
+            </a:r>
+            <a:r>
+              <a:rPr lang="fr-FR" sz="2300" dirty="0" smtClean="0"/>
+              <a:t>banc de condensateurs d’une capacité de 300mF </a:t>
+            </a:r>
+            <a:r>
+              <a:rPr lang="fr-FR" sz="2300" dirty="0"/>
+              <a:t>permettant de fournir la </a:t>
+            </a:r>
+            <a:r>
+              <a:rPr lang="fr-FR" sz="2300" dirty="0" smtClean="0"/>
+              <a:t>puissance excédentaire </a:t>
+            </a:r>
+            <a:r>
+              <a:rPr lang="fr-FR" sz="2300" dirty="0"/>
+              <a:t>requise, car le réseau est limité à 3.6MW crête</a:t>
+            </a:r>
+            <a:r>
+              <a:rPr lang="fr-FR" sz="2300" dirty="0" smtClean="0"/>
+              <a:t>.</a:t>
+            </a:r>
+            <a:endParaRPr lang="fr-FR" sz="2300" dirty="0"/>
+          </a:p>
+        </p:txBody>
+      </p:sp>
+    </p:spTree>
+    <p:extLst>
+      <p:ext uri="{BB962C8B-B14F-4D97-AF65-F5344CB8AC3E}">
+        <p14:creationId xmlns:p14="http://schemas.microsoft.com/office/powerpoint/2010/main" val="2485424715"/>
+      </p:ext>
+    </p:extLst>
+  </p:cSld>
+  <p:clrMapOvr>
+    <a:masterClrMapping/>
+  </p:clrMapOvr>
+</p:sld>
+</file>
+
+<file path=ppt/slides/slide6.xml><?xml version="1.0" encoding="utf-8"?>
+<p:sld xmlns:a="http://schemas.openxmlformats.org/drawingml/2006/main" xmlns:r="http://schemas.openxmlformats.org/officeDocument/2006/relationships" xmlns:p="http://schemas.openxmlformats.org/presentationml/2006/main">
+  <p:cSld>
+    <p:spTree>
+      <p:nvGrpSpPr>
+        <p:cNvPr id="1" name=""/>
+        <p:cNvGrpSpPr/>
+        <p:nvPr/>
+      </p:nvGrpSpPr>
+      <p:grpSpPr>
+        <a:xfrm>
+          <a:off x="0" y="0"/>
+          <a:ext cx="0" cy="0"/>
+          <a:chOff x="0" y="0"/>
+          <a:chExt cx="0" cy="0"/>
+        </a:xfrm>
+      </p:grpSpPr>
+      <p:sp>
+        <p:nvSpPr>
+          <p:cNvPr id="4" name="Title 3"/>
+          <p:cNvSpPr>
+            <a:spLocks noGrp="1"/>
+          </p:cNvSpPr>
+          <p:nvPr>
+            <p:ph type="title"/>
+          </p:nvPr>
+        </p:nvSpPr>
+        <p:spPr>
+          <a:xfrm>
             <a:off x="508001" y="321733"/>
             <a:ext cx="7450666" cy="1320800"/>
           </a:xfrm>
@@ -9282,7 +10454,392 @@
 </p:sld>
 </file>
 
-<file path=ppt/slides/slide6.xml><?xml version="1.0" encoding="utf-8"?>
+<file path=ppt/slides/slide7.xml><?xml version="1.0" encoding="utf-8"?>
+<p:sld xmlns:a="http://schemas.openxmlformats.org/drawingml/2006/main" xmlns:r="http://schemas.openxmlformats.org/officeDocument/2006/relationships" xmlns:p="http://schemas.openxmlformats.org/presentationml/2006/main">
+  <p:cSld>
+    <p:spTree>
+      <p:nvGrpSpPr>
+        <p:cNvPr id="1" name=""/>
+        <p:cNvGrpSpPr/>
+        <p:nvPr/>
+      </p:nvGrpSpPr>
+      <p:grpSpPr>
+        <a:xfrm>
+          <a:off x="0" y="0"/>
+          <a:ext cx="0" cy="0"/>
+          <a:chOff x="0" y="0"/>
+          <a:chExt cx="0" cy="0"/>
+        </a:xfrm>
+      </p:grpSpPr>
+      <p:sp>
+        <p:nvSpPr>
+          <p:cNvPr id="2" name="Title 1"/>
+          <p:cNvSpPr>
+            <a:spLocks noGrp="1"/>
+          </p:cNvSpPr>
+          <p:nvPr>
+            <p:ph type="title"/>
+          </p:nvPr>
+        </p:nvSpPr>
+        <p:spPr/>
+        <p:txBody>
+          <a:bodyPr/>
+          <a:lstStyle/>
+          <a:p>
+            <a:r>
+              <a:rPr lang="en-US" dirty="0" err="1" smtClean="0"/>
+              <a:t>Méthode</a:t>
+            </a:r>
+            <a:r>
+              <a:rPr lang="en-US" dirty="0" smtClean="0"/>
+              <a:t> de </a:t>
+            </a:r>
+            <a:r>
+              <a:rPr lang="en-US" dirty="0" err="1" smtClean="0"/>
+              <a:t>commande</a:t>
+            </a:r>
+            <a:r>
+              <a:rPr lang="en-US" dirty="0" smtClean="0"/>
+              <a:t> de </a:t>
+            </a:r>
+            <a:r>
+              <a:rPr lang="en-US" dirty="0" err="1" smtClean="0"/>
+              <a:t>l’AFE</a:t>
+            </a:r>
+            <a:endParaRPr lang="en-US" dirty="0"/>
+          </a:p>
+        </p:txBody>
+      </p:sp>
+    </p:spTree>
+    <p:extLst>
+      <p:ext uri="{BB962C8B-B14F-4D97-AF65-F5344CB8AC3E}">
+        <p14:creationId xmlns:p14="http://schemas.microsoft.com/office/powerpoint/2010/main" val="822005438"/>
+      </p:ext>
+    </p:extLst>
+  </p:cSld>
+  <p:clrMapOvr>
+    <a:masterClrMapping/>
+  </p:clrMapOvr>
+</p:sld>
+</file>
+
+<file path=ppt/slides/slide8.xml><?xml version="1.0" encoding="utf-8"?>
+<p:sld xmlns:a="http://schemas.openxmlformats.org/drawingml/2006/main" xmlns:r="http://schemas.openxmlformats.org/officeDocument/2006/relationships" xmlns:p="http://schemas.openxmlformats.org/presentationml/2006/main">
+  <p:cSld>
+    <p:spTree>
+      <p:nvGrpSpPr>
+        <p:cNvPr id="1" name=""/>
+        <p:cNvGrpSpPr/>
+        <p:nvPr/>
+      </p:nvGrpSpPr>
+      <p:grpSpPr>
+        <a:xfrm>
+          <a:off x="0" y="0"/>
+          <a:ext cx="0" cy="0"/>
+          <a:chOff x="0" y="0"/>
+          <a:chExt cx="0" cy="0"/>
+        </a:xfrm>
+      </p:grpSpPr>
+      <p:sp>
+        <p:nvSpPr>
+          <p:cNvPr id="2" name="Title 1"/>
+          <p:cNvSpPr>
+            <a:spLocks noGrp="1"/>
+          </p:cNvSpPr>
+          <p:nvPr>
+            <p:ph type="title"/>
+          </p:nvPr>
+        </p:nvSpPr>
+        <p:spPr>
+          <a:xfrm>
+            <a:off x="508001" y="135467"/>
+            <a:ext cx="6447501" cy="1320800"/>
+          </a:xfrm>
+        </p:spPr>
+        <p:txBody>
+          <a:bodyPr/>
+          <a:lstStyle/>
+          <a:p>
+            <a:r>
+              <a:rPr lang="en-US" dirty="0" err="1" smtClean="0"/>
+              <a:t>Méthode</a:t>
+            </a:r>
+            <a:r>
+              <a:rPr lang="en-US" dirty="0" smtClean="0"/>
+              <a:t> de </a:t>
+            </a:r>
+            <a:r>
+              <a:rPr lang="en-US" dirty="0" err="1" smtClean="0"/>
+              <a:t>commande</a:t>
+            </a:r>
+            <a:r>
+              <a:rPr lang="en-US" dirty="0" smtClean="0"/>
+              <a:t> des blocs </a:t>
+            </a:r>
+            <a:r>
+              <a:rPr lang="en-US" dirty="0" err="1" smtClean="0"/>
+              <a:t>DCp,DCn</a:t>
+            </a:r>
+            <a:endParaRPr lang="en-US" dirty="0"/>
+          </a:p>
+        </p:txBody>
+      </p:sp>
+      <p:pic>
+        <p:nvPicPr>
+          <p:cNvPr id="3" name="Picture 2" descr="commande_NPC_1.png"/>
+          <p:cNvPicPr>
+            <a:picLocks noChangeAspect="1"/>
+          </p:cNvPicPr>
+          <p:nvPr/>
+        </p:nvPicPr>
+        <p:blipFill>
+          <a:blip r:embed="rId2" cstate="print">
+            <a:extLst>
+              <a:ext uri="{28A0092B-C50C-407E-A947-70E740481C1C}">
+                <a14:useLocalDpi xmlns:a14="http://schemas.microsoft.com/office/drawing/2010/main" val="0"/>
+              </a:ext>
+            </a:extLst>
+          </a:blip>
+          <a:stretch>
+            <a:fillRect/>
+          </a:stretch>
+        </p:blipFill>
+        <p:spPr>
+          <a:xfrm>
+            <a:off x="1066806" y="1413934"/>
+            <a:ext cx="6350000" cy="2582332"/>
+          </a:xfrm>
+          <a:prstGeom prst="rect">
+            <a:avLst/>
+          </a:prstGeom>
+        </p:spPr>
+      </p:pic>
+      <p:sp>
+        <p:nvSpPr>
+          <p:cNvPr id="4" name="Rectangle 3"/>
+          <p:cNvSpPr/>
+          <p:nvPr/>
+        </p:nvSpPr>
+        <p:spPr>
+          <a:xfrm>
+            <a:off x="508006" y="4162695"/>
+            <a:ext cx="8077194" cy="2308324"/>
+          </a:xfrm>
+          <a:prstGeom prst="rect">
+            <a:avLst/>
+          </a:prstGeom>
+        </p:spPr>
+        <p:txBody>
+          <a:bodyPr wrap="square">
+            <a:spAutoFit/>
+          </a:bodyPr>
+          <a:lstStyle/>
+          <a:p>
+            <a:pPr marL="742950" lvl="1" indent="-285750">
+              <a:buClr>
+                <a:schemeClr val="tx2">
+                  <a:lumMod val="75000"/>
+                  <a:lumOff val="25000"/>
+                </a:schemeClr>
+              </a:buClr>
+              <a:buFont typeface="Arial"/>
+              <a:buChar char="•"/>
+            </a:pPr>
+            <a:r>
+              <a:rPr lang="en-CA" sz="2400" dirty="0" err="1" smtClean="0"/>
+              <a:t>Comparaison</a:t>
+            </a:r>
+            <a:r>
+              <a:rPr lang="en-CA" sz="2400" dirty="0" smtClean="0"/>
+              <a:t> entre le signal </a:t>
+            </a:r>
+            <a:r>
+              <a:rPr lang="en-CA" sz="2400" dirty="0" err="1" smtClean="0"/>
+              <a:t>d’erreur</a:t>
+            </a:r>
+            <a:r>
+              <a:rPr lang="en-CA" sz="2400" dirty="0" smtClean="0"/>
+              <a:t> et </a:t>
+            </a:r>
+            <a:r>
+              <a:rPr lang="en-CA" sz="2400" dirty="0" err="1" smtClean="0"/>
+              <a:t>trois</a:t>
+            </a:r>
+            <a:r>
+              <a:rPr lang="en-CA" sz="2400" dirty="0" smtClean="0"/>
+              <a:t> </a:t>
+            </a:r>
+            <a:r>
+              <a:rPr lang="en-CA" sz="2400" dirty="0" err="1" smtClean="0"/>
+              <a:t>signaux</a:t>
+            </a:r>
+            <a:r>
+              <a:rPr lang="en-CA" sz="2400" dirty="0" smtClean="0"/>
+              <a:t> en dent de </a:t>
+            </a:r>
+            <a:r>
+              <a:rPr lang="en-CA" sz="2400" dirty="0" err="1" smtClean="0"/>
+              <a:t>scie</a:t>
+            </a:r>
+            <a:endParaRPr lang="en-CA" sz="2400" dirty="0" smtClean="0"/>
+          </a:p>
+          <a:p>
+            <a:pPr marL="742950" lvl="1" indent="-285750">
+              <a:buClr>
+                <a:schemeClr val="tx2">
+                  <a:lumMod val="75000"/>
+                  <a:lumOff val="25000"/>
+                </a:schemeClr>
+              </a:buClr>
+              <a:buFont typeface="Arial"/>
+              <a:buChar char="•"/>
+            </a:pPr>
+            <a:r>
+              <a:rPr lang="en-CA" sz="2400" dirty="0" smtClean="0"/>
+              <a:t>Activation de la </a:t>
+            </a:r>
+            <a:r>
+              <a:rPr lang="en-CA" sz="2400" dirty="0" err="1" smtClean="0"/>
+              <a:t>paire</a:t>
+            </a:r>
+            <a:r>
+              <a:rPr lang="en-CA" sz="2400" dirty="0" smtClean="0"/>
+              <a:t> </a:t>
+            </a:r>
+            <a:r>
+              <a:rPr lang="en-CA" sz="2400" dirty="0" err="1" smtClean="0"/>
+              <a:t>d’IGBT</a:t>
+            </a:r>
+            <a:r>
+              <a:rPr lang="en-CA" sz="2400" dirty="0" smtClean="0"/>
+              <a:t> </a:t>
+            </a:r>
+            <a:r>
+              <a:rPr lang="en-CA" sz="2400" dirty="0" err="1" smtClean="0"/>
+              <a:t>associée</a:t>
+            </a:r>
+            <a:r>
+              <a:rPr lang="en-CA" sz="2400" dirty="0" smtClean="0"/>
+              <a:t> pendant le temps </a:t>
+            </a:r>
+            <a:r>
+              <a:rPr lang="en-CA" sz="2400" dirty="0" err="1" smtClean="0"/>
+              <a:t>calculé</a:t>
+            </a:r>
+            <a:r>
+              <a:rPr lang="en-CA" sz="2400" dirty="0" smtClean="0"/>
+              <a:t> </a:t>
+            </a:r>
+          </a:p>
+          <a:p>
+            <a:pPr marL="742950" lvl="1" indent="-285750">
+              <a:buClr>
+                <a:schemeClr val="tx2">
+                  <a:lumMod val="75000"/>
+                  <a:lumOff val="25000"/>
+                </a:schemeClr>
+              </a:buClr>
+              <a:buFont typeface="Arial"/>
+              <a:buChar char="•"/>
+            </a:pPr>
+            <a:r>
+              <a:rPr lang="en-CA" sz="2400" dirty="0" err="1" smtClean="0"/>
+              <a:t>Chaque</a:t>
+            </a:r>
+            <a:r>
+              <a:rPr lang="en-CA" sz="2400" dirty="0" smtClean="0"/>
+              <a:t> bras </a:t>
+            </a:r>
+            <a:r>
+              <a:rPr lang="en-CA" sz="2400" dirty="0" err="1" smtClean="0"/>
+              <a:t>est</a:t>
+            </a:r>
+            <a:r>
+              <a:rPr lang="en-CA" sz="2400" dirty="0" smtClean="0"/>
+              <a:t> </a:t>
+            </a:r>
+            <a:r>
+              <a:rPr lang="en-CA" sz="2400" dirty="0" err="1" smtClean="0"/>
+              <a:t>commandé</a:t>
+            </a:r>
+            <a:r>
+              <a:rPr lang="en-CA" sz="2400" dirty="0" smtClean="0"/>
+              <a:t> </a:t>
+            </a:r>
+            <a:r>
+              <a:rPr lang="en-CA" sz="2400" dirty="0" err="1" smtClean="0"/>
+              <a:t>à</a:t>
+            </a:r>
+            <a:r>
+              <a:rPr lang="en-CA" sz="2400" dirty="0" smtClean="0"/>
+              <a:t> un </a:t>
+            </a:r>
+            <a:r>
+              <a:rPr lang="en-CA" sz="2400" dirty="0" err="1" smtClean="0"/>
+              <a:t>intervalle</a:t>
+            </a:r>
+            <a:r>
+              <a:rPr lang="en-CA" sz="2400" dirty="0" smtClean="0"/>
+              <a:t> de 3ms</a:t>
+            </a:r>
+          </a:p>
+          <a:p>
+            <a:pPr marL="742950" lvl="1" indent="-285750">
+              <a:buClr>
+                <a:schemeClr val="tx2">
+                  <a:lumMod val="75000"/>
+                  <a:lumOff val="25000"/>
+                </a:schemeClr>
+              </a:buClr>
+              <a:buFont typeface="Arial"/>
+              <a:buChar char="•"/>
+            </a:pPr>
+            <a:r>
+              <a:rPr lang="en-CA" sz="2400" dirty="0" smtClean="0"/>
+              <a:t>La </a:t>
+            </a:r>
+            <a:r>
+              <a:rPr lang="en-CA" sz="2400" dirty="0" err="1" smtClean="0"/>
+              <a:t>commande</a:t>
+            </a:r>
+            <a:r>
+              <a:rPr lang="en-CA" sz="2400" dirty="0" smtClean="0"/>
+              <a:t> des bras </a:t>
+            </a:r>
+            <a:r>
+              <a:rPr lang="en-CA" sz="2400" dirty="0" err="1" smtClean="0"/>
+              <a:t>est</a:t>
+            </a:r>
+            <a:r>
+              <a:rPr lang="en-CA" sz="2400" dirty="0" smtClean="0"/>
+              <a:t> </a:t>
+            </a:r>
+            <a:r>
+              <a:rPr lang="en-CA" sz="2400" dirty="0" err="1" smtClean="0"/>
+              <a:t>décalée</a:t>
+            </a:r>
+            <a:r>
+              <a:rPr lang="en-CA" sz="2400" dirty="0" smtClean="0"/>
+              <a:t> de 1ms</a:t>
+            </a:r>
+            <a:endParaRPr lang="en-CA" sz="2400" dirty="0"/>
+          </a:p>
+        </p:txBody>
+      </p:sp>
+    </p:spTree>
+    <p:extLst>
+      <p:ext uri="{BB962C8B-B14F-4D97-AF65-F5344CB8AC3E}">
+        <p14:creationId xmlns:p14="http://schemas.microsoft.com/office/powerpoint/2010/main" val="148882663"/>
+      </p:ext>
+    </p:extLst>
+  </p:cSld>
+  <p:clrMapOvr>
+    <a:masterClrMapping/>
+  </p:clrMapOvr>
+</p:sld>
+</file>
+
+<file path=ppt/slides/slide9.xml><?xml version="1.0" encoding="utf-8"?>
 <p:sld xmlns:a="http://schemas.openxmlformats.org/drawingml/2006/main" xmlns:r="http://schemas.openxmlformats.org/officeDocument/2006/relationships" xmlns:p="http://schemas.openxmlformats.org/presentationml/2006/main">
   <p:cSld>
     <p:spTree>
@@ -9396,455 +10953,6 @@
     <p:extLst>
       <p:ext uri="{BB962C8B-B14F-4D97-AF65-F5344CB8AC3E}">
         <p14:creationId xmlns:p14="http://schemas.microsoft.com/office/powerpoint/2010/main" val="3912341698"/>
-      </p:ext>
-    </p:extLst>
-  </p:cSld>
-  <p:clrMapOvr>
-    <a:masterClrMapping/>
-  </p:clrMapOvr>
-</p:sld>
-</file>
-
-<file path=ppt/slides/slide7.xml><?xml version="1.0" encoding="utf-8"?>
-<p:sld xmlns:a="http://schemas.openxmlformats.org/drawingml/2006/main" xmlns:r="http://schemas.openxmlformats.org/officeDocument/2006/relationships" xmlns:p="http://schemas.openxmlformats.org/presentationml/2006/main">
-  <p:cSld>
-    <p:spTree>
-      <p:nvGrpSpPr>
-        <p:cNvPr id="1" name=""/>
-        <p:cNvGrpSpPr/>
-        <p:nvPr/>
-      </p:nvGrpSpPr>
-      <p:grpSpPr>
-        <a:xfrm>
-          <a:off x="0" y="0"/>
-          <a:ext cx="0" cy="0"/>
-          <a:chOff x="0" y="0"/>
-          <a:chExt cx="0" cy="0"/>
-        </a:xfrm>
-      </p:grpSpPr>
-      <p:sp>
-        <p:nvSpPr>
-          <p:cNvPr id="2" name="Titre 1"/>
-          <p:cNvSpPr>
-            <a:spLocks noGrp="1"/>
-          </p:cNvSpPr>
-          <p:nvPr>
-            <p:ph type="title"/>
-          </p:nvPr>
-        </p:nvSpPr>
-        <p:spPr/>
-        <p:txBody>
-          <a:bodyPr/>
-          <a:lstStyle/>
-          <a:p>
-            <a:r>
-              <a:rPr lang="en-CA" dirty="0" err="1" smtClean="0"/>
-              <a:t>Commande</a:t>
-            </a:r>
-            <a:r>
-              <a:rPr lang="en-CA" dirty="0" smtClean="0"/>
-              <a:t> de AFE</a:t>
-            </a:r>
-            <a:br>
-              <a:rPr lang="en-CA" dirty="0" smtClean="0"/>
-            </a:br>
-            <a:r>
-              <a:rPr lang="en-CA" dirty="0"/>
-              <a:t>	</a:t>
-            </a:r>
-            <a:endParaRPr lang="fr-CA" dirty="0"/>
-          </a:p>
-        </p:txBody>
-      </p:sp>
-      <p:sp>
-        <p:nvSpPr>
-          <p:cNvPr id="3" name="Espace réservé du contenu 2"/>
-          <p:cNvSpPr>
-            <a:spLocks noGrp="1"/>
-          </p:cNvSpPr>
-          <p:nvPr>
-            <p:ph idx="1"/>
-          </p:nvPr>
-        </p:nvSpPr>
-        <p:spPr/>
-        <p:txBody>
-          <a:bodyPr/>
-          <a:lstStyle/>
-          <a:p>
-            <a:endParaRPr lang="fr-CA" dirty="0"/>
-          </a:p>
-        </p:txBody>
-      </p:sp>
-      <p:pic>
-        <p:nvPicPr>
-          <p:cNvPr id="2050" name="Picture 2"/>
-          <p:cNvPicPr>
-            <a:picLocks noChangeAspect="1" noChangeArrowheads="1"/>
-          </p:cNvPicPr>
-          <p:nvPr/>
-        </p:nvPicPr>
-        <p:blipFill>
-          <a:blip r:embed="rId2">
-            <a:extLst>
-              <a:ext uri="{28A0092B-C50C-407E-A947-70E740481C1C}">
-                <a14:useLocalDpi xmlns:a14="http://schemas.microsoft.com/office/drawing/2010/main" val="0"/>
-              </a:ext>
-            </a:extLst>
-          </a:blip>
-          <a:srcRect/>
-          <a:stretch>
-            <a:fillRect/>
-          </a:stretch>
-        </p:blipFill>
-        <p:spPr bwMode="auto">
-          <a:xfrm>
-            <a:off x="391886" y="1547380"/>
-            <a:ext cx="7844517" cy="4635026"/>
-          </a:xfrm>
-          <a:prstGeom prst="rect">
-            <a:avLst/>
-          </a:prstGeom>
-          <a:noFill/>
-          <a:ln>
-            <a:noFill/>
-          </a:ln>
-          <a:extLst>
-            <a:ext uri="{909E8E84-426E-40dd-AFC4-6F175D3DCCD1}">
-              <a14:hiddenFill xmlns:a14="http://schemas.microsoft.com/office/drawing/2010/main">
-                <a:solidFill>
-                  <a:schemeClr val="accent1"/>
-                </a:solidFill>
-              </a14:hiddenFill>
-            </a:ext>
-            <a:ext uri="{91240B29-F687-4f45-9708-019B960494DF}">
-              <a14:hiddenLine xmlns:a14="http://schemas.microsoft.com/office/drawing/2010/main" w="9525">
-                <a:solidFill>
-                  <a:schemeClr val="tx1"/>
-                </a:solidFill>
-                <a:miter lim="800000"/>
-                <a:headEnd/>
-                <a:tailEnd/>
-              </a14:hiddenLine>
-            </a:ext>
-          </a:extLst>
-        </p:spPr>
-      </p:pic>
-      <p:sp>
-        <p:nvSpPr>
-          <p:cNvPr id="4" name="ZoneTexte 3"/>
-          <p:cNvSpPr txBox="1"/>
-          <p:nvPr/>
-        </p:nvSpPr>
-        <p:spPr>
-          <a:xfrm>
-            <a:off x="598715" y="1362714"/>
-            <a:ext cx="2592376" cy="369332"/>
-          </a:xfrm>
-          <a:prstGeom prst="rect">
-            <a:avLst/>
-          </a:prstGeom>
-          <a:noFill/>
-        </p:spPr>
-        <p:txBody>
-          <a:bodyPr wrap="none" rtlCol="0">
-            <a:spAutoFit/>
-          </a:bodyPr>
-          <a:lstStyle/>
-          <a:p>
-            <a:r>
-              <a:rPr lang="en-CA" dirty="0" err="1" smtClean="0"/>
-              <a:t>Méthode</a:t>
-            </a:r>
-            <a:r>
-              <a:rPr lang="en-CA" dirty="0" smtClean="0"/>
-              <a:t> par </a:t>
-            </a:r>
-            <a:r>
-              <a:rPr lang="en-CA" dirty="0" err="1" smtClean="0"/>
-              <a:t>Hystérésis</a:t>
-            </a:r>
-            <a:endParaRPr lang="fr-CA" dirty="0"/>
-          </a:p>
-        </p:txBody>
-      </p:sp>
-    </p:spTree>
-    <p:extLst>
-      <p:ext uri="{BB962C8B-B14F-4D97-AF65-F5344CB8AC3E}">
-        <p14:creationId xmlns:p14="http://schemas.microsoft.com/office/powerpoint/2010/main" val="2824389839"/>
-      </p:ext>
-    </p:extLst>
-  </p:cSld>
-  <p:clrMapOvr>
-    <a:masterClrMapping/>
-  </p:clrMapOvr>
-</p:sld>
-</file>
-
-<file path=ppt/slides/slide8.xml><?xml version="1.0" encoding="utf-8"?>
-<p:sld xmlns:a="http://schemas.openxmlformats.org/drawingml/2006/main" xmlns:r="http://schemas.openxmlformats.org/officeDocument/2006/relationships" xmlns:p="http://schemas.openxmlformats.org/presentationml/2006/main">
-  <p:cSld>
-    <p:spTree>
-      <p:nvGrpSpPr>
-        <p:cNvPr id="1" name=""/>
-        <p:cNvGrpSpPr/>
-        <p:nvPr/>
-      </p:nvGrpSpPr>
-      <p:grpSpPr>
-        <a:xfrm>
-          <a:off x="0" y="0"/>
-          <a:ext cx="0" cy="0"/>
-          <a:chOff x="0" y="0"/>
-          <a:chExt cx="0" cy="0"/>
-        </a:xfrm>
-      </p:grpSpPr>
-      <p:sp>
-        <p:nvSpPr>
-          <p:cNvPr id="3" name="Espace réservé du contenu 2"/>
-          <p:cNvSpPr>
-            <a:spLocks noGrp="1"/>
-          </p:cNvSpPr>
-          <p:nvPr>
-            <p:ph idx="1"/>
-          </p:nvPr>
-        </p:nvSpPr>
-        <p:spPr/>
-        <p:txBody>
-          <a:bodyPr/>
-          <a:lstStyle/>
-          <a:p>
-            <a:endParaRPr lang="fr-CA" dirty="0"/>
-          </a:p>
-        </p:txBody>
-      </p:sp>
-      <p:pic>
-        <p:nvPicPr>
-          <p:cNvPr id="3074" name="Picture 2"/>
-          <p:cNvPicPr>
-            <a:picLocks noChangeAspect="1" noChangeArrowheads="1"/>
-          </p:cNvPicPr>
-          <p:nvPr/>
-        </p:nvPicPr>
-        <p:blipFill>
-          <a:blip r:embed="rId2">
-            <a:extLst>
-              <a:ext uri="{28A0092B-C50C-407E-A947-70E740481C1C}">
-                <a14:useLocalDpi xmlns:a14="http://schemas.microsoft.com/office/drawing/2010/main" val="0"/>
-              </a:ext>
-            </a:extLst>
-          </a:blip>
-          <a:srcRect/>
-          <a:stretch>
-            <a:fillRect/>
-          </a:stretch>
-        </p:blipFill>
-        <p:spPr bwMode="auto">
-          <a:xfrm>
-            <a:off x="796018" y="1436915"/>
-            <a:ext cx="7292209" cy="4696506"/>
-          </a:xfrm>
-          <a:prstGeom prst="rect">
-            <a:avLst/>
-          </a:prstGeom>
-          <a:noFill/>
-          <a:ln>
-            <a:noFill/>
-          </a:ln>
-          <a:extLst>
-            <a:ext uri="{909E8E84-426E-40dd-AFC4-6F175D3DCCD1}">
-              <a14:hiddenFill xmlns:a14="http://schemas.microsoft.com/office/drawing/2010/main">
-                <a:solidFill>
-                  <a:schemeClr val="accent1"/>
-                </a:solidFill>
-              </a14:hiddenFill>
-            </a:ext>
-            <a:ext uri="{91240B29-F687-4f45-9708-019B960494DF}">
-              <a14:hiddenLine xmlns:a14="http://schemas.microsoft.com/office/drawing/2010/main" w="9525">
-                <a:solidFill>
-                  <a:schemeClr val="tx1"/>
-                </a:solidFill>
-                <a:miter lim="800000"/>
-                <a:headEnd/>
-                <a:tailEnd/>
-              </a14:hiddenLine>
-            </a:ext>
-          </a:extLst>
-        </p:spPr>
-      </p:pic>
-      <p:sp>
-        <p:nvSpPr>
-          <p:cNvPr id="5" name="Titre 1"/>
-          <p:cNvSpPr>
-            <a:spLocks noGrp="1"/>
-          </p:cNvSpPr>
-          <p:nvPr>
-            <p:ph type="title"/>
-          </p:nvPr>
-        </p:nvSpPr>
-        <p:spPr>
-          <a:xfrm>
-            <a:off x="508001" y="609600"/>
-            <a:ext cx="6447501" cy="1320800"/>
-          </a:xfrm>
-        </p:spPr>
-        <p:txBody>
-          <a:bodyPr>
-            <a:normAutofit fontScale="90000"/>
-          </a:bodyPr>
-          <a:lstStyle/>
-          <a:p>
-            <a:r>
-              <a:rPr lang="en-CA" dirty="0" err="1" smtClean="0"/>
-              <a:t>Signaux</a:t>
-            </a:r>
-            <a:r>
-              <a:rPr lang="en-CA" dirty="0" smtClean="0"/>
-              <a:t> de </a:t>
-            </a:r>
-            <a:r>
-              <a:rPr lang="en-CA" dirty="0" err="1" smtClean="0"/>
-              <a:t>commande</a:t>
-            </a:r>
-            <a:r>
-              <a:rPr lang="en-CA" dirty="0" smtClean="0"/>
-              <a:t> d’un bras</a:t>
-            </a:r>
-            <a:br>
-              <a:rPr lang="en-CA" dirty="0" smtClean="0"/>
-            </a:br>
-            <a:r>
-              <a:rPr lang="en-CA" dirty="0"/>
-              <a:t>	</a:t>
-            </a:r>
-            <a:endParaRPr lang="fr-CA" dirty="0"/>
-          </a:p>
-        </p:txBody>
-      </p:sp>
-    </p:spTree>
-    <p:extLst>
-      <p:ext uri="{BB962C8B-B14F-4D97-AF65-F5344CB8AC3E}">
-        <p14:creationId xmlns:p14="http://schemas.microsoft.com/office/powerpoint/2010/main" val="1593277952"/>
-      </p:ext>
-    </p:extLst>
-  </p:cSld>
-  <p:clrMapOvr>
-    <a:masterClrMapping/>
-  </p:clrMapOvr>
-</p:sld>
-</file>
-
-<file path=ppt/slides/slide9.xml><?xml version="1.0" encoding="utf-8"?>
-<p:sld xmlns:a="http://schemas.openxmlformats.org/drawingml/2006/main" xmlns:r="http://schemas.openxmlformats.org/officeDocument/2006/relationships" xmlns:p="http://schemas.openxmlformats.org/presentationml/2006/main">
-  <p:cSld>
-    <p:spTree>
-      <p:nvGrpSpPr>
-        <p:cNvPr id="1" name=""/>
-        <p:cNvGrpSpPr/>
-        <p:nvPr/>
-      </p:nvGrpSpPr>
-      <p:grpSpPr>
-        <a:xfrm>
-          <a:off x="0" y="0"/>
-          <a:ext cx="0" cy="0"/>
-          <a:chOff x="0" y="0"/>
-          <a:chExt cx="0" cy="0"/>
-        </a:xfrm>
-      </p:grpSpPr>
-      <p:sp>
-        <p:nvSpPr>
-          <p:cNvPr id="2" name="Titre 1"/>
-          <p:cNvSpPr>
-            <a:spLocks noGrp="1"/>
-          </p:cNvSpPr>
-          <p:nvPr>
-            <p:ph type="title"/>
-          </p:nvPr>
-        </p:nvSpPr>
-        <p:spPr/>
-        <p:txBody>
-          <a:bodyPr/>
-          <a:lstStyle/>
-          <a:p>
-            <a:endParaRPr lang="fr-CA"/>
-          </a:p>
-        </p:txBody>
-      </p:sp>
-      <p:sp>
-        <p:nvSpPr>
-          <p:cNvPr id="3" name="Espace réservé du contenu 2"/>
-          <p:cNvSpPr>
-            <a:spLocks noGrp="1"/>
-          </p:cNvSpPr>
-          <p:nvPr>
-            <p:ph idx="1"/>
-          </p:nvPr>
-        </p:nvSpPr>
-        <p:spPr/>
-        <p:txBody>
-          <a:bodyPr/>
-          <a:lstStyle/>
-          <a:p>
-            <a:endParaRPr lang="fr-CA" dirty="0"/>
-          </a:p>
-        </p:txBody>
-      </p:sp>
-      <p:pic>
-        <p:nvPicPr>
-          <p:cNvPr id="4098" name="Picture 2"/>
-          <p:cNvPicPr>
-            <a:picLocks noChangeAspect="1" noChangeArrowheads="1"/>
-          </p:cNvPicPr>
-          <p:nvPr/>
-        </p:nvPicPr>
-        <p:blipFill>
-          <a:blip r:embed="rId2">
-            <a:extLst>
-              <a:ext uri="{28A0092B-C50C-407E-A947-70E740481C1C}">
-                <a14:useLocalDpi xmlns:a14="http://schemas.microsoft.com/office/drawing/2010/main" val="0"/>
-              </a:ext>
-            </a:extLst>
-          </a:blip>
-          <a:srcRect/>
-          <a:stretch>
-            <a:fillRect/>
-          </a:stretch>
-        </p:blipFill>
-        <p:spPr bwMode="auto">
-          <a:xfrm>
-            <a:off x="1390649" y="899255"/>
-            <a:ext cx="6545035" cy="5520595"/>
-          </a:xfrm>
-          <a:prstGeom prst="rect">
-            <a:avLst/>
-          </a:prstGeom>
-          <a:noFill/>
-          <a:ln>
-            <a:noFill/>
-          </a:ln>
-          <a:extLst>
-            <a:ext uri="{909E8E84-426E-40dd-AFC4-6F175D3DCCD1}">
-              <a14:hiddenFill xmlns:a14="http://schemas.microsoft.com/office/drawing/2010/main">
-                <a:solidFill>
-                  <a:schemeClr val="accent1"/>
-                </a:solidFill>
-              </a14:hiddenFill>
-            </a:ext>
-            <a:ext uri="{91240B29-F687-4f45-9708-019B960494DF}">
-              <a14:hiddenLine xmlns:a14="http://schemas.microsoft.com/office/drawing/2010/main" w="9525">
-                <a:solidFill>
-                  <a:schemeClr val="tx1"/>
-                </a:solidFill>
-                <a:miter lim="800000"/>
-                <a:headEnd/>
-                <a:tailEnd/>
-              </a14:hiddenLine>
-            </a:ext>
-          </a:extLst>
-        </p:spPr>
-      </p:pic>
-    </p:spTree>
-    <p:extLst>
-      <p:ext uri="{BB962C8B-B14F-4D97-AF65-F5344CB8AC3E}">
-        <p14:creationId xmlns:p14="http://schemas.microsoft.com/office/powerpoint/2010/main" val="2758930811"/>
       </p:ext>
     </p:extLst>
   </p:cSld>

</xml_diff>

<commit_message>
ajout d'une explication de commande
</commit_message>
<xml_diff>
--- a/Remise/Remise 2/Presentation_Remise_2.pptx
+++ b/Remise/Remise 2/Presentation_Remise_2.pptx
@@ -137,7 +137,7 @@
   </p:defaultTextStyle>
   <p:extLst>
     <p:ext uri="{EFAFB233-063F-42B5-8137-9DF3F51BA10A}">
-      <p15:sldGuideLst xmlns="" xmlns:p15="http://schemas.microsoft.com/office/powerpoint/2012/main">
+      <p15:sldGuideLst xmlns:p15="http://schemas.microsoft.com/office/powerpoint/2012/main" xmlns="">
         <p15:guide id="1" orient="horz" pos="2160">
           <p15:clr>
             <a:srgbClr val="A4A3A4"/>
@@ -918,7 +918,7 @@
           <a:p>
             <a:fld id="{83CAF439-82BC-4083-ACA7-1FC901220AC7}" type="slidenum">
               <a:rPr lang="en-US" smtClean="0"/>
-              <a:t>‹#›</a:t>
+              <a:t>‹N°›</a:t>
             </a:fld>
             <a:endParaRPr lang="en-US"/>
           </a:p>
@@ -1181,7 +1181,7 @@
           <a:p>
             <a:fld id="{83CAF439-82BC-4083-ACA7-1FC901220AC7}" type="slidenum">
               <a:rPr lang="en-US" smtClean="0"/>
-              <a:t>‹#›</a:t>
+              <a:t>‹N°›</a:t>
             </a:fld>
             <a:endParaRPr lang="en-US"/>
           </a:p>
@@ -1432,7 +1432,7 @@
           <a:p>
             <a:fld id="{83CAF439-82BC-4083-ACA7-1FC901220AC7}" type="slidenum">
               <a:rPr lang="en-US" smtClean="0"/>
-              <a:t>‹#›</a:t>
+              <a:t>‹N°›</a:t>
             </a:fld>
             <a:endParaRPr lang="en-US"/>
           </a:p>
@@ -1746,7 +1746,7 @@
           <a:p>
             <a:fld id="{83CAF439-82BC-4083-ACA7-1FC901220AC7}" type="slidenum">
               <a:rPr lang="en-US" smtClean="0"/>
-              <a:t>‹#›</a:t>
+              <a:t>‹N°›</a:t>
             </a:fld>
             <a:endParaRPr lang="en-US"/>
           </a:p>
@@ -2087,7 +2087,7 @@
           <a:p>
             <a:fld id="{83CAF439-82BC-4083-ACA7-1FC901220AC7}" type="slidenum">
               <a:rPr lang="en-US" smtClean="0"/>
-              <a:t>‹#›</a:t>
+              <a:t>‹N°›</a:t>
             </a:fld>
             <a:endParaRPr lang="en-US"/>
           </a:p>
@@ -2401,7 +2401,7 @@
           <a:p>
             <a:fld id="{83CAF439-82BC-4083-ACA7-1FC901220AC7}" type="slidenum">
               <a:rPr lang="en-US" smtClean="0"/>
-              <a:t>‹#›</a:t>
+              <a:t>‹N°›</a:t>
             </a:fld>
             <a:endParaRPr lang="en-US"/>
           </a:p>
@@ -2794,7 +2794,7 @@
           <a:p>
             <a:fld id="{83CAF439-82BC-4083-ACA7-1FC901220AC7}" type="slidenum">
               <a:rPr lang="en-US" smtClean="0"/>
-              <a:t>‹#›</a:t>
+              <a:t>‹N°›</a:t>
             </a:fld>
             <a:endParaRPr lang="en-US"/>
           </a:p>
@@ -2964,7 +2964,7 @@
           <a:p>
             <a:fld id="{83CAF439-82BC-4083-ACA7-1FC901220AC7}" type="slidenum">
               <a:rPr lang="en-US" smtClean="0"/>
-              <a:t>‹#›</a:t>
+              <a:t>‹N°›</a:t>
             </a:fld>
             <a:endParaRPr lang="en-US"/>
           </a:p>
@@ -3144,7 +3144,7 @@
           <a:p>
             <a:fld id="{83CAF439-82BC-4083-ACA7-1FC901220AC7}" type="slidenum">
               <a:rPr lang="en-US" smtClean="0"/>
-              <a:t>‹#›</a:t>
+              <a:t>‹N°›</a:t>
             </a:fld>
             <a:endParaRPr lang="en-US"/>
           </a:p>
@@ -3401,7 +3401,7 @@
           <a:p>
             <a:fld id="{6D22F896-40B5-4ADD-8801-0D06FADFA095}" type="slidenum">
               <a:rPr lang="en-US" dirty="0"/>
-              <a:t>‹#›</a:t>
+              <a:t>‹N°›</a:t>
             </a:fld>
             <a:endParaRPr lang="en-US" dirty="0"/>
           </a:p>
@@ -3577,7 +3577,7 @@
           <a:p>
             <a:fld id="{83CAF439-82BC-4083-ACA7-1FC901220AC7}" type="slidenum">
               <a:rPr lang="en-US" smtClean="0"/>
-              <a:t>‹#›</a:t>
+              <a:t>‹N°›</a:t>
             </a:fld>
             <a:endParaRPr lang="en-US"/>
           </a:p>
@@ -3824,7 +3824,7 @@
           <a:p>
             <a:fld id="{83CAF439-82BC-4083-ACA7-1FC901220AC7}" type="slidenum">
               <a:rPr lang="en-US" smtClean="0"/>
-              <a:t>‹#›</a:t>
+              <a:t>‹N°›</a:t>
             </a:fld>
             <a:endParaRPr lang="en-US"/>
           </a:p>
@@ -4056,7 +4056,7 @@
           <a:p>
             <a:fld id="{83CAF439-82BC-4083-ACA7-1FC901220AC7}" type="slidenum">
               <a:rPr lang="en-US" smtClean="0"/>
-              <a:t>‹#›</a:t>
+              <a:t>‹N°›</a:t>
             </a:fld>
             <a:endParaRPr lang="en-US"/>
           </a:p>
@@ -4430,7 +4430,7 @@
           <a:p>
             <a:fld id="{83CAF439-82BC-4083-ACA7-1FC901220AC7}" type="slidenum">
               <a:rPr lang="en-US" smtClean="0"/>
-              <a:t>‹#›</a:t>
+              <a:t>‹N°›</a:t>
             </a:fld>
             <a:endParaRPr lang="en-US"/>
           </a:p>
@@ -4553,7 +4553,7 @@
           <a:p>
             <a:fld id="{83CAF439-82BC-4083-ACA7-1FC901220AC7}" type="slidenum">
               <a:rPr lang="en-US" smtClean="0"/>
-              <a:t>‹#›</a:t>
+              <a:t>‹N°›</a:t>
             </a:fld>
             <a:endParaRPr lang="en-US"/>
           </a:p>
@@ -4648,7 +4648,7 @@
           <a:p>
             <a:fld id="{83CAF439-82BC-4083-ACA7-1FC901220AC7}" type="slidenum">
               <a:rPr lang="en-US" smtClean="0"/>
-              <a:t>‹#›</a:t>
+              <a:t>‹N°›</a:t>
             </a:fld>
             <a:endParaRPr lang="en-US"/>
           </a:p>
@@ -4758,7 +4758,7 @@
           <a:p>
             <a:fld id="{83CAF439-82BC-4083-ACA7-1FC901220AC7}" type="slidenum">
               <a:rPr lang="en-US" smtClean="0"/>
-              <a:t>‹#›</a:t>
+              <a:t>‹N°›</a:t>
             </a:fld>
             <a:endParaRPr lang="en-US"/>
           </a:p>
@@ -5543,7 +5543,7 @@
           <a:p>
             <a:fld id="{83CAF439-82BC-4083-ACA7-1FC901220AC7}" type="slidenum">
               <a:rPr lang="en-US" smtClean="0"/>
-              <a:t>‹#›</a:t>
+              <a:t>‹N°›</a:t>
             </a:fld>
             <a:endParaRPr lang="en-US"/>
           </a:p>
@@ -6339,7 +6339,7 @@
           <a:p>
             <a:fld id="{83CAF439-82BC-4083-ACA7-1FC901220AC7}" type="slidenum">
               <a:rPr lang="en-US" smtClean="0"/>
-              <a:t>‹#›</a:t>
+              <a:t>‹N°›</a:t>
             </a:fld>
             <a:endParaRPr lang="en-US"/>
           </a:p>
@@ -6879,7 +6879,7 @@
   <p:timing>
     <p:tnLst>
       <p:par>
-        <p:cTn xmlns:p14="http://schemas.microsoft.com/office/powerpoint/2010/main" id="1" dur="indefinite" restart="never" nodeType="tmRoot"/>
+        <p:cTn id="1" dur="indefinite" restart="never" nodeType="tmRoot"/>
       </p:par>
     </p:tnLst>
   </p:timing>
@@ -6998,14 +6998,14 @@
             <a:noFill/>
           </a:ln>
           <a:extLst>
-            <a:ext uri="{909E8E84-426E-40dd-AFC4-6F175D3DCCD1}">
+            <a:ext uri="{909E8E84-426E-40DD-AFC4-6F175D3DCCD1}">
               <a14:hiddenFill xmlns:a14="http://schemas.microsoft.com/office/drawing/2010/main">
                 <a:solidFill>
                   <a:schemeClr val="accent1"/>
                 </a:solidFill>
               </a14:hiddenFill>
             </a:ext>
-            <a:ext uri="{91240B29-F687-4f45-9708-019B960494DF}">
+            <a:ext uri="{91240B29-F687-4F45-9708-019B960494DF}">
               <a14:hiddenLine xmlns:a14="http://schemas.microsoft.com/office/drawing/2010/main" w="9525">
                 <a:solidFill>
                   <a:schemeClr val="tx1"/>
@@ -7120,14 +7120,14 @@
             <a:noFill/>
           </a:ln>
           <a:extLst>
-            <a:ext uri="{909E8E84-426E-40dd-AFC4-6F175D3DCCD1}">
+            <a:ext uri="{909E8E84-426E-40DD-AFC4-6F175D3DCCD1}">
               <a14:hiddenFill xmlns:a14="http://schemas.microsoft.com/office/drawing/2010/main">
                 <a:solidFill>
                   <a:schemeClr val="accent1"/>
                 </a:solidFill>
               </a14:hiddenFill>
             </a:ext>
-            <a:ext uri="{91240B29-F687-4f45-9708-019B960494DF}">
+            <a:ext uri="{91240B29-F687-4F45-9708-019B960494DF}">
               <a14:hiddenLine xmlns:a14="http://schemas.microsoft.com/office/drawing/2010/main" w="9525">
                 <a:solidFill>
                   <a:schemeClr val="tx1"/>
@@ -7281,14 +7281,14 @@
             <a:noFill/>
           </a:ln>
           <a:extLst>
-            <a:ext uri="{909E8E84-426E-40dd-AFC4-6F175D3DCCD1}">
+            <a:ext uri="{909E8E84-426E-40DD-AFC4-6F175D3DCCD1}">
               <a14:hiddenFill xmlns:a14="http://schemas.microsoft.com/office/drawing/2010/main">
                 <a:solidFill>
                   <a:schemeClr val="accent1"/>
                 </a:solidFill>
               </a14:hiddenFill>
             </a:ext>
-            <a:ext uri="{91240B29-F687-4f45-9708-019B960494DF}">
+            <a:ext uri="{91240B29-F687-4F45-9708-019B960494DF}">
               <a14:hiddenLine xmlns:a14="http://schemas.microsoft.com/office/drawing/2010/main" w="9525">
                 <a:solidFill>
                   <a:schemeClr val="tx1"/>
@@ -7377,11 +7377,7 @@
             </a:r>
             <a:r>
               <a:rPr lang="en-CA" dirty="0" smtClean="0"/>
-              <a:t> </a:t>
-            </a:r>
-            <a:r>
-              <a:rPr lang="en-CA" dirty="0" smtClean="0"/>
-              <a:t>et </a:t>
+              <a:t> et </a:t>
             </a:r>
             <a:r>
               <a:rPr lang="en-CA" dirty="0" err="1" smtClean="0"/>
@@ -7464,14 +7460,14 @@
             <a:noFill/>
           </a:ln>
           <a:extLst>
-            <a:ext uri="{909E8E84-426E-40dd-AFC4-6F175D3DCCD1}">
+            <a:ext uri="{909E8E84-426E-40DD-AFC4-6F175D3DCCD1}">
               <a14:hiddenFill xmlns:a14="http://schemas.microsoft.com/office/drawing/2010/main">
                 <a:solidFill>
                   <a:schemeClr val="accent1"/>
                 </a:solidFill>
               </a14:hiddenFill>
             </a:ext>
-            <a:ext uri="{91240B29-F687-4f45-9708-019B960494DF}">
+            <a:ext uri="{91240B29-F687-4F45-9708-019B960494DF}">
               <a14:hiddenLine xmlns:a14="http://schemas.microsoft.com/office/drawing/2010/main" w="9525">
                 <a:solidFill>
                   <a:schemeClr val="tx1"/>
@@ -7615,14 +7611,14 @@
             <a:noFill/>
           </a:ln>
           <a:extLst>
-            <a:ext uri="{909E8E84-426E-40dd-AFC4-6F175D3DCCD1}">
+            <a:ext uri="{909E8E84-426E-40DD-AFC4-6F175D3DCCD1}">
               <a14:hiddenFill xmlns:a14="http://schemas.microsoft.com/office/drawing/2010/main">
                 <a:solidFill>
                   <a:schemeClr val="accent1"/>
                 </a:solidFill>
               </a14:hiddenFill>
             </a:ext>
-            <a:ext uri="{91240B29-F687-4f45-9708-019B960494DF}">
+            <a:ext uri="{91240B29-F687-4F45-9708-019B960494DF}">
               <a14:hiddenLine xmlns:a14="http://schemas.microsoft.com/office/drawing/2010/main" w="9525">
                 <a:solidFill>
                   <a:schemeClr val="tx1"/>
@@ -7691,11 +7687,7 @@
             </a:r>
             <a:r>
               <a:rPr lang="en-CA" dirty="0" smtClean="0"/>
-              <a:t> </a:t>
-            </a:r>
-            <a:r>
-              <a:rPr lang="en-CA" dirty="0" smtClean="0"/>
-              <a:t>des blocs </a:t>
+              <a:t> des blocs </a:t>
             </a:r>
             <a:r>
               <a:rPr lang="en-CA" dirty="0" err="1" smtClean="0"/>
@@ -7766,14 +7758,14 @@
             <a:noFill/>
           </a:ln>
           <a:extLst>
-            <a:ext uri="{909E8E84-426E-40dd-AFC4-6F175D3DCCD1}">
+            <a:ext uri="{909E8E84-426E-40DD-AFC4-6F175D3DCCD1}">
               <a14:hiddenFill xmlns:a14="http://schemas.microsoft.com/office/drawing/2010/main">
                 <a:solidFill>
                   <a:schemeClr val="accent1"/>
                 </a:solidFill>
               </a14:hiddenFill>
             </a:ext>
-            <a:ext uri="{91240B29-F687-4f45-9708-019B960494DF}">
+            <a:ext uri="{91240B29-F687-4F45-9708-019B960494DF}">
               <a14:hiddenLine xmlns:a14="http://schemas.microsoft.com/office/drawing/2010/main" w="9525">
                 <a:solidFill>
                   <a:schemeClr val="tx1"/>
@@ -7897,14 +7889,14 @@
             <a:noFill/>
           </a:ln>
           <a:extLst>
-            <a:ext uri="{909E8E84-426E-40dd-AFC4-6F175D3DCCD1}">
+            <a:ext uri="{909E8E84-426E-40DD-AFC4-6F175D3DCCD1}">
               <a14:hiddenFill xmlns:a14="http://schemas.microsoft.com/office/drawing/2010/main">
                 <a:solidFill>
                   <a:schemeClr val="accent1"/>
                 </a:solidFill>
               </a14:hiddenFill>
             </a:ext>
-            <a:ext uri="{91240B29-F687-4f45-9708-019B960494DF}">
+            <a:ext uri="{91240B29-F687-4F45-9708-019B960494DF}">
               <a14:hiddenLine xmlns:a14="http://schemas.microsoft.com/office/drawing/2010/main" w="9525">
                 <a:solidFill>
                   <a:schemeClr val="tx1"/>
@@ -8357,14 +8349,14 @@
             <a:noFill/>
           </a:ln>
           <a:extLst>
-            <a:ext uri="{909E8E84-426E-40dd-AFC4-6F175D3DCCD1}">
+            <a:ext uri="{909E8E84-426E-40DD-AFC4-6F175D3DCCD1}">
               <a14:hiddenFill xmlns:a14="http://schemas.microsoft.com/office/drawing/2010/main">
                 <a:solidFill>
                   <a:srgbClr val="FFFFFF"/>
                 </a:solidFill>
               </a14:hiddenFill>
             </a:ext>
-            <a:ext uri="{91240B29-F687-4f45-9708-019B960494DF}">
+            <a:ext uri="{91240B29-F687-4F45-9708-019B960494DF}">
               <a14:hiddenLine xmlns:a14="http://schemas.microsoft.com/office/drawing/2010/main" w="9525">
                 <a:solidFill>
                   <a:srgbClr val="000000"/>
@@ -8840,13 +8832,8 @@
             </a:r>
             <a:r>
               <a:rPr lang="fr-CA" dirty="0" smtClean="0"/>
-              <a:t> et </a:t>
-            </a:r>
-            <a:r>
-              <a:rPr lang="fr-CA" dirty="0" smtClean="0"/>
-              <a:t>Excel pour un post-traitement lié à l’outil de dimensionnement.</a:t>
-            </a:r>
-            <a:endParaRPr lang="fr-CA" dirty="0" smtClean="0"/>
+              <a:t> et Excel pour un post-traitement lié à l’outil de dimensionnement.</a:t>
+            </a:r>
           </a:p>
         </p:txBody>
       </p:sp>
@@ -10106,11 +10093,7 @@
             </a:r>
             <a:r>
               <a:rPr lang="en-US" dirty="0" err="1" smtClean="0"/>
-              <a:t>c</a:t>
-            </a:r>
-            <a:r>
-              <a:rPr lang="en-US" dirty="0" err="1" smtClean="0"/>
-              <a:t>ôté</a:t>
+              <a:t>côté</a:t>
             </a:r>
             <a:r>
               <a:rPr lang="en-US" dirty="0" smtClean="0"/>
@@ -10214,15 +10197,7 @@
             </a:r>
             <a:r>
               <a:rPr lang="fr-FR" sz="2300" dirty="0" smtClean="0"/>
-              <a:t>) </a:t>
-            </a:r>
-            <a:r>
-              <a:rPr lang="fr-FR" sz="2300" dirty="0" smtClean="0"/>
-              <a:t>à </a:t>
-            </a:r>
-            <a:r>
-              <a:rPr lang="fr-FR" sz="2300" dirty="0" smtClean="0"/>
-              <a:t>3 niveaux à régulation de tension.</a:t>
+              <a:t>) à 3 niveaux à régulation de tension.</a:t>
             </a:r>
             <a:endParaRPr lang="fr-FR" sz="2300" dirty="0"/>
           </a:p>
@@ -10335,11 +10310,7 @@
             </a:r>
             <a:r>
               <a:rPr lang="en-US" dirty="0" err="1" smtClean="0"/>
-              <a:t>c</a:t>
-            </a:r>
-            <a:r>
-              <a:rPr lang="en-US" dirty="0" err="1" smtClean="0"/>
-              <a:t>ôté</a:t>
+              <a:t>côté</a:t>
             </a:r>
             <a:r>
               <a:rPr lang="en-US" dirty="0" smtClean="0"/>
@@ -10510,6 +10481,220 @@
           </a:p>
         </p:txBody>
       </p:sp>
+      <p:sp>
+        <p:nvSpPr>
+          <p:cNvPr id="3" name="Rectangle 2"/>
+          <p:cNvSpPr/>
+          <p:nvPr/>
+        </p:nvSpPr>
+        <p:spPr>
+          <a:xfrm>
+            <a:off x="673100" y="4523412"/>
+            <a:ext cx="8356600" cy="1938992"/>
+          </a:xfrm>
+          <a:prstGeom prst="rect">
+            <a:avLst/>
+          </a:prstGeom>
+        </p:spPr>
+        <p:txBody>
+          <a:bodyPr wrap="square">
+            <a:spAutoFit/>
+          </a:bodyPr>
+          <a:lstStyle/>
+          <a:p>
+            <a:pPr marL="742950" lvl="1" indent="-285750">
+              <a:buClr>
+                <a:schemeClr val="tx2">
+                  <a:lumMod val="75000"/>
+                  <a:lumOff val="25000"/>
+                </a:schemeClr>
+              </a:buClr>
+              <a:buFont typeface="Arial"/>
+              <a:buChar char="•"/>
+            </a:pPr>
+            <a:r>
+              <a:rPr lang="en-CA" sz="2400" dirty="0" err="1"/>
+              <a:t>Comparaison</a:t>
+            </a:r>
+            <a:r>
+              <a:rPr lang="en-CA" sz="2400" dirty="0"/>
+              <a:t> entre le signal </a:t>
+            </a:r>
+            <a:r>
+              <a:rPr lang="en-CA" sz="2400" dirty="0" err="1"/>
+              <a:t>d’erreur</a:t>
+            </a:r>
+            <a:r>
+              <a:rPr lang="en-CA" sz="2400" dirty="0"/>
+              <a:t> et </a:t>
+            </a:r>
+            <a:r>
+              <a:rPr lang="en-CA" sz="2400" dirty="0" err="1"/>
+              <a:t>trois</a:t>
+            </a:r>
+            <a:r>
+              <a:rPr lang="en-CA" sz="2400" dirty="0"/>
+              <a:t> </a:t>
+            </a:r>
+            <a:r>
+              <a:rPr lang="en-CA" sz="2400" dirty="0" err="1"/>
+              <a:t>signaux</a:t>
+            </a:r>
+            <a:r>
+              <a:rPr lang="en-CA" sz="2400" dirty="0"/>
+              <a:t> en dent de </a:t>
+            </a:r>
+            <a:r>
+              <a:rPr lang="en-CA" sz="2400" dirty="0" err="1"/>
+              <a:t>scie</a:t>
+            </a:r>
+            <a:endParaRPr lang="en-CA" sz="2400" dirty="0"/>
+          </a:p>
+          <a:p>
+            <a:pPr marL="742950" lvl="1" indent="-285750">
+              <a:buClr>
+                <a:schemeClr val="tx2">
+                  <a:lumMod val="75000"/>
+                  <a:lumOff val="25000"/>
+                </a:schemeClr>
+              </a:buClr>
+              <a:buFont typeface="Arial"/>
+              <a:buChar char="•"/>
+            </a:pPr>
+            <a:r>
+              <a:rPr lang="en-CA" sz="2400" dirty="0"/>
+              <a:t>Activation de </a:t>
+            </a:r>
+            <a:r>
+              <a:rPr lang="en-CA" sz="2400" dirty="0" err="1" smtClean="0"/>
+              <a:t>chaque</a:t>
+            </a:r>
+            <a:r>
+              <a:rPr lang="en-CA" sz="2400" dirty="0" smtClean="0"/>
+              <a:t> </a:t>
+            </a:r>
+            <a:r>
+              <a:rPr lang="en-CA" sz="2400" dirty="0" err="1" smtClean="0"/>
+              <a:t>d’IGBT</a:t>
+            </a:r>
+            <a:r>
+              <a:rPr lang="en-CA" sz="2400" dirty="0" smtClean="0"/>
+              <a:t> au bon moment grâce à </a:t>
+            </a:r>
+            <a:r>
+              <a:rPr lang="en-CA" sz="2400" dirty="0" err="1" smtClean="0"/>
+              <a:t>une</a:t>
+            </a:r>
+            <a:r>
+              <a:rPr lang="en-CA" sz="2400" dirty="0" smtClean="0"/>
+              <a:t> </a:t>
+            </a:r>
+            <a:r>
+              <a:rPr lang="en-CA" sz="2400" dirty="0" err="1" smtClean="0"/>
+              <a:t>porteuse</a:t>
+            </a:r>
+            <a:endParaRPr lang="en-CA" sz="2400" dirty="0" smtClean="0"/>
+          </a:p>
+          <a:p>
+            <a:pPr marL="742950" lvl="1" indent="-285750">
+              <a:buClr>
+                <a:schemeClr val="tx2">
+                  <a:lumMod val="75000"/>
+                  <a:lumOff val="25000"/>
+                </a:schemeClr>
+              </a:buClr>
+              <a:buFont typeface="Arial"/>
+              <a:buChar char="•"/>
+            </a:pPr>
+            <a:r>
+              <a:rPr lang="en-CA" sz="2400" dirty="0" err="1" smtClean="0"/>
+              <a:t>Chaque</a:t>
+            </a:r>
+            <a:r>
+              <a:rPr lang="en-CA" sz="2400" dirty="0" smtClean="0"/>
+              <a:t> </a:t>
+            </a:r>
+            <a:r>
+              <a:rPr lang="en-CA" sz="2400" dirty="0" err="1" smtClean="0"/>
+              <a:t>porteuse</a:t>
+            </a:r>
+            <a:r>
+              <a:rPr lang="en-CA" sz="2400" dirty="0" smtClean="0"/>
+              <a:t> des bras </a:t>
+            </a:r>
+            <a:r>
+              <a:rPr lang="en-CA" sz="2400" dirty="0" err="1" smtClean="0"/>
+              <a:t>sont</a:t>
+            </a:r>
+            <a:r>
+              <a:rPr lang="en-CA" sz="2400" dirty="0" smtClean="0"/>
+              <a:t> </a:t>
+            </a:r>
+            <a:r>
+              <a:rPr lang="en-CA" sz="2400" dirty="0" err="1" smtClean="0"/>
+              <a:t>décalées</a:t>
+            </a:r>
+            <a:r>
+              <a:rPr lang="en-CA" sz="2400" dirty="0" smtClean="0"/>
+              <a:t> de 6.67ms</a:t>
+            </a:r>
+          </a:p>
+        </p:txBody>
+      </p:sp>
+      <p:pic>
+        <p:nvPicPr>
+          <p:cNvPr id="1026" name="Picture 2"/>
+          <p:cNvPicPr>
+            <a:picLocks noChangeAspect="1" noChangeArrowheads="1"/>
+          </p:cNvPicPr>
+          <p:nvPr/>
+        </p:nvPicPr>
+        <p:blipFill>
+          <a:blip r:embed="rId2">
+            <a:extLst>
+              <a:ext uri="{28A0092B-C50C-407E-A947-70E740481C1C}">
+                <a14:useLocalDpi xmlns:a14="http://schemas.microsoft.com/office/drawing/2010/main" val="0"/>
+              </a:ext>
+            </a:extLst>
+          </a:blip>
+          <a:srcRect/>
+          <a:stretch>
+            <a:fillRect/>
+          </a:stretch>
+        </p:blipFill>
+        <p:spPr bwMode="auto">
+          <a:xfrm>
+            <a:off x="1536700" y="1859508"/>
+            <a:ext cx="6629400" cy="2324100"/>
+          </a:xfrm>
+          <a:prstGeom prst="rect">
+            <a:avLst/>
+          </a:prstGeom>
+          <a:noFill/>
+          <a:ln>
+            <a:noFill/>
+          </a:ln>
+          <a:extLst>
+            <a:ext uri="{909E8E84-426E-40DD-AFC4-6F175D3DCCD1}">
+              <a14:hiddenFill xmlns:a14="http://schemas.microsoft.com/office/drawing/2010/main">
+                <a:solidFill>
+                  <a:schemeClr val="accent1"/>
+                </a:solidFill>
+              </a14:hiddenFill>
+            </a:ext>
+            <a:ext uri="{91240B29-F687-4F45-9708-019B960494DF}">
+              <a14:hiddenLine xmlns:a14="http://schemas.microsoft.com/office/drawing/2010/main" w="9525">
+                <a:solidFill>
+                  <a:schemeClr val="tx1"/>
+                </a:solidFill>
+                <a:miter lim="800000"/>
+                <a:headEnd/>
+                <a:tailEnd/>
+              </a14:hiddenLine>
+            </a:ext>
+          </a:extLst>
+        </p:spPr>
+      </p:pic>
     </p:spTree>
     <p:extLst>
       <p:ext uri="{BB962C8B-B14F-4D97-AF65-F5344CB8AC3E}">
@@ -10929,14 +11114,14 @@
             <a:noFill/>
           </a:ln>
           <a:extLst>
-            <a:ext uri="{909E8E84-426E-40dd-AFC4-6F175D3DCCD1}">
+            <a:ext uri="{909E8E84-426E-40DD-AFC4-6F175D3DCCD1}">
               <a14:hiddenFill xmlns:a14="http://schemas.microsoft.com/office/drawing/2010/main">
                 <a:solidFill>
                   <a:schemeClr val="accent1"/>
                 </a:solidFill>
               </a14:hiddenFill>
             </a:ext>
-            <a:ext uri="{91240B29-F687-4f45-9708-019B960494DF}">
+            <a:ext uri="{91240B29-F687-4F45-9708-019B960494DF}">
               <a14:hiddenLine xmlns:a14="http://schemas.microsoft.com/office/drawing/2010/main" w="9525">
                 <a:solidFill>
                   <a:schemeClr val="tx1"/>
@@ -11261,7 +11446,7 @@
   <a:extraClrSchemeLst/>
   <a:extLst>
     <a:ext uri="{05A4C25C-085E-4340-85A3-A5531E510DB2}">
-      <thm15:themeFamily xmlns="" xmlns:thm15="http://schemas.microsoft.com/office/thememl/2012/main" name="Facet" id="{C0C680CD-088A-49FC-A102-D699147F32B2}" vid="{CFBC31BA-B70F-4F30-BCAA-4F3011E16C4D}"/>
+      <thm15:themeFamily xmlns:thm15="http://schemas.microsoft.com/office/thememl/2012/main" xmlns="" name="Facet" id="{C0C680CD-088A-49FC-A102-D699147F32B2}" vid="{CFBC31BA-B70F-4F30-BCAA-4F3011E16C4D}"/>
     </a:ext>
   </a:extLst>
 </a:theme>

</xml_diff>